<commit_message>
Datenbankschema V0.1 bitte prüfen und ggf. Änderungen vorschlagen! Die Beziehung Offer zu sich selbst ist laut workbench undefiniert bzw. leer und lässt sich nicht löschen. Keine Ahnung wie die da hingekommen ist.
</commit_message>
<xml_diff>
--- a/Präsentation PRG4.pptx
+++ b/Präsentation PRG4.pptx
@@ -5,15 +5,16 @@
     <p:sldMasterId id="2147483660" r:id="rId1"/>
   </p:sldMasterIdLst>
   <p:notesMasterIdLst>
-    <p:notesMasterId r:id="rId5"/>
+    <p:notesMasterId r:id="rId6"/>
   </p:notesMasterIdLst>
   <p:handoutMasterIdLst>
-    <p:handoutMasterId r:id="rId6"/>
+    <p:handoutMasterId r:id="rId7"/>
   </p:handoutMasterIdLst>
   <p:sldIdLst>
     <p:sldId id="257" r:id="rId2"/>
     <p:sldId id="258" r:id="rId3"/>
     <p:sldId id="260" r:id="rId4"/>
+    <p:sldId id="261" r:id="rId5"/>
   </p:sldIdLst>
   <p:sldSz cx="9144000" cy="6858000" type="screen4x3"/>
   <p:notesSz cx="6858000" cy="9144000"/>
@@ -884,26 +885,6 @@
           <a:bodyPr/>
           <a:lstStyle/>
           <a:p>
-            <a:r>
-              <a:rPr lang="de-DE" dirty="0" smtClean="0"/>
-              <a:t>Grußformel</a:t>
-            </a:r>
-          </a:p>
-          <a:p>
-            <a:r>
-              <a:rPr lang="de-DE" dirty="0" smtClean="0"/>
-              <a:t>Green</a:t>
-            </a:r>
-            <a:r>
-              <a:rPr lang="de-DE" baseline="0" dirty="0" smtClean="0"/>
-              <a:t> IT näher bringen</a:t>
-            </a:r>
-          </a:p>
-          <a:p>
-            <a:r>
-              <a:rPr lang="de-DE" baseline="0" dirty="0" smtClean="0"/>
-              <a:t>Wozu Green IT? was kann erreicht werden? Wo einsetzen?</a:t>
-            </a:r>
             <a:endParaRPr lang="de-DE" dirty="0"/>
           </a:p>
         </p:txBody>
@@ -988,16 +969,6 @@
           <a:bodyPr/>
           <a:lstStyle/>
           <a:p>
-            <a:r>
-              <a:rPr lang="de-DE" dirty="0" smtClean="0"/>
-              <a:t>-Grundlegendes: Definition, Kennzeichen</a:t>
-            </a:r>
-          </a:p>
-          <a:p>
-            <a:r>
-              <a:rPr lang="de-DE" dirty="0" smtClean="0"/>
-              <a:t>-Anwendungsbereiche, speziell Rechenzentren</a:t>
-            </a:r>
             <a:endParaRPr lang="de-DE" dirty="0"/>
           </a:p>
         </p:txBody>
@@ -1056,335 +1027,6 @@
           </a:bodyPr>
           <a:lstStyle/>
           <a:p>
-            <a:r>
-              <a:rPr lang="de-DE" dirty="0" smtClean="0"/>
-              <a:t>-CO2 Anteil der selbe wie weltweiter Flugverkehr (820 </a:t>
-            </a:r>
-            <a:r>
-              <a:rPr lang="de-DE" dirty="0" err="1" smtClean="0"/>
-              <a:t>mio</a:t>
-            </a:r>
-            <a:r>
-              <a:rPr lang="de-DE" dirty="0" smtClean="0"/>
-              <a:t> tonnen/</a:t>
-            </a:r>
-            <a:r>
-              <a:rPr lang="de-DE" dirty="0" err="1" smtClean="0"/>
-              <a:t>jahr</a:t>
-            </a:r>
-            <a:r>
-              <a:rPr lang="de-DE" dirty="0" smtClean="0"/>
-              <a:t>)</a:t>
-            </a:r>
-          </a:p>
-          <a:p>
-            <a:r>
-              <a:rPr lang="de-DE" dirty="0" smtClean="0"/>
-              <a:t>-Tendenz</a:t>
-            </a:r>
-            <a:r>
-              <a:rPr lang="de-DE" baseline="0" dirty="0" smtClean="0"/>
-              <a:t> durch Nutzung in Schwellenländern stark steigend (</a:t>
-            </a:r>
-            <a:r>
-              <a:rPr lang="de-DE" sz="1200" kern="1200" dirty="0" smtClean="0">
-                <a:solidFill>
-                  <a:schemeClr val="tx1"/>
-                </a:solidFill>
-                <a:latin typeface="Times New Roman" pitchFamily="18" charset="0"/>
-                <a:ea typeface="+mn-ea"/>
-                <a:cs typeface="+mn-cs"/>
-              </a:rPr>
-              <a:t>Bedarf an Speicher- und Rechenkapazität</a:t>
-            </a:r>
-            <a:r>
-              <a:rPr lang="de-DE" sz="1200" kern="1200" baseline="0" dirty="0" smtClean="0">
-                <a:solidFill>
-                  <a:schemeClr val="tx1"/>
-                </a:solidFill>
-                <a:latin typeface="Times New Roman" pitchFamily="18" charset="0"/>
-                <a:ea typeface="+mn-ea"/>
-                <a:cs typeface="+mn-cs"/>
-              </a:rPr>
-              <a:t> </a:t>
-            </a:r>
-          </a:p>
-          <a:p>
-            <a:r>
-              <a:rPr lang="de-DE" sz="1200" kern="1200" baseline="0" dirty="0" smtClean="0">
-                <a:solidFill>
-                  <a:schemeClr val="tx1"/>
-                </a:solidFill>
-                <a:latin typeface="Times New Roman" pitchFamily="18" charset="0"/>
-                <a:ea typeface="+mn-ea"/>
-                <a:cs typeface="+mn-cs"/>
-              </a:rPr>
-              <a:t>u</a:t>
-            </a:r>
-            <a:r>
-              <a:rPr lang="en-GB" sz="1200" kern="1200" dirty="0" smtClean="0">
-                <a:solidFill>
-                  <a:schemeClr val="tx1"/>
-                </a:solidFill>
-                <a:latin typeface="Times New Roman" pitchFamily="18" charset="0"/>
-                <a:ea typeface="+mn-ea"/>
-                <a:cs typeface="+mn-cs"/>
-              </a:rPr>
-              <a:t>m</a:t>
-            </a:r>
-            <a:r>
-              <a:rPr lang="en-GB" sz="1200" kern="1200" baseline="0" dirty="0" smtClean="0">
-                <a:solidFill>
-                  <a:schemeClr val="tx1"/>
-                </a:solidFill>
-                <a:latin typeface="Times New Roman" pitchFamily="18" charset="0"/>
-                <a:ea typeface="+mn-ea"/>
-                <a:cs typeface="+mn-cs"/>
-              </a:rPr>
-              <a:t> </a:t>
-            </a:r>
-            <a:r>
-              <a:rPr lang="en-GB" sz="1200" kern="1200" dirty="0" err="1" smtClean="0">
-                <a:solidFill>
-                  <a:schemeClr val="tx1"/>
-                </a:solidFill>
-                <a:latin typeface="Times New Roman" pitchFamily="18" charset="0"/>
-                <a:ea typeface="+mn-ea"/>
-                <a:cs typeface="+mn-cs"/>
-              </a:rPr>
-              <a:t>jährlich</a:t>
-            </a:r>
-            <a:r>
-              <a:rPr lang="en-GB" sz="1200" kern="1200" baseline="0" dirty="0" smtClean="0">
-                <a:solidFill>
-                  <a:schemeClr val="tx1"/>
-                </a:solidFill>
-                <a:latin typeface="Times New Roman" pitchFamily="18" charset="0"/>
-                <a:ea typeface="+mn-ea"/>
-                <a:cs typeface="+mn-cs"/>
-              </a:rPr>
-              <a:t> </a:t>
-            </a:r>
-            <a:r>
-              <a:rPr lang="en-GB" sz="1200" kern="1200" dirty="0" err="1" smtClean="0">
-                <a:solidFill>
-                  <a:schemeClr val="tx1"/>
-                </a:solidFill>
-                <a:latin typeface="Times New Roman" pitchFamily="18" charset="0"/>
-                <a:ea typeface="+mn-ea"/>
-                <a:cs typeface="+mn-cs"/>
-              </a:rPr>
-              <a:t>knapp</a:t>
-            </a:r>
-            <a:r>
-              <a:rPr lang="en-GB" sz="1200" kern="1200" baseline="0" dirty="0" smtClean="0">
-                <a:solidFill>
-                  <a:schemeClr val="tx1"/>
-                </a:solidFill>
-                <a:latin typeface="Times New Roman" pitchFamily="18" charset="0"/>
-                <a:ea typeface="+mn-ea"/>
-                <a:cs typeface="+mn-cs"/>
-              </a:rPr>
-              <a:t> </a:t>
-            </a:r>
-            <a:r>
-              <a:rPr lang="en-GB" sz="1200" kern="1200" dirty="0" smtClean="0">
-                <a:solidFill>
-                  <a:schemeClr val="tx1"/>
-                </a:solidFill>
-                <a:latin typeface="Times New Roman" pitchFamily="18" charset="0"/>
-                <a:ea typeface="+mn-ea"/>
-                <a:cs typeface="+mn-cs"/>
-              </a:rPr>
-              <a:t>60</a:t>
-            </a:r>
-            <a:r>
-              <a:rPr lang="en-GB" sz="1200" kern="1200" baseline="0" dirty="0" smtClean="0">
-                <a:solidFill>
-                  <a:schemeClr val="tx1"/>
-                </a:solidFill>
-                <a:latin typeface="Times New Roman" pitchFamily="18" charset="0"/>
-                <a:ea typeface="+mn-ea"/>
-                <a:cs typeface="+mn-cs"/>
-              </a:rPr>
-              <a:t> </a:t>
-            </a:r>
-            <a:r>
-              <a:rPr lang="en-GB" sz="1200" kern="1200" dirty="0" smtClean="0">
-                <a:solidFill>
-                  <a:schemeClr val="tx1"/>
-                </a:solidFill>
-                <a:latin typeface="Times New Roman" pitchFamily="18" charset="0"/>
-                <a:ea typeface="+mn-ea"/>
-                <a:cs typeface="+mn-cs"/>
-              </a:rPr>
-              <a:t>%,</a:t>
-            </a:r>
-            <a:r>
-              <a:rPr lang="en-GB" sz="1200" kern="1200" baseline="0" dirty="0" smtClean="0">
-                <a:solidFill>
-                  <a:schemeClr val="tx1"/>
-                </a:solidFill>
-                <a:latin typeface="Times New Roman" pitchFamily="18" charset="0"/>
-                <a:ea typeface="+mn-ea"/>
-                <a:cs typeface="+mn-cs"/>
-              </a:rPr>
-              <a:t> </a:t>
-            </a:r>
-            <a:r>
-              <a:rPr lang="en-GB" sz="1200" kern="1200" dirty="0" smtClean="0">
-                <a:solidFill>
-                  <a:schemeClr val="tx1"/>
-                </a:solidFill>
-                <a:latin typeface="Times New Roman" pitchFamily="18" charset="0"/>
-                <a:ea typeface="+mn-ea"/>
-                <a:cs typeface="+mn-cs"/>
-              </a:rPr>
-              <a:t>die </a:t>
-            </a:r>
-            <a:r>
-              <a:rPr lang="en-GB" sz="1200" kern="1200" dirty="0" err="1" smtClean="0">
-                <a:solidFill>
-                  <a:schemeClr val="tx1"/>
-                </a:solidFill>
-                <a:latin typeface="Times New Roman" pitchFamily="18" charset="0"/>
-                <a:ea typeface="+mn-ea"/>
-                <a:cs typeface="+mn-cs"/>
-              </a:rPr>
-              <a:t>Anzahl</a:t>
-            </a:r>
-            <a:r>
-              <a:rPr lang="en-GB" sz="1200" kern="1200" dirty="0" smtClean="0">
-                <a:solidFill>
-                  <a:schemeClr val="tx1"/>
-                </a:solidFill>
-                <a:latin typeface="Times New Roman" pitchFamily="18" charset="0"/>
-                <a:ea typeface="+mn-ea"/>
-                <a:cs typeface="+mn-cs"/>
-              </a:rPr>
-              <a:t> </a:t>
-            </a:r>
-            <a:r>
-              <a:rPr lang="en-GB" sz="1200" kern="1200" dirty="0" err="1" smtClean="0">
-                <a:solidFill>
-                  <a:schemeClr val="tx1"/>
-                </a:solidFill>
-                <a:latin typeface="Times New Roman" pitchFamily="18" charset="0"/>
-                <a:ea typeface="+mn-ea"/>
-                <a:cs typeface="+mn-cs"/>
-              </a:rPr>
-              <a:t>der</a:t>
-            </a:r>
-            <a:r>
-              <a:rPr lang="en-GB" sz="1200" kern="1200" dirty="0" smtClean="0">
-                <a:solidFill>
-                  <a:schemeClr val="tx1"/>
-                </a:solidFill>
-                <a:latin typeface="Times New Roman" pitchFamily="18" charset="0"/>
-                <a:ea typeface="+mn-ea"/>
-                <a:cs typeface="+mn-cs"/>
-              </a:rPr>
-              <a:t> </a:t>
-            </a:r>
-            <a:r>
-              <a:rPr lang="en-GB" sz="1200" kern="1200" dirty="0" err="1" smtClean="0">
-                <a:solidFill>
-                  <a:schemeClr val="tx1"/>
-                </a:solidFill>
-                <a:latin typeface="Times New Roman" pitchFamily="18" charset="0"/>
-                <a:ea typeface="+mn-ea"/>
-                <a:cs typeface="+mn-cs"/>
-              </a:rPr>
-              <a:t>Internetnutzer</a:t>
-            </a:r>
-            <a:r>
-              <a:rPr lang="en-GB" sz="1200" kern="1200" baseline="0" dirty="0" smtClean="0">
-                <a:solidFill>
-                  <a:schemeClr val="tx1"/>
-                </a:solidFill>
-                <a:latin typeface="Times New Roman" pitchFamily="18" charset="0"/>
-                <a:ea typeface="+mn-ea"/>
-                <a:cs typeface="+mn-cs"/>
-              </a:rPr>
-              <a:t> </a:t>
-            </a:r>
-            <a:r>
-              <a:rPr lang="en-GB" sz="1200" kern="1200" dirty="0" smtClean="0">
-                <a:solidFill>
-                  <a:schemeClr val="tx1"/>
-                </a:solidFill>
-                <a:latin typeface="Times New Roman" pitchFamily="18" charset="0"/>
-                <a:ea typeface="+mn-ea"/>
-                <a:cs typeface="+mn-cs"/>
-              </a:rPr>
-              <a:t>um</a:t>
-            </a:r>
-            <a:r>
-              <a:rPr lang="en-GB" sz="1200" kern="1200" baseline="0" dirty="0" smtClean="0">
-                <a:solidFill>
-                  <a:schemeClr val="tx1"/>
-                </a:solidFill>
-                <a:latin typeface="Times New Roman" pitchFamily="18" charset="0"/>
-                <a:ea typeface="+mn-ea"/>
-                <a:cs typeface="+mn-cs"/>
-              </a:rPr>
-              <a:t> </a:t>
-            </a:r>
-            <a:r>
-              <a:rPr lang="en-GB" sz="1200" kern="1200" dirty="0" smtClean="0">
-                <a:solidFill>
-                  <a:schemeClr val="tx1"/>
-                </a:solidFill>
-                <a:latin typeface="Times New Roman" pitchFamily="18" charset="0"/>
-                <a:ea typeface="+mn-ea"/>
-                <a:cs typeface="+mn-cs"/>
-              </a:rPr>
-              <a:t>15%</a:t>
-            </a:r>
-            <a:r>
-              <a:rPr lang="en-GB" sz="1200" kern="1200" baseline="0" dirty="0" smtClean="0">
-                <a:solidFill>
-                  <a:schemeClr val="tx1"/>
-                </a:solidFill>
-                <a:latin typeface="Times New Roman" pitchFamily="18" charset="0"/>
-                <a:ea typeface="+mn-ea"/>
-                <a:cs typeface="+mn-cs"/>
-              </a:rPr>
-              <a:t> </a:t>
-            </a:r>
-            <a:r>
-              <a:rPr lang="en-GB" sz="1200" kern="1200" dirty="0" err="1" smtClean="0">
-                <a:solidFill>
-                  <a:schemeClr val="tx1"/>
-                </a:solidFill>
-                <a:latin typeface="Times New Roman" pitchFamily="18" charset="0"/>
-                <a:ea typeface="+mn-ea"/>
-                <a:cs typeface="+mn-cs"/>
-              </a:rPr>
-              <a:t>zu</a:t>
-            </a:r>
-            <a:r>
-              <a:rPr lang="de-DE" baseline="0" dirty="0" smtClean="0"/>
-              <a:t>)</a:t>
-            </a:r>
-          </a:p>
-          <a:p>
-            <a:r>
-              <a:rPr lang="de-DE" baseline="0" dirty="0" smtClean="0"/>
-              <a:t>-EU möchte Ausstoß bis 2020 auf 80% des Stands von 1990 erreichen(ca. 60% Reduktion)</a:t>
-            </a:r>
-          </a:p>
-          <a:p>
-            <a:r>
-              <a:rPr lang="de-DE" baseline="0" dirty="0" smtClean="0"/>
-              <a:t>*Klick*</a:t>
-            </a:r>
-          </a:p>
-          <a:p>
-            <a:r>
-              <a:rPr lang="de-DE" baseline="0" dirty="0" smtClean="0"/>
-              <a:t>-Potenzial da IT-eine stark unterstützende Funktion bietet</a:t>
-            </a:r>
             <a:endParaRPr lang="de-DE" dirty="0"/>
           </a:p>
         </p:txBody>
@@ -1408,6 +1050,88 @@
               <a:rPr lang="de-DE" smtClean="0"/>
               <a:pPr/>
               <a:t>3</a:t>
+            </a:fld>
+            <a:endParaRPr lang="de-DE"/>
+          </a:p>
+        </p:txBody>
+      </p:sp>
+    </p:spTree>
+  </p:cSld>
+  <p:clrMapOvr>
+    <a:masterClrMapping/>
+  </p:clrMapOvr>
+</p:notes>
+</file>
+
+<file path=ppt/notesSlides/notesSlide4.xml><?xml version="1.0" encoding="utf-8"?>
+<p:notes xmlns:a="http://schemas.openxmlformats.org/drawingml/2006/main" xmlns:r="http://schemas.openxmlformats.org/officeDocument/2006/relationships" xmlns:p="http://schemas.openxmlformats.org/presentationml/2006/main">
+  <p:cSld>
+    <p:spTree>
+      <p:nvGrpSpPr>
+        <p:cNvPr id="1" name=""/>
+        <p:cNvGrpSpPr/>
+        <p:nvPr/>
+      </p:nvGrpSpPr>
+      <p:grpSpPr>
+        <a:xfrm>
+          <a:off x="0" y="0"/>
+          <a:ext cx="0" cy="0"/>
+          <a:chOff x="0" y="0"/>
+          <a:chExt cx="0" cy="0"/>
+        </a:xfrm>
+      </p:grpSpPr>
+      <p:sp>
+        <p:nvSpPr>
+          <p:cNvPr id="2" name="Folienbildplatzhalter 1"/>
+          <p:cNvSpPr>
+            <a:spLocks noGrp="1" noRot="1" noChangeAspect="1"/>
+          </p:cNvSpPr>
+          <p:nvPr>
+            <p:ph type="sldImg"/>
+          </p:nvPr>
+        </p:nvSpPr>
+        <p:spPr/>
+      </p:sp>
+      <p:sp>
+        <p:nvSpPr>
+          <p:cNvPr id="3" name="Notizenplatzhalter 2"/>
+          <p:cNvSpPr>
+            <a:spLocks noGrp="1"/>
+          </p:cNvSpPr>
+          <p:nvPr>
+            <p:ph type="body" idx="1"/>
+          </p:nvPr>
+        </p:nvSpPr>
+        <p:spPr/>
+        <p:txBody>
+          <a:bodyPr>
+            <a:normAutofit/>
+          </a:bodyPr>
+          <a:lstStyle/>
+          <a:p>
+            <a:endParaRPr lang="de-DE" dirty="0"/>
+          </a:p>
+        </p:txBody>
+      </p:sp>
+      <p:sp>
+        <p:nvSpPr>
+          <p:cNvPr id="4" name="Foliennummernplatzhalter 3"/>
+          <p:cNvSpPr>
+            <a:spLocks noGrp="1"/>
+          </p:cNvSpPr>
+          <p:nvPr>
+            <p:ph type="sldNum" sz="quarter" idx="10"/>
+          </p:nvPr>
+        </p:nvSpPr>
+        <p:spPr/>
+        <p:txBody>
+          <a:bodyPr/>
+          <a:lstStyle/>
+          <a:p>
+            <a:fld id="{A8D0068F-0A1E-4566-8068-BF0F15B844D2}" type="slidenum">
+              <a:rPr lang="de-DE" smtClean="0"/>
+              <a:pPr/>
+              <a:t>4</a:t>
             </a:fld>
             <a:endParaRPr lang="de-DE"/>
           </a:p>
@@ -3501,7 +3225,7 @@
         <p:spPr bwMode="auto">
           <a:xfrm>
             <a:off x="317500" y="6583363"/>
-            <a:ext cx="2454300" cy="274637"/>
+            <a:ext cx="3678436" cy="276999"/>
           </a:xfrm>
           <a:prstGeom prst="rect">
             <a:avLst/>
@@ -3533,7 +3257,7 @@
                 </a:solidFill>
                 <a:ea typeface="ＭＳ Ｐゴシック" pitchFamily="1" charset="-128"/>
               </a:rPr>
-              <a:t>Roland Peyerl – BA 3. Semester</a:t>
+              <a:t>Sabine Lück, Daniel Wandrowec, Roland Peyerl</a:t>
             </a:r>
             <a:endParaRPr lang="de-DE" sz="1200" b="0" dirty="0">
               <a:solidFill>
@@ -3736,50 +3460,6 @@
       </p:sp>
       <p:sp>
         <p:nvSpPr>
-          <p:cNvPr id="16" name="Textfeld 15"/>
-          <p:cNvSpPr txBox="1"/>
-          <p:nvPr userDrawn="1"/>
-        </p:nvSpPr>
-        <p:spPr>
-          <a:xfrm>
-            <a:off x="3347864" y="6597352"/>
-            <a:ext cx="2232248" cy="276999"/>
-          </a:xfrm>
-          <a:prstGeom prst="rect">
-            <a:avLst/>
-          </a:prstGeom>
-          <a:noFill/>
-        </p:spPr>
-        <p:txBody>
-          <a:bodyPr wrap="square" rtlCol="0">
-            <a:spAutoFit/>
-          </a:bodyPr>
-          <a:lstStyle/>
-          <a:p>
-            <a:pPr algn="ctr" rtl="0" eaLnBrk="0" fontAlgn="base" hangingPunct="0">
-              <a:spcBef>
-                <a:spcPct val="50000"/>
-              </a:spcBef>
-              <a:spcAft>
-                <a:spcPct val="0"/>
-              </a:spcAft>
-            </a:pPr>
-            <a:r>
-              <a:rPr lang="en-GB" sz="1200" b="0" kern="1200" dirty="0" smtClean="0">
-                <a:solidFill>
-                  <a:srgbClr val="003B79"/>
-                </a:solidFill>
-                <a:latin typeface="Arial" charset="0"/>
-                <a:ea typeface="ＭＳ Ｐゴシック" pitchFamily="1" charset="-128"/>
-                <a:cs typeface="+mn-cs"/>
-              </a:rPr>
-              <a:t>Green IT</a:t>
-            </a:r>
-          </a:p>
-        </p:txBody>
-      </p:sp>
-      <p:sp>
-        <p:nvSpPr>
           <p:cNvPr id="18" name="Textfeld 17"/>
           <p:cNvSpPr txBox="1"/>
           <p:nvPr userDrawn="1"/>
@@ -3817,7 +3497,7 @@
                 <a:ea typeface="ＭＳ Ｐゴシック" pitchFamily="1" charset="-128"/>
                 <a:cs typeface="+mn-cs"/>
               </a:rPr>
-              <a:t>18.12.2012</a:t>
+              <a:t>29.04.2013</a:t>
             </a:r>
           </a:p>
         </p:txBody>
@@ -4256,15 +3936,7 @@
             </a:br>
             <a:r>
               <a:rPr lang="de-DE" sz="4400" dirty="0" smtClean="0"/>
-              <a:t>Anbindung </a:t>
-            </a:r>
-            <a:r>
-              <a:rPr lang="de-DE" sz="4400" dirty="0" smtClean="0"/>
-              <a:t>eines webbasierten </a:t>
-            </a:r>
-            <a:r>
-              <a:rPr lang="de-DE" sz="4400" dirty="0" smtClean="0"/>
-              <a:t>Artikelversands</a:t>
+              <a:t>Anbindung eines webbasierten Artikelversands</a:t>
             </a:r>
             <a:r>
               <a:rPr lang="de-DE" sz="6000" dirty="0" smtClean="0"/>
@@ -4566,14 +4238,6 @@
               </a:rPr>
               <a:t>7. Arbeitsaufteilung</a:t>
             </a:r>
-            <a:endParaRPr lang="de-DE" sz="3200" dirty="0" smtClean="0">
-              <a:solidFill>
-                <a:srgbClr val="003B79"/>
-              </a:solidFill>
-              <a:latin typeface="+mj-lt"/>
-              <a:ea typeface="+mj-ea"/>
-              <a:cs typeface="+mj-cs"/>
-            </a:endParaRPr>
           </a:p>
         </p:txBody>
       </p:sp>
@@ -4813,16 +4477,7 @@
                 </a:solidFill>
                 <a:latin typeface="+mn-lt"/>
               </a:rPr>
-              <a:t>	</a:t>
-            </a:r>
-            <a:r>
-              <a:rPr lang="de-DE" sz="2400" b="0" kern="0" dirty="0" smtClean="0">
-                <a:solidFill>
-                  <a:srgbClr val="003B79"/>
-                </a:solidFill>
-                <a:latin typeface="+mn-lt"/>
-              </a:rPr>
-              <a:t>		-Datenbankschnittstelle</a:t>
+              <a:t>			-Datenbankschnittstelle</a:t>
             </a:r>
           </a:p>
           <a:p>
@@ -4874,16 +4529,7 @@
                 </a:solidFill>
                 <a:latin typeface="+mn-lt"/>
               </a:rPr>
-              <a:t>	</a:t>
-            </a:r>
-            <a:r>
-              <a:rPr lang="de-DE" sz="2400" b="0" kern="0" dirty="0" smtClean="0">
-                <a:solidFill>
-                  <a:srgbClr val="003B79"/>
-                </a:solidFill>
-                <a:latin typeface="+mn-lt"/>
-              </a:rPr>
-              <a:t>		-Test-GUI</a:t>
+              <a:t>			-Test-GUI</a:t>
             </a:r>
           </a:p>
           <a:p>
@@ -4958,16 +4604,7 @@
                 </a:solidFill>
                 <a:latin typeface="+mn-lt"/>
               </a:rPr>
-              <a:t>	</a:t>
-            </a:r>
-            <a:r>
-              <a:rPr lang="de-DE" sz="2400" b="0" kern="0" dirty="0" smtClean="0">
-                <a:solidFill>
-                  <a:srgbClr val="003B79"/>
-                </a:solidFill>
-                <a:latin typeface="+mn-lt"/>
-              </a:rPr>
-              <a:t>		-Rechnungen</a:t>
+              <a:t>			-Rechnungen</a:t>
             </a:r>
           </a:p>
           <a:p>
@@ -4993,16 +4630,7 @@
                 </a:solidFill>
                 <a:latin typeface="+mn-lt"/>
               </a:rPr>
-              <a:t>	</a:t>
-            </a:r>
-            <a:r>
-              <a:rPr lang="de-DE" sz="2400" b="0" kern="0" dirty="0" smtClean="0">
-                <a:solidFill>
-                  <a:srgbClr val="003B79"/>
-                </a:solidFill>
-                <a:latin typeface="+mn-lt"/>
-              </a:rPr>
-              <a:t>		-UML-Klassen-Diagramm</a:t>
+              <a:t>			-UML-Klassen-Diagramm</a:t>
             </a:r>
           </a:p>
           <a:p>
@@ -5085,8 +4713,282 @@
                 <a:ea typeface="+mn-ea"/>
                 <a:cs typeface="+mn-cs"/>
               </a:rPr>
-              <a:t>	</a:t>
-            </a:r>
+              <a:t>			-Testen			</a:t>
+            </a:r>
+          </a:p>
+        </p:txBody>
+      </p:sp>
+    </p:spTree>
+  </p:cSld>
+  <p:clrMapOvr>
+    <a:masterClrMapping/>
+  </p:clrMapOvr>
+  <p:timing>
+    <p:tnLst>
+      <p:par>
+        <p:cTn id="1" dur="indefinite" restart="never" nodeType="tmRoot"/>
+      </p:par>
+    </p:tnLst>
+  </p:timing>
+</p:sld>
+</file>
+
+<file path=ppt/slides/slide4.xml><?xml version="1.0" encoding="utf-8"?>
+<p:sld xmlns:a="http://schemas.openxmlformats.org/drawingml/2006/main" xmlns:r="http://schemas.openxmlformats.org/officeDocument/2006/relationships" xmlns:p="http://schemas.openxmlformats.org/presentationml/2006/main">
+  <p:cSld>
+    <p:spTree>
+      <p:nvGrpSpPr>
+        <p:cNvPr id="1" name=""/>
+        <p:cNvGrpSpPr/>
+        <p:nvPr/>
+      </p:nvGrpSpPr>
+      <p:grpSpPr>
+        <a:xfrm>
+          <a:off x="0" y="0"/>
+          <a:ext cx="0" cy="0"/>
+          <a:chOff x="0" y="0"/>
+          <a:chExt cx="0" cy="0"/>
+        </a:xfrm>
+      </p:grpSpPr>
+      <p:sp>
+        <p:nvSpPr>
+          <p:cNvPr id="4" name="Rectangle 2"/>
+          <p:cNvSpPr txBox="1">
+            <a:spLocks noChangeArrowheads="1"/>
+          </p:cNvSpPr>
+          <p:nvPr/>
+        </p:nvSpPr>
+        <p:spPr>
+          <a:xfrm>
+            <a:off x="323626" y="357188"/>
+            <a:ext cx="6624638" cy="503237"/>
+          </a:xfrm>
+          <a:prstGeom prst="rect">
+            <a:avLst/>
+          </a:prstGeom>
+        </p:spPr>
+        <p:txBody>
+          <a:bodyPr/>
+          <a:lstStyle/>
+          <a:p>
+            <a:pPr marL="457200" lvl="0" indent="-457200" algn="l"/>
+            <a:r>
+              <a:rPr lang="de-DE" sz="3200" dirty="0" smtClean="0">
+                <a:solidFill>
+                  <a:srgbClr val="003B79"/>
+                </a:solidFill>
+                <a:latin typeface="+mj-lt"/>
+                <a:ea typeface="+mj-ea"/>
+                <a:cs typeface="+mj-cs"/>
+              </a:rPr>
+              <a:t>8. Zeitplan</a:t>
+            </a:r>
+            <a:endParaRPr lang="de-DE" sz="3200" dirty="0" smtClean="0">
+              <a:solidFill>
+                <a:srgbClr val="003B79"/>
+              </a:solidFill>
+              <a:latin typeface="+mj-lt"/>
+              <a:ea typeface="+mj-ea"/>
+              <a:cs typeface="+mj-cs"/>
+            </a:endParaRPr>
+          </a:p>
+        </p:txBody>
+      </p:sp>
+      <p:sp>
+        <p:nvSpPr>
+          <p:cNvPr id="5" name="Rectangle 4"/>
+          <p:cNvSpPr txBox="1">
+            <a:spLocks noChangeArrowheads="1"/>
+          </p:cNvSpPr>
+          <p:nvPr/>
+        </p:nvSpPr>
+        <p:spPr>
+          <a:xfrm>
+            <a:off x="323850" y="1052736"/>
+            <a:ext cx="8568630" cy="5545137"/>
+          </a:xfrm>
+          <a:prstGeom prst="rect">
+            <a:avLst/>
+          </a:prstGeom>
+        </p:spPr>
+        <p:txBody>
+          <a:bodyPr/>
+          <a:lstStyle/>
+          <a:p>
+            <a:pPr marL="742950" marR="0" lvl="1" indent="-285750" algn="l" defTabSz="914400" rtl="0" eaLnBrk="1" fontAlgn="base" latinLnBrk="0" hangingPunct="1">
+              <a:lnSpc>
+                <a:spcPct val="100000"/>
+              </a:lnSpc>
+              <a:spcBef>
+                <a:spcPct val="20000"/>
+              </a:spcBef>
+              <a:spcAft>
+                <a:spcPct val="20000"/>
+              </a:spcAft>
+              <a:buClrTx/>
+              <a:buSzTx/>
+              <a:tabLst/>
+              <a:defRPr/>
+            </a:pPr>
+            <a:endParaRPr lang="de-DE" sz="2400" b="0" kern="0" dirty="0" smtClean="0">
+              <a:solidFill>
+                <a:srgbClr val="003B79"/>
+              </a:solidFill>
+              <a:latin typeface="+mn-lt"/>
+            </a:endParaRPr>
+          </a:p>
+          <a:p>
+            <a:pPr marL="742950" lvl="1" indent="-285750" algn="l">
+              <a:spcBef>
+                <a:spcPct val="20000"/>
+              </a:spcBef>
+              <a:spcAft>
+                <a:spcPct val="20000"/>
+              </a:spcAft>
+            </a:pPr>
+            <a:endParaRPr lang="de-DE" sz="2400" b="0" kern="0" dirty="0">
+              <a:solidFill>
+                <a:srgbClr val="003B79"/>
+              </a:solidFill>
+              <a:latin typeface="+mn-lt"/>
+            </a:endParaRPr>
+          </a:p>
+          <a:p>
+            <a:pPr marL="742950" marR="0" lvl="1" indent="-285750" algn="l" defTabSz="914400" rtl="0" eaLnBrk="1" fontAlgn="base" latinLnBrk="0" hangingPunct="1">
+              <a:lnSpc>
+                <a:spcPct val="100000"/>
+              </a:lnSpc>
+              <a:spcBef>
+                <a:spcPct val="20000"/>
+              </a:spcBef>
+              <a:spcAft>
+                <a:spcPct val="20000"/>
+              </a:spcAft>
+              <a:buClrTx/>
+              <a:buSzTx/>
+              <a:tabLst/>
+              <a:defRPr/>
+            </a:pPr>
+            <a:endParaRPr lang="de-DE" sz="2400" b="0" kern="0" dirty="0">
+              <a:solidFill>
+                <a:srgbClr val="003B79"/>
+              </a:solidFill>
+              <a:latin typeface="+mn-lt"/>
+            </a:endParaRPr>
+          </a:p>
+          <a:p>
+            <a:pPr marL="742950" marR="0" lvl="1" indent="-285750" algn="l" defTabSz="914400" rtl="0" eaLnBrk="1" fontAlgn="base" latinLnBrk="0" hangingPunct="1">
+              <a:lnSpc>
+                <a:spcPct val="100000"/>
+              </a:lnSpc>
+              <a:spcBef>
+                <a:spcPct val="20000"/>
+              </a:spcBef>
+              <a:spcAft>
+                <a:spcPct val="20000"/>
+              </a:spcAft>
+              <a:buClrTx/>
+              <a:buSzTx/>
+              <a:tabLst/>
+              <a:defRPr/>
+            </a:pPr>
+            <a:endParaRPr lang="de-DE" sz="2400" b="0" kern="0" dirty="0" smtClean="0">
+              <a:solidFill>
+                <a:srgbClr val="003B79"/>
+              </a:solidFill>
+              <a:latin typeface="+mn-lt"/>
+            </a:endParaRPr>
+          </a:p>
+          <a:p>
+            <a:pPr marL="742950" marR="0" lvl="1" indent="-285750" algn="l" defTabSz="914400" rtl="0" eaLnBrk="1" fontAlgn="base" latinLnBrk="0" hangingPunct="1">
+              <a:lnSpc>
+                <a:spcPct val="100000"/>
+              </a:lnSpc>
+              <a:spcBef>
+                <a:spcPct val="20000"/>
+              </a:spcBef>
+              <a:spcAft>
+                <a:spcPct val="20000"/>
+              </a:spcAft>
+              <a:buClrTx/>
+              <a:buSzTx/>
+              <a:tabLst/>
+              <a:defRPr/>
+            </a:pPr>
+            <a:endParaRPr lang="de-DE" sz="2400" b="0" kern="0" dirty="0">
+              <a:solidFill>
+                <a:srgbClr val="003B79"/>
+              </a:solidFill>
+              <a:latin typeface="+mn-lt"/>
+            </a:endParaRPr>
+          </a:p>
+          <a:p>
+            <a:pPr marL="742950" marR="0" lvl="1" indent="-285750" algn="l" defTabSz="914400" rtl="0" eaLnBrk="1" fontAlgn="base" latinLnBrk="0" hangingPunct="1">
+              <a:lnSpc>
+                <a:spcPct val="100000"/>
+              </a:lnSpc>
+              <a:spcBef>
+                <a:spcPct val="20000"/>
+              </a:spcBef>
+              <a:spcAft>
+                <a:spcPct val="20000"/>
+              </a:spcAft>
+              <a:buClrTx/>
+              <a:buSzTx/>
+              <a:tabLst/>
+              <a:defRPr/>
+            </a:pPr>
+            <a:endParaRPr kumimoji="0" lang="de-DE" sz="2400" b="0" i="0" u="none" strike="noStrike" kern="0" cap="none" spc="0" normalizeH="0" baseline="0" noProof="0" dirty="0" smtClean="0">
+              <a:ln>
+                <a:noFill/>
+              </a:ln>
+              <a:solidFill>
+                <a:srgbClr val="003B79"/>
+              </a:solidFill>
+              <a:effectLst/>
+              <a:uLnTx/>
+              <a:uFillTx/>
+              <a:latin typeface="+mn-lt"/>
+            </a:endParaRPr>
+          </a:p>
+        </p:txBody>
+      </p:sp>
+      <p:sp>
+        <p:nvSpPr>
+          <p:cNvPr id="9" name="Rectangle 4"/>
+          <p:cNvSpPr txBox="1">
+            <a:spLocks noChangeArrowheads="1"/>
+          </p:cNvSpPr>
+          <p:nvPr/>
+        </p:nvSpPr>
+        <p:spPr>
+          <a:xfrm>
+            <a:off x="792410" y="1052736"/>
+            <a:ext cx="8820150" cy="5545137"/>
+          </a:xfrm>
+          <a:prstGeom prst="rect">
+            <a:avLst/>
+          </a:prstGeom>
+        </p:spPr>
+        <p:txBody>
+          <a:bodyPr/>
+          <a:lstStyle/>
+          <a:p>
+            <a:pPr marL="457200" marR="0" lvl="0" indent="-457200" algn="l" defTabSz="914400" rtl="0" eaLnBrk="1" fontAlgn="base" latinLnBrk="0" hangingPunct="1">
+              <a:lnSpc>
+                <a:spcPct val="100000"/>
+              </a:lnSpc>
+              <a:spcBef>
+                <a:spcPct val="20000"/>
+              </a:spcBef>
+              <a:spcAft>
+                <a:spcPct val="20000"/>
+              </a:spcAft>
+              <a:buClrTx/>
+              <a:buSzTx/>
+              <a:tabLst/>
+              <a:defRPr/>
+            </a:pPr>
             <a:r>
               <a:rPr kumimoji="0" lang="de-DE" sz="2400" b="0" i="0" u="none" strike="noStrike" kern="0" cap="none" spc="0" normalizeH="0" baseline="0" noProof="0" dirty="0" smtClean="0">
                 <a:ln>
@@ -5102,7 +5004,7 @@
                 <a:ea typeface="+mn-ea"/>
                 <a:cs typeface="+mn-cs"/>
               </a:rPr>
-              <a:t>		-Testen			</a:t>
+              <a:t>			</a:t>
             </a:r>
           </a:p>
         </p:txBody>

</xml_diff>

<commit_message>
Lastenheft und Präsentation so gut wie fertig Weiter Aufgeräumt, da Inhalte der Dateien im Lastenheft und der Präsentation vorhanden sind
</commit_message>
<xml_diff>
--- a/Präsentation PRG4.pptx
+++ b/Präsentation PRG4.pptx
@@ -5,10 +5,10 @@
     <p:sldMasterId id="2147483660" r:id="rId1"/>
   </p:sldMasterIdLst>
   <p:notesMasterIdLst>
-    <p:notesMasterId r:id="rId16"/>
+    <p:notesMasterId r:id="rId19"/>
   </p:notesMasterIdLst>
   <p:handoutMasterIdLst>
-    <p:handoutMasterId r:id="rId17"/>
+    <p:handoutMasterId r:id="rId20"/>
   </p:handoutMasterIdLst>
   <p:sldIdLst>
     <p:sldId id="257" r:id="rId2"/>
@@ -16,15 +16,18 @@
     <p:sldId id="265" r:id="rId4"/>
     <p:sldId id="272" r:id="rId5"/>
     <p:sldId id="266" r:id="rId6"/>
-    <p:sldId id="262" r:id="rId7"/>
-    <p:sldId id="267" r:id="rId8"/>
-    <p:sldId id="268" r:id="rId9"/>
-    <p:sldId id="269" r:id="rId10"/>
-    <p:sldId id="270" r:id="rId11"/>
-    <p:sldId id="271" r:id="rId12"/>
-    <p:sldId id="263" r:id="rId13"/>
-    <p:sldId id="260" r:id="rId14"/>
-    <p:sldId id="261" r:id="rId15"/>
+    <p:sldId id="273" r:id="rId7"/>
+    <p:sldId id="274" r:id="rId8"/>
+    <p:sldId id="275" r:id="rId9"/>
+    <p:sldId id="262" r:id="rId10"/>
+    <p:sldId id="267" r:id="rId11"/>
+    <p:sldId id="268" r:id="rId12"/>
+    <p:sldId id="269" r:id="rId13"/>
+    <p:sldId id="270" r:id="rId14"/>
+    <p:sldId id="271" r:id="rId15"/>
+    <p:sldId id="263" r:id="rId16"/>
+    <p:sldId id="260" r:id="rId17"/>
+    <p:sldId id="261" r:id="rId18"/>
   </p:sldIdLst>
   <p:sldSz cx="9144000" cy="6858000" type="screen4x3"/>
   <p:notesSz cx="6858000" cy="9144000"/>
@@ -5747,49 +5750,21 @@
       </p:grpSpPr>
       <p:sp>
         <p:nvSpPr>
-          <p:cNvPr id="7" name="Rectangle 7"/>
+          <p:cNvPr id="2" name="Folienbildplatzhalter 1"/>
           <p:cNvSpPr>
-            <a:spLocks noGrp="1" noChangeArrowheads="1"/>
-          </p:cNvSpPr>
-          <p:nvPr>
-            <p:ph type="sldNum" sz="quarter" idx="5"/>
-          </p:nvPr>
-        </p:nvSpPr>
-        <p:spPr>
-          <a:ln/>
-        </p:spPr>
-        <p:txBody>
-          <a:bodyPr/>
-          <a:lstStyle/>
-          <a:p>
-            <a:fld id="{53EF9097-0A76-4396-87AC-3BDA4F5A0772}" type="slidenum">
-              <a:rPr lang="de-DE"/>
-              <a:pPr/>
-              <a:t>12</a:t>
-            </a:fld>
-            <a:endParaRPr lang="de-DE"/>
-          </a:p>
-        </p:txBody>
-      </p:sp>
-      <p:sp>
-        <p:nvSpPr>
-          <p:cNvPr id="8771586" name="Rectangle 2"/>
-          <p:cNvSpPr>
-            <a:spLocks noGrp="1" noRot="1" noChangeAspect="1" noChangeArrowheads="1" noTextEdit="1"/>
+            <a:spLocks noGrp="1" noRot="1" noChangeAspect="1"/>
           </p:cNvSpPr>
           <p:nvPr>
             <p:ph type="sldImg"/>
           </p:nvPr>
         </p:nvSpPr>
-        <p:spPr>
-          <a:ln/>
-        </p:spPr>
+        <p:spPr/>
       </p:sp>
       <p:sp>
         <p:nvSpPr>
-          <p:cNvPr id="8771587" name="Rectangle 3"/>
+          <p:cNvPr id="3" name="Notizenplatzhalter 2"/>
           <p:cNvSpPr>
-            <a:spLocks noGrp="1" noChangeArrowheads="1"/>
+            <a:spLocks noGrp="1"/>
           </p:cNvSpPr>
           <p:nvPr>
             <p:ph type="body" idx="1"/>
@@ -5797,10 +5772,36 @@
         </p:nvSpPr>
         <p:spPr/>
         <p:txBody>
+          <a:bodyPr>
+            <a:normAutofit/>
+          </a:bodyPr>
+          <a:lstStyle/>
+          <a:p>
+            <a:endParaRPr lang="de-DE" dirty="0"/>
+          </a:p>
+        </p:txBody>
+      </p:sp>
+      <p:sp>
+        <p:nvSpPr>
+          <p:cNvPr id="4" name="Foliennummernplatzhalter 3"/>
+          <p:cNvSpPr>
+            <a:spLocks noGrp="1"/>
+          </p:cNvSpPr>
+          <p:nvPr>
+            <p:ph type="sldNum" sz="quarter" idx="10"/>
+          </p:nvPr>
+        </p:nvSpPr>
+        <p:spPr/>
+        <p:txBody>
           <a:bodyPr/>
           <a:lstStyle/>
           <a:p>
-            <a:endParaRPr lang="de-DE" dirty="0"/>
+            <a:fld id="{A8D0068F-0A1E-4566-8068-BF0F15B844D2}" type="slidenum">
+              <a:rPr lang="de-DE" smtClean="0"/>
+              <a:pPr/>
+              <a:t>12</a:t>
+            </a:fld>
+            <a:endParaRPr lang="de-DE"/>
           </a:p>
         </p:txBody>
       </p:sp>
@@ -5976,6 +5977,254 @@
 </p:notes>
 </file>
 
+<file path=ppt/notesSlides/notesSlide15.xml><?xml version="1.0" encoding="utf-8"?>
+<p:notes xmlns:a="http://schemas.openxmlformats.org/drawingml/2006/main" xmlns:r="http://schemas.openxmlformats.org/officeDocument/2006/relationships" xmlns:p="http://schemas.openxmlformats.org/presentationml/2006/main">
+  <p:cSld>
+    <p:spTree>
+      <p:nvGrpSpPr>
+        <p:cNvPr id="1" name=""/>
+        <p:cNvGrpSpPr/>
+        <p:nvPr/>
+      </p:nvGrpSpPr>
+      <p:grpSpPr>
+        <a:xfrm>
+          <a:off x="0" y="0"/>
+          <a:ext cx="0" cy="0"/>
+          <a:chOff x="0" y="0"/>
+          <a:chExt cx="0" cy="0"/>
+        </a:xfrm>
+      </p:grpSpPr>
+      <p:sp>
+        <p:nvSpPr>
+          <p:cNvPr id="7" name="Rectangle 7"/>
+          <p:cNvSpPr>
+            <a:spLocks noGrp="1" noChangeArrowheads="1"/>
+          </p:cNvSpPr>
+          <p:nvPr>
+            <p:ph type="sldNum" sz="quarter" idx="5"/>
+          </p:nvPr>
+        </p:nvSpPr>
+        <p:spPr>
+          <a:ln/>
+        </p:spPr>
+        <p:txBody>
+          <a:bodyPr/>
+          <a:lstStyle/>
+          <a:p>
+            <a:fld id="{53EF9097-0A76-4396-87AC-3BDA4F5A0772}" type="slidenum">
+              <a:rPr lang="de-DE"/>
+              <a:pPr/>
+              <a:t>15</a:t>
+            </a:fld>
+            <a:endParaRPr lang="de-DE"/>
+          </a:p>
+        </p:txBody>
+      </p:sp>
+      <p:sp>
+        <p:nvSpPr>
+          <p:cNvPr id="8771586" name="Rectangle 2"/>
+          <p:cNvSpPr>
+            <a:spLocks noGrp="1" noRot="1" noChangeAspect="1" noChangeArrowheads="1" noTextEdit="1"/>
+          </p:cNvSpPr>
+          <p:nvPr>
+            <p:ph type="sldImg"/>
+          </p:nvPr>
+        </p:nvSpPr>
+        <p:spPr>
+          <a:ln/>
+        </p:spPr>
+      </p:sp>
+      <p:sp>
+        <p:nvSpPr>
+          <p:cNvPr id="8771587" name="Rectangle 3"/>
+          <p:cNvSpPr>
+            <a:spLocks noGrp="1" noChangeArrowheads="1"/>
+          </p:cNvSpPr>
+          <p:nvPr>
+            <p:ph type="body" idx="1"/>
+          </p:nvPr>
+        </p:nvSpPr>
+        <p:spPr/>
+        <p:txBody>
+          <a:bodyPr/>
+          <a:lstStyle/>
+          <a:p>
+            <a:endParaRPr lang="de-DE" dirty="0"/>
+          </a:p>
+        </p:txBody>
+      </p:sp>
+    </p:spTree>
+  </p:cSld>
+  <p:clrMapOvr>
+    <a:masterClrMapping/>
+  </p:clrMapOvr>
+</p:notes>
+</file>
+
+<file path=ppt/notesSlides/notesSlide16.xml><?xml version="1.0" encoding="utf-8"?>
+<p:notes xmlns:a="http://schemas.openxmlformats.org/drawingml/2006/main" xmlns:r="http://schemas.openxmlformats.org/officeDocument/2006/relationships" xmlns:p="http://schemas.openxmlformats.org/presentationml/2006/main">
+  <p:cSld>
+    <p:spTree>
+      <p:nvGrpSpPr>
+        <p:cNvPr id="1" name=""/>
+        <p:cNvGrpSpPr/>
+        <p:nvPr/>
+      </p:nvGrpSpPr>
+      <p:grpSpPr>
+        <a:xfrm>
+          <a:off x="0" y="0"/>
+          <a:ext cx="0" cy="0"/>
+          <a:chOff x="0" y="0"/>
+          <a:chExt cx="0" cy="0"/>
+        </a:xfrm>
+      </p:grpSpPr>
+      <p:sp>
+        <p:nvSpPr>
+          <p:cNvPr id="2" name="Folienbildplatzhalter 1"/>
+          <p:cNvSpPr>
+            <a:spLocks noGrp="1" noRot="1" noChangeAspect="1"/>
+          </p:cNvSpPr>
+          <p:nvPr>
+            <p:ph type="sldImg"/>
+          </p:nvPr>
+        </p:nvSpPr>
+        <p:spPr/>
+      </p:sp>
+      <p:sp>
+        <p:nvSpPr>
+          <p:cNvPr id="3" name="Notizenplatzhalter 2"/>
+          <p:cNvSpPr>
+            <a:spLocks noGrp="1"/>
+          </p:cNvSpPr>
+          <p:nvPr>
+            <p:ph type="body" idx="1"/>
+          </p:nvPr>
+        </p:nvSpPr>
+        <p:spPr/>
+        <p:txBody>
+          <a:bodyPr>
+            <a:normAutofit/>
+          </a:bodyPr>
+          <a:lstStyle/>
+          <a:p>
+            <a:endParaRPr lang="de-DE" dirty="0"/>
+          </a:p>
+        </p:txBody>
+      </p:sp>
+      <p:sp>
+        <p:nvSpPr>
+          <p:cNvPr id="4" name="Foliennummernplatzhalter 3"/>
+          <p:cNvSpPr>
+            <a:spLocks noGrp="1"/>
+          </p:cNvSpPr>
+          <p:nvPr>
+            <p:ph type="sldNum" sz="quarter" idx="10"/>
+          </p:nvPr>
+        </p:nvSpPr>
+        <p:spPr/>
+        <p:txBody>
+          <a:bodyPr/>
+          <a:lstStyle/>
+          <a:p>
+            <a:fld id="{A8D0068F-0A1E-4566-8068-BF0F15B844D2}" type="slidenum">
+              <a:rPr lang="de-DE" smtClean="0"/>
+              <a:pPr/>
+              <a:t>16</a:t>
+            </a:fld>
+            <a:endParaRPr lang="de-DE"/>
+          </a:p>
+        </p:txBody>
+      </p:sp>
+    </p:spTree>
+  </p:cSld>
+  <p:clrMapOvr>
+    <a:masterClrMapping/>
+  </p:clrMapOvr>
+</p:notes>
+</file>
+
+<file path=ppt/notesSlides/notesSlide17.xml><?xml version="1.0" encoding="utf-8"?>
+<p:notes xmlns:a="http://schemas.openxmlformats.org/drawingml/2006/main" xmlns:r="http://schemas.openxmlformats.org/officeDocument/2006/relationships" xmlns:p="http://schemas.openxmlformats.org/presentationml/2006/main">
+  <p:cSld>
+    <p:spTree>
+      <p:nvGrpSpPr>
+        <p:cNvPr id="1" name=""/>
+        <p:cNvGrpSpPr/>
+        <p:nvPr/>
+      </p:nvGrpSpPr>
+      <p:grpSpPr>
+        <a:xfrm>
+          <a:off x="0" y="0"/>
+          <a:ext cx="0" cy="0"/>
+          <a:chOff x="0" y="0"/>
+          <a:chExt cx="0" cy="0"/>
+        </a:xfrm>
+      </p:grpSpPr>
+      <p:sp>
+        <p:nvSpPr>
+          <p:cNvPr id="2" name="Folienbildplatzhalter 1"/>
+          <p:cNvSpPr>
+            <a:spLocks noGrp="1" noRot="1" noChangeAspect="1"/>
+          </p:cNvSpPr>
+          <p:nvPr>
+            <p:ph type="sldImg"/>
+          </p:nvPr>
+        </p:nvSpPr>
+        <p:spPr/>
+      </p:sp>
+      <p:sp>
+        <p:nvSpPr>
+          <p:cNvPr id="3" name="Notizenplatzhalter 2"/>
+          <p:cNvSpPr>
+            <a:spLocks noGrp="1"/>
+          </p:cNvSpPr>
+          <p:nvPr>
+            <p:ph type="body" idx="1"/>
+          </p:nvPr>
+        </p:nvSpPr>
+        <p:spPr/>
+        <p:txBody>
+          <a:bodyPr>
+            <a:normAutofit/>
+          </a:bodyPr>
+          <a:lstStyle/>
+          <a:p>
+            <a:endParaRPr lang="de-DE" dirty="0"/>
+          </a:p>
+        </p:txBody>
+      </p:sp>
+      <p:sp>
+        <p:nvSpPr>
+          <p:cNvPr id="4" name="Foliennummernplatzhalter 3"/>
+          <p:cNvSpPr>
+            <a:spLocks noGrp="1"/>
+          </p:cNvSpPr>
+          <p:nvPr>
+            <p:ph type="sldNum" sz="quarter" idx="10"/>
+          </p:nvPr>
+        </p:nvSpPr>
+        <p:spPr/>
+        <p:txBody>
+          <a:bodyPr/>
+          <a:lstStyle/>
+          <a:p>
+            <a:fld id="{A8D0068F-0A1E-4566-8068-BF0F15B844D2}" type="slidenum">
+              <a:rPr lang="de-DE" smtClean="0"/>
+              <a:pPr/>
+              <a:t>17</a:t>
+            </a:fld>
+            <a:endParaRPr lang="de-DE"/>
+          </a:p>
+        </p:txBody>
+      </p:sp>
+    </p:spTree>
+  </p:cSld>
+  <p:clrMapOvr>
+    <a:masterClrMapping/>
+  </p:clrMapOvr>
+</p:notes>
+</file>
+
 <file path=ppt/notesSlides/notesSlide2.xml><?xml version="1.0" encoding="utf-8"?>
 <p:notes xmlns:a="http://schemas.openxmlformats.org/drawingml/2006/main" xmlns:r="http://schemas.openxmlformats.org/officeDocument/2006/relationships" xmlns:p="http://schemas.openxmlformats.org/presentationml/2006/main">
   <p:cSld>
@@ -6325,49 +6574,21 @@
       </p:grpSpPr>
       <p:sp>
         <p:nvSpPr>
-          <p:cNvPr id="7" name="Rectangle 7"/>
+          <p:cNvPr id="2" name="Folienbildplatzhalter 1"/>
           <p:cNvSpPr>
-            <a:spLocks noGrp="1" noChangeArrowheads="1"/>
-          </p:cNvSpPr>
-          <p:nvPr>
-            <p:ph type="sldNum" sz="quarter" idx="5"/>
-          </p:nvPr>
-        </p:nvSpPr>
-        <p:spPr>
-          <a:ln/>
-        </p:spPr>
-        <p:txBody>
-          <a:bodyPr/>
-          <a:lstStyle/>
-          <a:p>
-            <a:fld id="{53EF9097-0A76-4396-87AC-3BDA4F5A0772}" type="slidenum">
-              <a:rPr lang="de-DE"/>
-              <a:pPr/>
-              <a:t>6</a:t>
-            </a:fld>
-            <a:endParaRPr lang="de-DE"/>
-          </a:p>
-        </p:txBody>
-      </p:sp>
-      <p:sp>
-        <p:nvSpPr>
-          <p:cNvPr id="8771586" name="Rectangle 2"/>
-          <p:cNvSpPr>
-            <a:spLocks noGrp="1" noRot="1" noChangeAspect="1" noChangeArrowheads="1" noTextEdit="1"/>
+            <a:spLocks noGrp="1" noRot="1" noChangeAspect="1"/>
           </p:cNvSpPr>
           <p:nvPr>
             <p:ph type="sldImg"/>
           </p:nvPr>
         </p:nvSpPr>
-        <p:spPr>
-          <a:ln/>
-        </p:spPr>
+        <p:spPr/>
       </p:sp>
       <p:sp>
         <p:nvSpPr>
-          <p:cNvPr id="8771587" name="Rectangle 3"/>
+          <p:cNvPr id="3" name="Notizenplatzhalter 2"/>
           <p:cNvSpPr>
-            <a:spLocks noGrp="1" noChangeArrowheads="1"/>
+            <a:spLocks noGrp="1"/>
           </p:cNvSpPr>
           <p:nvPr>
             <p:ph type="body" idx="1"/>
@@ -6375,71 +6596,36 @@
         </p:nvSpPr>
         <p:spPr/>
         <p:txBody>
+          <a:bodyPr>
+            <a:normAutofit/>
+          </a:bodyPr>
+          <a:lstStyle/>
+          <a:p>
+            <a:endParaRPr lang="de-DE" dirty="0"/>
+          </a:p>
+        </p:txBody>
+      </p:sp>
+      <p:sp>
+        <p:nvSpPr>
+          <p:cNvPr id="4" name="Foliennummernplatzhalter 3"/>
+          <p:cNvSpPr>
+            <a:spLocks noGrp="1"/>
+          </p:cNvSpPr>
+          <p:nvPr>
+            <p:ph type="sldNum" sz="quarter" idx="10"/>
+          </p:nvPr>
+        </p:nvSpPr>
+        <p:spPr/>
+        <p:txBody>
           <a:bodyPr/>
           <a:lstStyle/>
           <a:p>
-            <a:r>
-              <a:rPr lang="de-DE" dirty="0" smtClean="0"/>
-              <a:t>3-SchichtenModel</a:t>
-            </a:r>
-          </a:p>
-          <a:p>
-            <a:endParaRPr lang="de-DE" dirty="0" smtClean="0"/>
-          </a:p>
-          <a:p>
-            <a:r>
-              <a:rPr lang="de-DE" dirty="0" smtClean="0"/>
-              <a:t>Frontend: GUI – Übernimmt</a:t>
-            </a:r>
-            <a:r>
-              <a:rPr lang="de-DE" baseline="0" dirty="0" smtClean="0"/>
-              <a:t> anzeige der verschiedenen </a:t>
-            </a:r>
-            <a:r>
-              <a:rPr lang="de-DE" baseline="0" dirty="0" err="1" smtClean="0"/>
-              <a:t>Seitenfür</a:t>
-            </a:r>
-            <a:r>
-              <a:rPr lang="de-DE" baseline="0" dirty="0" smtClean="0"/>
-              <a:t> In- und Output (z.B. Bestätigungsseite, Erstellung von Produkten,…)</a:t>
-            </a:r>
-          </a:p>
-          <a:p>
-            <a:r>
-              <a:rPr lang="de-DE" dirty="0" smtClean="0"/>
-              <a:t>Backend: Logik</a:t>
-            </a:r>
-            <a:r>
-              <a:rPr lang="de-DE" baseline="0" dirty="0" smtClean="0"/>
-              <a:t> – funktionaler Ablauf des Programmes, besteht aus den Komponenten Angebot, Rechnung, Produkt, Nutzer, Kunde, Anschrift,.. </a:t>
-            </a:r>
-          </a:p>
-          <a:p>
-            <a:r>
-              <a:rPr lang="de-DE" baseline="0" dirty="0" smtClean="0"/>
-              <a:t>Backend: DB – </a:t>
-            </a:r>
-            <a:r>
-              <a:rPr lang="de-DE" baseline="0" dirty="0" err="1" smtClean="0"/>
-              <a:t>speicher</a:t>
-            </a:r>
-            <a:r>
-              <a:rPr lang="de-DE" baseline="0" dirty="0" smtClean="0"/>
-              <a:t> </a:t>
-            </a:r>
-            <a:r>
-              <a:rPr lang="de-DE" baseline="0" dirty="0" err="1" smtClean="0"/>
-              <a:t>verwaltung</a:t>
-            </a:r>
-            <a:r>
-              <a:rPr lang="de-DE" baseline="0" dirty="0" smtClean="0"/>
-              <a:t> wo sich alle </a:t>
-            </a:r>
-            <a:r>
-              <a:rPr lang="de-DE" baseline="0" smtClean="0"/>
-              <a:t>Daten befindet</a:t>
-            </a:r>
-            <a:endParaRPr lang="de-DE" dirty="0"/>
+            <a:fld id="{A8D0068F-0A1E-4566-8068-BF0F15B844D2}" type="slidenum">
+              <a:rPr lang="de-DE" smtClean="0"/>
+              <a:pPr/>
+              <a:t>6</a:t>
+            </a:fld>
+            <a:endParaRPr lang="de-DE"/>
           </a:p>
         </p:txBody>
       </p:sp>
@@ -6634,21 +6820,49 @@
       </p:grpSpPr>
       <p:sp>
         <p:nvSpPr>
-          <p:cNvPr id="2" name="Folienbildplatzhalter 1"/>
+          <p:cNvPr id="7" name="Rectangle 7"/>
           <p:cNvSpPr>
-            <a:spLocks noGrp="1" noRot="1" noChangeAspect="1"/>
+            <a:spLocks noGrp="1" noChangeArrowheads="1"/>
+          </p:cNvSpPr>
+          <p:nvPr>
+            <p:ph type="sldNum" sz="quarter" idx="5"/>
+          </p:nvPr>
+        </p:nvSpPr>
+        <p:spPr>
+          <a:ln/>
+        </p:spPr>
+        <p:txBody>
+          <a:bodyPr/>
+          <a:lstStyle/>
+          <a:p>
+            <a:fld id="{53EF9097-0A76-4396-87AC-3BDA4F5A0772}" type="slidenum">
+              <a:rPr lang="de-DE"/>
+              <a:pPr/>
+              <a:t>9</a:t>
+            </a:fld>
+            <a:endParaRPr lang="de-DE"/>
+          </a:p>
+        </p:txBody>
+      </p:sp>
+      <p:sp>
+        <p:nvSpPr>
+          <p:cNvPr id="8771586" name="Rectangle 2"/>
+          <p:cNvSpPr>
+            <a:spLocks noGrp="1" noRot="1" noChangeAspect="1" noChangeArrowheads="1" noTextEdit="1"/>
           </p:cNvSpPr>
           <p:nvPr>
             <p:ph type="sldImg"/>
           </p:nvPr>
         </p:nvSpPr>
-        <p:spPr/>
+        <p:spPr>
+          <a:ln/>
+        </p:spPr>
       </p:sp>
       <p:sp>
         <p:nvSpPr>
-          <p:cNvPr id="3" name="Notizenplatzhalter 2"/>
+          <p:cNvPr id="8771587" name="Rectangle 3"/>
           <p:cNvSpPr>
-            <a:spLocks noGrp="1"/>
+            <a:spLocks noGrp="1" noChangeArrowheads="1"/>
           </p:cNvSpPr>
           <p:nvPr>
             <p:ph type="body" idx="1"/>
@@ -6656,36 +6870,71 @@
         </p:nvSpPr>
         <p:spPr/>
         <p:txBody>
-          <a:bodyPr>
-            <a:normAutofit/>
-          </a:bodyPr>
-          <a:lstStyle/>
-          <a:p>
-            <a:endParaRPr lang="de-DE" dirty="0"/>
-          </a:p>
-        </p:txBody>
-      </p:sp>
-      <p:sp>
-        <p:nvSpPr>
-          <p:cNvPr id="4" name="Foliennummernplatzhalter 3"/>
-          <p:cNvSpPr>
-            <a:spLocks noGrp="1"/>
-          </p:cNvSpPr>
-          <p:nvPr>
-            <p:ph type="sldNum" sz="quarter" idx="10"/>
-          </p:nvPr>
-        </p:nvSpPr>
-        <p:spPr/>
-        <p:txBody>
           <a:bodyPr/>
           <a:lstStyle/>
           <a:p>
-            <a:fld id="{A8D0068F-0A1E-4566-8068-BF0F15B844D2}" type="slidenum">
-              <a:rPr lang="de-DE" smtClean="0"/>
-              <a:pPr/>
-              <a:t>9</a:t>
-            </a:fld>
-            <a:endParaRPr lang="de-DE"/>
+            <a:r>
+              <a:rPr lang="de-DE" dirty="0" smtClean="0"/>
+              <a:t>3-SchichtenModel</a:t>
+            </a:r>
+          </a:p>
+          <a:p>
+            <a:endParaRPr lang="de-DE" dirty="0" smtClean="0"/>
+          </a:p>
+          <a:p>
+            <a:r>
+              <a:rPr lang="de-DE" dirty="0" smtClean="0"/>
+              <a:t>Frontend: GUI – Übernimmt</a:t>
+            </a:r>
+            <a:r>
+              <a:rPr lang="de-DE" baseline="0" dirty="0" smtClean="0"/>
+              <a:t> anzeige der verschiedenen </a:t>
+            </a:r>
+            <a:r>
+              <a:rPr lang="de-DE" baseline="0" dirty="0" err="1" smtClean="0"/>
+              <a:t>Seitenfür</a:t>
+            </a:r>
+            <a:r>
+              <a:rPr lang="de-DE" baseline="0" dirty="0" smtClean="0"/>
+              <a:t> In- und Output (z.B. Bestätigungsseite, Erstellung von Produkten,…)</a:t>
+            </a:r>
+          </a:p>
+          <a:p>
+            <a:r>
+              <a:rPr lang="de-DE" dirty="0" smtClean="0"/>
+              <a:t>Backend: Logik</a:t>
+            </a:r>
+            <a:r>
+              <a:rPr lang="de-DE" baseline="0" dirty="0" smtClean="0"/>
+              <a:t> – funktionaler Ablauf des Programmes, besteht aus den Komponenten Angebot, Rechnung, Produkt, Nutzer, Kunde, Anschrift,.. </a:t>
+            </a:r>
+          </a:p>
+          <a:p>
+            <a:r>
+              <a:rPr lang="de-DE" baseline="0" dirty="0" smtClean="0"/>
+              <a:t>Backend: DB – </a:t>
+            </a:r>
+            <a:r>
+              <a:rPr lang="de-DE" baseline="0" dirty="0" err="1" smtClean="0"/>
+              <a:t>speicher</a:t>
+            </a:r>
+            <a:r>
+              <a:rPr lang="de-DE" baseline="0" dirty="0" smtClean="0"/>
+              <a:t> </a:t>
+            </a:r>
+            <a:r>
+              <a:rPr lang="de-DE" baseline="0" dirty="0" err="1" smtClean="0"/>
+              <a:t>verwaltung</a:t>
+            </a:r>
+            <a:r>
+              <a:rPr lang="de-DE" baseline="0" dirty="0" smtClean="0"/>
+              <a:t> wo sich alle </a:t>
+            </a:r>
+            <a:r>
+              <a:rPr lang="de-DE" baseline="0" smtClean="0"/>
+              <a:t>Daten befindet</a:t>
+            </a:r>
+            <a:endParaRPr lang="de-DE" dirty="0"/>
           </a:p>
         </p:txBody>
       </p:sp>
@@ -9618,7 +9867,7 @@
                 <a:ea typeface="+mj-ea"/>
                 <a:cs typeface="+mj-cs"/>
               </a:rPr>
-              <a:t>6. </a:t>
+              <a:t>7. </a:t>
             </a:r>
             <a:r>
               <a:rPr lang="de-DE" sz="3200" dirty="0" smtClean="0">
@@ -9629,29 +9878,7 @@
                 <a:ea typeface="+mj-ea"/>
                 <a:cs typeface="+mj-cs"/>
               </a:rPr>
-              <a:t>Datenmodell (</a:t>
-            </a:r>
-            <a:r>
-              <a:rPr lang="de-DE" sz="3200" dirty="0" smtClean="0">
-                <a:solidFill>
-                  <a:srgbClr val="003B79"/>
-                </a:solidFill>
-                <a:latin typeface="+mj-lt"/>
-                <a:ea typeface="+mj-ea"/>
-                <a:cs typeface="+mj-cs"/>
-              </a:rPr>
-              <a:t>UML-Controller</a:t>
-            </a:r>
-            <a:r>
-              <a:rPr lang="de-DE" sz="3200" dirty="0" smtClean="0">
-                <a:solidFill>
-                  <a:srgbClr val="003B79"/>
-                </a:solidFill>
-                <a:latin typeface="+mj-lt"/>
-                <a:ea typeface="+mj-ea"/>
-                <a:cs typeface="+mj-cs"/>
-              </a:rPr>
-              <a:t>)</a:t>
+              <a:t>Datenmodell (UML-Übersicht)</a:t>
             </a:r>
           </a:p>
           <a:p>
@@ -9884,7 +10111,7 @@
       </p:sp>
       <p:pic>
         <p:nvPicPr>
-          <p:cNvPr id="5122" name="Picture 2" descr="E:\PRG4\Grafiken\Controler_State.PNG"/>
+          <p:cNvPr id="2050" name="Picture 2" descr="E:\PRG4\Grafiken\Overall.PNG"/>
           <p:cNvPicPr>
             <a:picLocks noChangeAspect="1" noChangeArrowheads="1"/>
           </p:cNvPicPr>
@@ -9894,7 +10121,7 @@
           <a:blip r:embed="rId3" cstate="print">
             <a:extLst>
               <a:ext uri="{28A0092B-C50C-407E-A947-70E740481C1C}">
-                <a14:useLocalDpi xmlns:a14="http://schemas.microsoft.com/office/drawing/2010/main" xmlns="" val="0"/>
+                <a14:useLocalDpi xmlns="" xmlns:a14="http://schemas.microsoft.com/office/drawing/2010/main" val="0"/>
               </a:ext>
             </a:extLst>
           </a:blip>
@@ -9905,8 +10132,8 @@
         </p:blipFill>
         <p:spPr bwMode="auto">
           <a:xfrm>
-            <a:off x="1673024" y="1339908"/>
-            <a:ext cx="5870281" cy="4970791"/>
+            <a:off x="299008" y="1268760"/>
+            <a:ext cx="7905191" cy="5068540"/>
           </a:xfrm>
           <a:prstGeom prst="rect">
             <a:avLst/>
@@ -9914,7 +10141,7 @@
           <a:noFill/>
           <a:extLst>
             <a:ext uri="{909E8E84-426E-40DD-AFC4-6F175D3DCCD1}">
-              <a14:hiddenFill xmlns:a14="http://schemas.microsoft.com/office/drawing/2010/main" xmlns="">
+              <a14:hiddenFill xmlns="" xmlns:a14="http://schemas.microsoft.com/office/drawing/2010/main">
                 <a:solidFill>
                   <a:srgbClr val="FFFFFF"/>
                 </a:solidFill>
@@ -9926,7 +10153,7 @@
     </p:spTree>
     <p:extLst>
       <p:ext uri="{BB962C8B-B14F-4D97-AF65-F5344CB8AC3E}">
-        <p14:creationId xmlns:p14="http://schemas.microsoft.com/office/powerpoint/2010/main" xmlns="" val="2028648019"/>
+        <p14:creationId xmlns="" xmlns:p14="http://schemas.microsoft.com/office/powerpoint/2010/main" val="3539249763"/>
       </p:ext>
     </p:extLst>
   </p:cSld>
@@ -9991,7 +10218,7 @@
                 <a:ea typeface="+mj-ea"/>
                 <a:cs typeface="+mj-cs"/>
               </a:rPr>
-              <a:t>6. </a:t>
+              <a:t>7. </a:t>
             </a:r>
             <a:r>
               <a:rPr lang="de-DE" sz="3200" dirty="0" smtClean="0">
@@ -10002,7 +10229,7 @@
                 <a:ea typeface="+mj-ea"/>
                 <a:cs typeface="+mj-cs"/>
               </a:rPr>
-              <a:t>Datenmodell (UML-View)</a:t>
+              <a:t>Datenmodell (UML-Model)</a:t>
             </a:r>
           </a:p>
           <a:p>
@@ -10235,7 +10462,7 @@
       </p:sp>
       <p:pic>
         <p:nvPicPr>
-          <p:cNvPr id="6146" name="Picture 2" descr="E:\PRG4\Grafiken\View_Observers.PNG"/>
+          <p:cNvPr id="3074" name="Picture 2" descr="E:\PRG4\Grafiken\Model_Database.PNG"/>
           <p:cNvPicPr>
             <a:picLocks noChangeAspect="1" noChangeArrowheads="1"/>
           </p:cNvPicPr>
@@ -10245,7 +10472,7 @@
           <a:blip r:embed="rId3" cstate="print">
             <a:extLst>
               <a:ext uri="{28A0092B-C50C-407E-A947-70E740481C1C}">
-                <a14:useLocalDpi xmlns:a14="http://schemas.microsoft.com/office/drawing/2010/main" xmlns="" val="0"/>
+                <a14:useLocalDpi xmlns="" xmlns:a14="http://schemas.microsoft.com/office/drawing/2010/main" val="0"/>
               </a:ext>
             </a:extLst>
           </a:blip>
@@ -10256,8 +10483,8 @@
         </p:blipFill>
         <p:spPr bwMode="auto">
           <a:xfrm>
-            <a:off x="654050" y="1741488"/>
-            <a:ext cx="7702550" cy="4235450"/>
+            <a:off x="1259632" y="1232202"/>
+            <a:ext cx="5688632" cy="5186204"/>
           </a:xfrm>
           <a:prstGeom prst="rect">
             <a:avLst/>
@@ -10265,7 +10492,7 @@
           <a:noFill/>
           <a:extLst>
             <a:ext uri="{909E8E84-426E-40DD-AFC4-6F175D3DCCD1}">
-              <a14:hiddenFill xmlns:a14="http://schemas.microsoft.com/office/drawing/2010/main" xmlns="">
+              <a14:hiddenFill xmlns="" xmlns:a14="http://schemas.microsoft.com/office/drawing/2010/main">
                 <a:solidFill>
                   <a:srgbClr val="FFFFFF"/>
                 </a:solidFill>
@@ -10277,7 +10504,7 @@
     </p:spTree>
     <p:extLst>
       <p:ext uri="{BB962C8B-B14F-4D97-AF65-F5344CB8AC3E}">
-        <p14:creationId xmlns:p14="http://schemas.microsoft.com/office/powerpoint/2010/main" xmlns="" val="2223991465"/>
+        <p14:creationId xmlns="" xmlns:p14="http://schemas.microsoft.com/office/powerpoint/2010/main" val="2028648019"/>
       </p:ext>
     </p:extLst>
   </p:cSld>
@@ -10311,151 +10538,324 @@
           <a:chExt cx="0" cy="0"/>
         </a:xfrm>
       </p:grpSpPr>
-      <p:graphicFrame>
-        <p:nvGraphicFramePr>
-          <p:cNvPr id="3" name="Inhaltsplatzhalter 2"/>
-          <p:cNvGraphicFramePr>
-            <a:graphicFrameLocks noGrp="1"/>
-          </p:cNvGraphicFramePr>
-          <p:nvPr>
-            <p:ph idx="1"/>
-            <p:extLst>
-              <p:ext uri="{D42A27DB-BD31-4B8C-83A1-F6EECF244321}">
-                <p14:modId xmlns:p14="http://schemas.microsoft.com/office/powerpoint/2010/main" xmlns="" val="2122085790"/>
-              </p:ext>
-            </p:extLst>
-          </p:nvPr>
-        </p:nvGraphicFramePr>
-        <p:xfrm>
-          <a:off x="216346" y="980728"/>
-          <a:ext cx="8820150" cy="5545137"/>
-        </p:xfrm>
-        <a:graphic>
-          <a:graphicData uri="http://schemas.openxmlformats.org/drawingml/2006/diagram">
-            <dgm:relIds xmlns:dgm="http://schemas.openxmlformats.org/drawingml/2006/diagram" xmlns:r="http://schemas.openxmlformats.org/officeDocument/2006/relationships" r:dm="rId3" r:lo="rId4" r:qs="rId5" r:cs="rId6"/>
-          </a:graphicData>
-        </a:graphic>
-      </p:graphicFrame>
       <p:sp>
         <p:nvSpPr>
-          <p:cNvPr id="8770562" name="Rectangle 2"/>
-          <p:cNvSpPr>
-            <a:spLocks noGrp="1" noChangeArrowheads="1"/>
+          <p:cNvPr id="4" name="Rectangle 2"/>
+          <p:cNvSpPr txBox="1">
+            <a:spLocks noChangeArrowheads="1"/>
           </p:cNvSpPr>
-          <p:nvPr>
-            <p:ph type="title"/>
-          </p:nvPr>
+          <p:nvPr/>
         </p:nvSpPr>
         <p:spPr>
           <a:xfrm>
-            <a:off x="198681" y="321146"/>
+            <a:off x="323626" y="357188"/>
             <a:ext cx="6624638" cy="503237"/>
           </a:xfrm>
+          <a:prstGeom prst="rect">
+            <a:avLst/>
+          </a:prstGeom>
         </p:spPr>
         <p:txBody>
           <a:bodyPr/>
           <a:lstStyle/>
           <a:p>
-            <a:r>
-              <a:rPr lang="de-DE" sz="3200" dirty="0" smtClean="0"/>
-              <a:t>6. Datenmodell (DB-Schema)</a:t>
-            </a:r>
-            <a:endParaRPr lang="de-DE" sz="3200" dirty="0"/>
+            <a:pPr marL="457200" lvl="0" indent="-457200" algn="l"/>
+            <a:r>
+              <a:rPr lang="de-DE" sz="3200" dirty="0" smtClean="0">
+                <a:solidFill>
+                  <a:srgbClr val="003B79"/>
+                </a:solidFill>
+                <a:latin typeface="+mj-lt"/>
+                <a:ea typeface="+mj-ea"/>
+                <a:cs typeface="+mj-cs"/>
+              </a:rPr>
+              <a:t>7. </a:t>
+            </a:r>
+            <a:r>
+              <a:rPr lang="de-DE" sz="3200" dirty="0" smtClean="0">
+                <a:solidFill>
+                  <a:srgbClr val="003B79"/>
+                </a:solidFill>
+                <a:latin typeface="+mj-lt"/>
+                <a:ea typeface="+mj-ea"/>
+                <a:cs typeface="+mj-cs"/>
+              </a:rPr>
+              <a:t>Datenmodell (UML-Model)</a:t>
+            </a:r>
+          </a:p>
+          <a:p>
+            <a:pPr marL="457200" lvl="0" indent="-457200" algn="l"/>
+            <a:endParaRPr lang="de-DE" sz="3200" dirty="0" smtClean="0">
+              <a:solidFill>
+                <a:srgbClr val="003B79"/>
+              </a:solidFill>
+              <a:latin typeface="+mj-lt"/>
+              <a:ea typeface="+mj-ea"/>
+              <a:cs typeface="+mj-cs"/>
+            </a:endParaRPr>
           </a:p>
         </p:txBody>
       </p:sp>
       <p:sp>
         <p:nvSpPr>
-          <p:cNvPr id="4" name="Rechteck 3"/>
-          <p:cNvSpPr/>
+          <p:cNvPr id="5" name="Rectangle 4"/>
+          <p:cNvSpPr txBox="1">
+            <a:spLocks noChangeArrowheads="1"/>
+          </p:cNvSpPr>
           <p:nvPr/>
         </p:nvSpPr>
+        <p:spPr>
+          <a:xfrm>
+            <a:off x="323850" y="1052736"/>
+            <a:ext cx="8568630" cy="5545137"/>
+          </a:xfrm>
+          <a:prstGeom prst="rect">
+            <a:avLst/>
+          </a:prstGeom>
+        </p:spPr>
+        <p:txBody>
+          <a:bodyPr/>
+          <a:lstStyle/>
+          <a:p>
+            <a:pPr marL="742950" marR="0" lvl="1" indent="-285750" algn="l" defTabSz="914400" rtl="0" eaLnBrk="1" fontAlgn="base" latinLnBrk="0" hangingPunct="1">
+              <a:lnSpc>
+                <a:spcPct val="100000"/>
+              </a:lnSpc>
+              <a:spcBef>
+                <a:spcPct val="20000"/>
+              </a:spcBef>
+              <a:spcAft>
+                <a:spcPct val="20000"/>
+              </a:spcAft>
+              <a:buClrTx/>
+              <a:buSzTx/>
+              <a:tabLst/>
+              <a:defRPr/>
+            </a:pPr>
+            <a:endParaRPr lang="de-DE" sz="2400" b="0" kern="0" dirty="0" smtClean="0">
+              <a:solidFill>
+                <a:srgbClr val="003B79"/>
+              </a:solidFill>
+              <a:latin typeface="+mn-lt"/>
+            </a:endParaRPr>
+          </a:p>
+          <a:p>
+            <a:pPr marL="742950" lvl="1" indent="-285750" algn="l">
+              <a:spcBef>
+                <a:spcPct val="20000"/>
+              </a:spcBef>
+              <a:spcAft>
+                <a:spcPct val="20000"/>
+              </a:spcAft>
+            </a:pPr>
+            <a:endParaRPr lang="de-DE" sz="2400" b="0" kern="0" dirty="0">
+              <a:solidFill>
+                <a:srgbClr val="003B79"/>
+              </a:solidFill>
+              <a:latin typeface="+mn-lt"/>
+            </a:endParaRPr>
+          </a:p>
+          <a:p>
+            <a:pPr marL="742950" marR="0" lvl="1" indent="-285750" algn="l" defTabSz="914400" rtl="0" eaLnBrk="1" fontAlgn="base" latinLnBrk="0" hangingPunct="1">
+              <a:lnSpc>
+                <a:spcPct val="100000"/>
+              </a:lnSpc>
+              <a:spcBef>
+                <a:spcPct val="20000"/>
+              </a:spcBef>
+              <a:spcAft>
+                <a:spcPct val="20000"/>
+              </a:spcAft>
+              <a:buClrTx/>
+              <a:buSzTx/>
+              <a:tabLst/>
+              <a:defRPr/>
+            </a:pPr>
+            <a:endParaRPr lang="de-DE" sz="2400" b="0" kern="0" dirty="0">
+              <a:solidFill>
+                <a:srgbClr val="003B79"/>
+              </a:solidFill>
+              <a:latin typeface="+mn-lt"/>
+            </a:endParaRPr>
+          </a:p>
+          <a:p>
+            <a:pPr marL="742950" marR="0" lvl="1" indent="-285750" algn="l" defTabSz="914400" rtl="0" eaLnBrk="1" fontAlgn="base" latinLnBrk="0" hangingPunct="1">
+              <a:lnSpc>
+                <a:spcPct val="100000"/>
+              </a:lnSpc>
+              <a:spcBef>
+                <a:spcPct val="20000"/>
+              </a:spcBef>
+              <a:spcAft>
+                <a:spcPct val="20000"/>
+              </a:spcAft>
+              <a:buClrTx/>
+              <a:buSzTx/>
+              <a:tabLst/>
+              <a:defRPr/>
+            </a:pPr>
+            <a:endParaRPr lang="de-DE" sz="2400" b="0" kern="0" dirty="0" smtClean="0">
+              <a:solidFill>
+                <a:srgbClr val="003B79"/>
+              </a:solidFill>
+              <a:latin typeface="+mn-lt"/>
+            </a:endParaRPr>
+          </a:p>
+          <a:p>
+            <a:pPr marL="742950" marR="0" lvl="1" indent="-285750" algn="l" defTabSz="914400" rtl="0" eaLnBrk="1" fontAlgn="base" latinLnBrk="0" hangingPunct="1">
+              <a:lnSpc>
+                <a:spcPct val="100000"/>
+              </a:lnSpc>
+              <a:spcBef>
+                <a:spcPct val="20000"/>
+              </a:spcBef>
+              <a:spcAft>
+                <a:spcPct val="20000"/>
+              </a:spcAft>
+              <a:buClrTx/>
+              <a:buSzTx/>
+              <a:tabLst/>
+              <a:defRPr/>
+            </a:pPr>
+            <a:endParaRPr lang="de-DE" sz="2400" b="0" kern="0" dirty="0">
+              <a:solidFill>
+                <a:srgbClr val="003B79"/>
+              </a:solidFill>
+              <a:latin typeface="+mn-lt"/>
+            </a:endParaRPr>
+          </a:p>
+          <a:p>
+            <a:pPr marL="742950" marR="0" lvl="1" indent="-285750" algn="l" defTabSz="914400" rtl="0" eaLnBrk="1" fontAlgn="base" latinLnBrk="0" hangingPunct="1">
+              <a:lnSpc>
+                <a:spcPct val="100000"/>
+              </a:lnSpc>
+              <a:spcBef>
+                <a:spcPct val="20000"/>
+              </a:spcBef>
+              <a:spcAft>
+                <a:spcPct val="20000"/>
+              </a:spcAft>
+              <a:buClrTx/>
+              <a:buSzTx/>
+              <a:tabLst/>
+              <a:defRPr/>
+            </a:pPr>
+            <a:endParaRPr kumimoji="0" lang="de-DE" sz="2400" b="0" i="0" u="none" strike="noStrike" kern="0" cap="none" spc="0" normalizeH="0" baseline="0" noProof="0" dirty="0" smtClean="0">
+              <a:ln>
+                <a:noFill/>
+              </a:ln>
+              <a:solidFill>
+                <a:srgbClr val="003B79"/>
+              </a:solidFill>
+              <a:effectLst/>
+              <a:uLnTx/>
+              <a:uFillTx/>
+              <a:latin typeface="+mn-lt"/>
+            </a:endParaRPr>
+          </a:p>
+        </p:txBody>
+      </p:sp>
+      <p:sp>
+        <p:nvSpPr>
+          <p:cNvPr id="9" name="Rectangle 4"/>
+          <p:cNvSpPr txBox="1">
+            <a:spLocks noChangeArrowheads="1"/>
+          </p:cNvSpPr>
+          <p:nvPr/>
+        </p:nvSpPr>
+        <p:spPr>
+          <a:xfrm>
+            <a:off x="792410" y="1052736"/>
+            <a:ext cx="8820150" cy="5545137"/>
+          </a:xfrm>
+          <a:prstGeom prst="rect">
+            <a:avLst/>
+          </a:prstGeom>
+        </p:spPr>
+        <p:txBody>
+          <a:bodyPr/>
+          <a:lstStyle/>
+          <a:p>
+            <a:pPr marL="457200" marR="0" lvl="0" indent="-457200" algn="l" defTabSz="914400" rtl="0" eaLnBrk="1" fontAlgn="base" latinLnBrk="0" hangingPunct="1">
+              <a:lnSpc>
+                <a:spcPct val="100000"/>
+              </a:lnSpc>
+              <a:spcBef>
+                <a:spcPct val="20000"/>
+              </a:spcBef>
+              <a:spcAft>
+                <a:spcPct val="20000"/>
+              </a:spcAft>
+              <a:buClrTx/>
+              <a:buSzTx/>
+              <a:tabLst/>
+              <a:defRPr/>
+            </a:pPr>
+            <a:r>
+              <a:rPr kumimoji="0" lang="de-DE" sz="2400" b="0" i="0" u="none" strike="noStrike" kern="0" cap="none" spc="0" normalizeH="0" baseline="0" noProof="0" dirty="0" smtClean="0">
+                <a:ln>
+                  <a:noFill/>
+                </a:ln>
+                <a:solidFill>
+                  <a:srgbClr val="003B79"/>
+                </a:solidFill>
+                <a:effectLst/>
+                <a:uLnTx/>
+                <a:uFillTx/>
+                <a:latin typeface="+mn-lt"/>
+                <a:ea typeface="+mn-ea"/>
+                <a:cs typeface="+mn-cs"/>
+              </a:rPr>
+              <a:t>			</a:t>
+            </a:r>
+          </a:p>
+        </p:txBody>
+      </p:sp>
+      <p:pic>
+        <p:nvPicPr>
+          <p:cNvPr id="4098" name="Picture 2" descr="E:\PRG4\Grafiken\IO_Database.PNG"/>
+          <p:cNvPicPr>
+            <a:picLocks noChangeAspect="1" noChangeArrowheads="1"/>
+          </p:cNvPicPr>
+          <p:nvPr/>
+        </p:nvPicPr>
+        <p:blipFill>
+          <a:blip r:embed="rId3" cstate="print">
+            <a:extLst>
+              <a:ext uri="{28A0092B-C50C-407E-A947-70E740481C1C}">
+                <a14:useLocalDpi xmlns="" xmlns:a14="http://schemas.microsoft.com/office/drawing/2010/main" val="0"/>
+              </a:ext>
+            </a:extLst>
+          </a:blip>
+          <a:srcRect/>
+          <a:stretch>
+            <a:fillRect/>
+          </a:stretch>
+        </p:blipFill>
         <p:spPr bwMode="auto">
           <a:xfrm>
-            <a:off x="455855" y="3176934"/>
-            <a:ext cx="2520280" cy="1152128"/>
+            <a:off x="715949" y="1988840"/>
+            <a:ext cx="7822897" cy="3024336"/>
           </a:xfrm>
           <a:prstGeom prst="rect">
             <a:avLst/>
           </a:prstGeom>
           <a:noFill/>
-          <a:ln w="9525" cap="flat" cmpd="sng" algn="ctr">
-            <a:noFill/>
-            <a:prstDash val="solid"/>
-            <a:round/>
-            <a:headEnd type="none" w="med" len="med"/>
-            <a:tailEnd type="none" w="med" len="med"/>
-          </a:ln>
-          <a:effectLst/>
-        </p:spPr>
-        <p:txBody>
-          <a:bodyPr vert="horz" wrap="square" lIns="91440" tIns="45720" rIns="91440" bIns="45720" numCol="1" rtlCol="0" anchor="t" anchorCtr="0" compatLnSpc="1">
-            <a:prstTxWarp prst="textNoShape">
-              <a:avLst/>
-            </a:prstTxWarp>
-            <a:spAutoFit/>
-          </a:bodyPr>
-          <a:lstStyle/>
-          <a:p>
-            <a:pPr marL="0" marR="0" indent="0" algn="ctr" defTabSz="914400" rtl="0" eaLnBrk="1" fontAlgn="base" latinLnBrk="0" hangingPunct="1">
-              <a:lnSpc>
-                <a:spcPct val="100000"/>
-              </a:lnSpc>
-              <a:spcBef>
-                <a:spcPct val="0"/>
-              </a:spcBef>
-              <a:spcAft>
-                <a:spcPct val="0"/>
-              </a:spcAft>
-              <a:buClrTx/>
-              <a:buSzTx/>
-              <a:buFontTx/>
-              <a:buNone/>
-              <a:tabLst/>
-            </a:pPr>
-            <a:endParaRPr kumimoji="0" lang="de-DE" sz="1800" b="1" i="0" u="none" strike="noStrike" cap="none" normalizeH="0" baseline="0" smtClean="0">
-              <a:ln>
-                <a:noFill/>
-              </a:ln>
-              <a:solidFill>
-                <a:srgbClr val="FFCC66"/>
-              </a:solidFill>
-              <a:effectLst/>
-              <a:latin typeface="Arial" charset="0"/>
-            </a:endParaRPr>
-          </a:p>
-        </p:txBody>
-      </p:sp>
-      <p:pic>
-        <p:nvPicPr>
-          <p:cNvPr id="6" name="Grafik 5" descr="Datenbankschema.PNG">
-            <a:hlinkClick r:id="rId8" action="ppaction://hlinkfile"/>
-          </p:cNvPr>
-          <p:cNvPicPr>
-            <a:picLocks noChangeAspect="1"/>
-          </p:cNvPicPr>
-          <p:nvPr/>
-        </p:nvPicPr>
-        <p:blipFill>
-          <a:blip r:embed="rId9" cstate="print"/>
-          <a:stretch>
-            <a:fillRect/>
-          </a:stretch>
-        </p:blipFill>
-        <p:spPr>
-          <a:xfrm>
-            <a:off x="1187624" y="1084428"/>
-            <a:ext cx="6696744" cy="5416880"/>
-          </a:xfrm>
-          <a:prstGeom prst="rect">
-            <a:avLst/>
-          </a:prstGeom>
+          <a:extLst>
+            <a:ext uri="{909E8E84-426E-40DD-AFC4-6F175D3DCCD1}">
+              <a14:hiddenFill xmlns="" xmlns:a14="http://schemas.microsoft.com/office/drawing/2010/main">
+                <a:solidFill>
+                  <a:srgbClr val="FFFFFF"/>
+                </a:solidFill>
+              </a14:hiddenFill>
+            </a:ext>
+          </a:extLst>
         </p:spPr>
       </p:pic>
     </p:spTree>
     <p:extLst>
       <p:ext uri="{BB962C8B-B14F-4D97-AF65-F5344CB8AC3E}">
-        <p14:creationId xmlns:p14="http://schemas.microsoft.com/office/powerpoint/2010/main" xmlns="" val="3973953230"/>
+        <p14:creationId xmlns="" xmlns:p14="http://schemas.microsoft.com/office/powerpoint/2010/main" val="2028648019"/>
       </p:ext>
     </p:extLst>
   </p:cSld>
@@ -10520,8 +10920,30 @@
                 <a:ea typeface="+mj-ea"/>
                 <a:cs typeface="+mj-cs"/>
               </a:rPr>
-              <a:t>7. Arbeitsaufteilung</a:t>
-            </a:r>
+              <a:t>7. </a:t>
+            </a:r>
+            <a:r>
+              <a:rPr lang="de-DE" sz="3200" dirty="0" smtClean="0">
+                <a:solidFill>
+                  <a:srgbClr val="003B79"/>
+                </a:solidFill>
+                <a:latin typeface="+mj-lt"/>
+                <a:ea typeface="+mj-ea"/>
+                <a:cs typeface="+mj-cs"/>
+              </a:rPr>
+              <a:t>Datenmodell (UML-Controller)</a:t>
+            </a:r>
+          </a:p>
+          <a:p>
+            <a:pPr marL="457200" lvl="0" indent="-457200" algn="l"/>
+            <a:endParaRPr lang="de-DE" sz="3200" dirty="0" smtClean="0">
+              <a:solidFill>
+                <a:srgbClr val="003B79"/>
+              </a:solidFill>
+              <a:latin typeface="+mj-lt"/>
+              <a:ea typeface="+mj-ea"/>
+              <a:cs typeface="+mj-cs"/>
+            </a:endParaRPr>
           </a:p>
         </p:txBody>
       </p:sp>
@@ -10735,289 +11157,58 @@
                 <a:ea typeface="+mn-ea"/>
                 <a:cs typeface="+mn-cs"/>
               </a:rPr>
-              <a:t>Roland:	-Datenbankmodell</a:t>
-            </a:r>
-          </a:p>
-          <a:p>
-            <a:pPr marL="457200" marR="0" lvl="0" indent="-457200" algn="l" defTabSz="914400" rtl="0" eaLnBrk="1" fontAlgn="base" latinLnBrk="0" hangingPunct="1">
-              <a:lnSpc>
-                <a:spcPct val="100000"/>
-              </a:lnSpc>
-              <a:spcBef>
-                <a:spcPct val="20000"/>
-              </a:spcBef>
-              <a:spcAft>
-                <a:spcPct val="20000"/>
-              </a:spcAft>
-              <a:buClrTx/>
-              <a:buSzTx/>
-              <a:tabLst/>
-              <a:defRPr/>
-            </a:pPr>
-            <a:r>
-              <a:rPr lang="de-DE" sz="2400" b="0" kern="0" dirty="0" smtClean="0">
-                <a:solidFill>
-                  <a:srgbClr val="003B79"/>
-                </a:solidFill>
-                <a:latin typeface="+mn-lt"/>
-              </a:rPr>
-              <a:t>			-Datenbankschnittstelle</a:t>
-            </a:r>
-          </a:p>
-          <a:p>
-            <a:pPr marL="457200" marR="0" lvl="0" indent="-457200" algn="l" defTabSz="914400" rtl="0" eaLnBrk="1" fontAlgn="base" latinLnBrk="0" hangingPunct="1">
-              <a:lnSpc>
-                <a:spcPct val="100000"/>
-              </a:lnSpc>
-              <a:spcBef>
-                <a:spcPct val="20000"/>
-              </a:spcBef>
-              <a:spcAft>
-                <a:spcPct val="20000"/>
-              </a:spcAft>
-              <a:buClrTx/>
-              <a:buSzTx/>
-              <a:tabLst/>
-              <a:defRPr/>
-            </a:pPr>
-            <a:r>
-              <a:rPr lang="de-DE" sz="2400" b="0" kern="0" dirty="0" smtClean="0">
-                <a:solidFill>
-                  <a:srgbClr val="003B79"/>
-                </a:solidFill>
-                <a:latin typeface="+mn-lt"/>
-              </a:rPr>
-              <a:t>Sabine:	-Kontaktbuch</a:t>
-            </a:r>
-          </a:p>
-          <a:p>
-            <a:pPr marL="457200" marR="0" lvl="0" indent="-457200" algn="l" defTabSz="914400" rtl="0" eaLnBrk="1" fontAlgn="base" latinLnBrk="0" hangingPunct="1">
-              <a:lnSpc>
-                <a:spcPct val="100000"/>
-              </a:lnSpc>
-              <a:spcBef>
-                <a:spcPct val="20000"/>
-              </a:spcBef>
-              <a:spcAft>
-                <a:spcPct val="20000"/>
-              </a:spcAft>
-              <a:buClrTx/>
-              <a:buSzTx/>
-              <a:tabLst/>
-              <a:defRPr/>
-            </a:pPr>
-            <a:r>
-              <a:rPr lang="de-DE" sz="2400" b="0" kern="0" dirty="0" smtClean="0">
-                <a:solidFill>
-                  <a:srgbClr val="003B79"/>
-                </a:solidFill>
-                <a:latin typeface="+mn-lt"/>
-              </a:rPr>
-              <a:t>			-Test-GUI</a:t>
-            </a:r>
-          </a:p>
-          <a:p>
-            <a:pPr marL="457200" marR="0" lvl="0" indent="-457200" algn="l" defTabSz="914400" rtl="0" eaLnBrk="1" fontAlgn="base" latinLnBrk="0" hangingPunct="1">
-              <a:lnSpc>
-                <a:spcPct val="100000"/>
-              </a:lnSpc>
-              <a:spcBef>
-                <a:spcPct val="20000"/>
-              </a:spcBef>
-              <a:spcAft>
-                <a:spcPct val="20000"/>
-              </a:spcAft>
-              <a:buClrTx/>
-              <a:buSzTx/>
-              <a:tabLst/>
-              <a:defRPr/>
-            </a:pPr>
-            <a:r>
-              <a:rPr lang="de-DE" sz="2400" b="0" kern="0" dirty="0" smtClean="0">
-                <a:solidFill>
-                  <a:srgbClr val="003B79"/>
-                </a:solidFill>
-                <a:latin typeface="+mn-lt"/>
-              </a:rPr>
-              <a:t>			-Artikel</a:t>
-            </a:r>
-          </a:p>
-          <a:p>
-            <a:pPr marL="457200" marR="0" lvl="0" indent="-457200" algn="l" defTabSz="914400" rtl="0" eaLnBrk="1" fontAlgn="base" latinLnBrk="0" hangingPunct="1">
-              <a:spcBef>
-                <a:spcPct val="20000"/>
-              </a:spcBef>
-              <a:spcAft>
-                <a:spcPct val="20000"/>
-              </a:spcAft>
-              <a:buClrTx/>
-              <a:buSzTx/>
-              <a:tabLst/>
-              <a:defRPr/>
-            </a:pPr>
-            <a:r>
-              <a:rPr lang="de-DE" sz="2400" b="0" kern="0" dirty="0" smtClean="0">
-                <a:solidFill>
-                  <a:srgbClr val="003B79"/>
-                </a:solidFill>
-                <a:latin typeface="+mn-lt"/>
-              </a:rPr>
-              <a:t>Daniel:	-Angebote</a:t>
-            </a:r>
-          </a:p>
-          <a:p>
-            <a:pPr marL="457200" marR="0" lvl="0" indent="-457200" algn="l" defTabSz="914400" rtl="0" eaLnBrk="1" fontAlgn="base" latinLnBrk="0" hangingPunct="1">
-              <a:lnSpc>
-                <a:spcPct val="100000"/>
-              </a:lnSpc>
-              <a:spcBef>
-                <a:spcPct val="20000"/>
-              </a:spcBef>
-              <a:spcAft>
-                <a:spcPct val="20000"/>
-              </a:spcAft>
-              <a:buClrTx/>
-              <a:buSzTx/>
-              <a:tabLst/>
-              <a:defRPr/>
-            </a:pPr>
-            <a:r>
-              <a:rPr lang="de-DE" sz="2400" b="0" kern="0" dirty="0" smtClean="0">
-                <a:solidFill>
-                  <a:srgbClr val="003B79"/>
-                </a:solidFill>
-                <a:latin typeface="+mn-lt"/>
-              </a:rPr>
-              <a:t>			-Rechnungen</a:t>
-            </a:r>
-          </a:p>
-          <a:p>
-            <a:pPr marL="457200" marR="0" lvl="0" indent="-457200" algn="l" defTabSz="914400" rtl="0" eaLnBrk="1" fontAlgn="base" latinLnBrk="0" hangingPunct="1">
-              <a:lnSpc>
-                <a:spcPct val="100000"/>
-              </a:lnSpc>
-              <a:spcBef>
-                <a:spcPct val="20000"/>
-              </a:spcBef>
-              <a:spcAft>
-                <a:spcPct val="20000"/>
-              </a:spcAft>
-              <a:buClrTx/>
-              <a:buSzTx/>
-              <a:tabLst/>
-              <a:defRPr/>
-            </a:pPr>
-            <a:r>
-              <a:rPr lang="de-DE" sz="2400" b="0" kern="0" dirty="0" smtClean="0">
-                <a:solidFill>
-                  <a:srgbClr val="003B79"/>
-                </a:solidFill>
-                <a:latin typeface="+mn-lt"/>
-              </a:rPr>
-              <a:t>			-</a:t>
-            </a:r>
-            <a:r>
-              <a:rPr lang="de-DE" sz="2400" b="0" kern="0" dirty="0" smtClean="0">
-                <a:solidFill>
-                  <a:srgbClr val="003B79"/>
-                </a:solidFill>
-                <a:latin typeface="+mn-lt"/>
-              </a:rPr>
-              <a:t>UML-Diagramme</a:t>
-            </a:r>
-            <a:endParaRPr lang="de-DE" sz="2400" b="0" kern="0" dirty="0" smtClean="0">
-              <a:solidFill>
-                <a:srgbClr val="003B79"/>
-              </a:solidFill>
-              <a:latin typeface="+mn-lt"/>
-            </a:endParaRPr>
-          </a:p>
-          <a:p>
-            <a:pPr marL="457200" marR="0" lvl="0" indent="-457200" algn="l" defTabSz="914400" rtl="0" eaLnBrk="1" fontAlgn="base" latinLnBrk="0" hangingPunct="1">
-              <a:lnSpc>
-                <a:spcPct val="100000"/>
-              </a:lnSpc>
-              <a:spcBef>
-                <a:spcPct val="20000"/>
-              </a:spcBef>
-              <a:spcAft>
-                <a:spcPct val="20000"/>
-              </a:spcAft>
-              <a:buClrTx/>
-              <a:buSzTx/>
-              <a:tabLst/>
-              <a:defRPr/>
-            </a:pPr>
-            <a:endParaRPr lang="de-DE" sz="2400" b="0" kern="0" dirty="0" smtClean="0">
-              <a:solidFill>
-                <a:srgbClr val="003B79"/>
-              </a:solidFill>
-              <a:latin typeface="+mn-lt"/>
-            </a:endParaRPr>
-          </a:p>
-          <a:p>
-            <a:pPr marL="457200" marR="0" lvl="0" indent="-457200" algn="l" defTabSz="914400" rtl="0" eaLnBrk="1" fontAlgn="base" latinLnBrk="0" hangingPunct="1">
-              <a:lnSpc>
-                <a:spcPct val="100000"/>
-              </a:lnSpc>
-              <a:spcBef>
-                <a:spcPct val="20000"/>
-              </a:spcBef>
-              <a:spcAft>
-                <a:spcPct val="20000"/>
-              </a:spcAft>
-              <a:buClrTx/>
-              <a:buSzTx/>
-              <a:tabLst/>
-              <a:defRPr/>
-            </a:pPr>
-            <a:r>
-              <a:rPr lang="de-DE" sz="2400" b="0" kern="0" dirty="0" smtClean="0">
-                <a:solidFill>
-                  <a:srgbClr val="003B79"/>
-                </a:solidFill>
-                <a:latin typeface="+mn-lt"/>
-              </a:rPr>
-              <a:t>Alle:		-Dokumentation</a:t>
-            </a:r>
-          </a:p>
-          <a:p>
-            <a:pPr marL="457200" marR="0" lvl="0" indent="-457200" algn="l" defTabSz="914400" rtl="0" eaLnBrk="1" fontAlgn="base" latinLnBrk="0" hangingPunct="1">
-              <a:lnSpc>
-                <a:spcPct val="100000"/>
-              </a:lnSpc>
-              <a:spcBef>
-                <a:spcPct val="20000"/>
-              </a:spcBef>
-              <a:spcAft>
-                <a:spcPct val="20000"/>
-              </a:spcAft>
-              <a:buClrTx/>
-              <a:buSzTx/>
-              <a:tabLst/>
-              <a:defRPr/>
-            </a:pPr>
-            <a:r>
-              <a:rPr kumimoji="0" lang="de-DE" sz="2400" b="0" i="0" u="none" strike="noStrike" kern="0" cap="none" spc="0" normalizeH="0" baseline="0" noProof="0" dirty="0" smtClean="0">
-                <a:ln>
-                  <a:noFill/>
-                </a:ln>
-                <a:solidFill>
-                  <a:srgbClr val="003B79"/>
-                </a:solidFill>
-                <a:effectLst/>
-                <a:uLnTx/>
-                <a:uFillTx/>
-                <a:latin typeface="+mn-lt"/>
-                <a:ea typeface="+mn-ea"/>
-                <a:cs typeface="+mn-cs"/>
-              </a:rPr>
-              <a:t>			-Testen			</a:t>
+              <a:t>			</a:t>
             </a:r>
           </a:p>
         </p:txBody>
       </p:sp>
+      <p:pic>
+        <p:nvPicPr>
+          <p:cNvPr id="5122" name="Picture 2" descr="E:\PRG4\Grafiken\Controler_State.PNG"/>
+          <p:cNvPicPr>
+            <a:picLocks noChangeAspect="1" noChangeArrowheads="1"/>
+          </p:cNvPicPr>
+          <p:nvPr/>
+        </p:nvPicPr>
+        <p:blipFill>
+          <a:blip r:embed="rId3" cstate="print">
+            <a:extLst>
+              <a:ext uri="{28A0092B-C50C-407E-A947-70E740481C1C}">
+                <a14:useLocalDpi xmlns="" xmlns:a14="http://schemas.microsoft.com/office/drawing/2010/main" val="0"/>
+              </a:ext>
+            </a:extLst>
+          </a:blip>
+          <a:srcRect/>
+          <a:stretch>
+            <a:fillRect/>
+          </a:stretch>
+        </p:blipFill>
+        <p:spPr bwMode="auto">
+          <a:xfrm>
+            <a:off x="1673024" y="1339908"/>
+            <a:ext cx="5870281" cy="4970791"/>
+          </a:xfrm>
+          <a:prstGeom prst="rect">
+            <a:avLst/>
+          </a:prstGeom>
+          <a:noFill/>
+          <a:extLst>
+            <a:ext uri="{909E8E84-426E-40DD-AFC4-6F175D3DCCD1}">
+              <a14:hiddenFill xmlns="" xmlns:a14="http://schemas.microsoft.com/office/drawing/2010/main">
+                <a:solidFill>
+                  <a:srgbClr val="FFFFFF"/>
+                </a:solidFill>
+              </a14:hiddenFill>
+            </a:ext>
+          </a:extLst>
+        </p:spPr>
+      </p:pic>
     </p:spTree>
+    <p:extLst>
+      <p:ext uri="{BB962C8B-B14F-4D97-AF65-F5344CB8AC3E}">
+        <p14:creationId xmlns="" xmlns:p14="http://schemas.microsoft.com/office/powerpoint/2010/main" val="2028648019"/>
+      </p:ext>
+    </p:extLst>
   </p:cSld>
   <p:clrMapOvr>
     <a:masterClrMapping/>
@@ -11080,7 +11271,1107 @@
                 <a:ea typeface="+mj-ea"/>
                 <a:cs typeface="+mj-cs"/>
               </a:rPr>
-              <a:t>8. Zeitplan</a:t>
+              <a:t>7. </a:t>
+            </a:r>
+            <a:r>
+              <a:rPr lang="de-DE" sz="3200" dirty="0" smtClean="0">
+                <a:solidFill>
+                  <a:srgbClr val="003B79"/>
+                </a:solidFill>
+                <a:latin typeface="+mj-lt"/>
+                <a:ea typeface="+mj-ea"/>
+                <a:cs typeface="+mj-cs"/>
+              </a:rPr>
+              <a:t>Datenmodell (UML-View)</a:t>
+            </a:r>
+          </a:p>
+          <a:p>
+            <a:pPr marL="457200" lvl="0" indent="-457200" algn="l"/>
+            <a:endParaRPr lang="de-DE" sz="3200" dirty="0" smtClean="0">
+              <a:solidFill>
+                <a:srgbClr val="003B79"/>
+              </a:solidFill>
+              <a:latin typeface="+mj-lt"/>
+              <a:ea typeface="+mj-ea"/>
+              <a:cs typeface="+mj-cs"/>
+            </a:endParaRPr>
+          </a:p>
+        </p:txBody>
+      </p:sp>
+      <p:sp>
+        <p:nvSpPr>
+          <p:cNvPr id="5" name="Rectangle 4"/>
+          <p:cNvSpPr txBox="1">
+            <a:spLocks noChangeArrowheads="1"/>
+          </p:cNvSpPr>
+          <p:nvPr/>
+        </p:nvSpPr>
+        <p:spPr>
+          <a:xfrm>
+            <a:off x="323850" y="1052736"/>
+            <a:ext cx="8568630" cy="5545137"/>
+          </a:xfrm>
+          <a:prstGeom prst="rect">
+            <a:avLst/>
+          </a:prstGeom>
+        </p:spPr>
+        <p:txBody>
+          <a:bodyPr/>
+          <a:lstStyle/>
+          <a:p>
+            <a:pPr marL="742950" marR="0" lvl="1" indent="-285750" algn="l" defTabSz="914400" rtl="0" eaLnBrk="1" fontAlgn="base" latinLnBrk="0" hangingPunct="1">
+              <a:lnSpc>
+                <a:spcPct val="100000"/>
+              </a:lnSpc>
+              <a:spcBef>
+                <a:spcPct val="20000"/>
+              </a:spcBef>
+              <a:spcAft>
+                <a:spcPct val="20000"/>
+              </a:spcAft>
+              <a:buClrTx/>
+              <a:buSzTx/>
+              <a:tabLst/>
+              <a:defRPr/>
+            </a:pPr>
+            <a:endParaRPr lang="de-DE" sz="2400" b="0" kern="0" dirty="0" smtClean="0">
+              <a:solidFill>
+                <a:srgbClr val="003B79"/>
+              </a:solidFill>
+              <a:latin typeface="+mn-lt"/>
+            </a:endParaRPr>
+          </a:p>
+          <a:p>
+            <a:pPr marL="742950" lvl="1" indent="-285750" algn="l">
+              <a:spcBef>
+                <a:spcPct val="20000"/>
+              </a:spcBef>
+              <a:spcAft>
+                <a:spcPct val="20000"/>
+              </a:spcAft>
+            </a:pPr>
+            <a:endParaRPr lang="de-DE" sz="2400" b="0" kern="0" dirty="0">
+              <a:solidFill>
+                <a:srgbClr val="003B79"/>
+              </a:solidFill>
+              <a:latin typeface="+mn-lt"/>
+            </a:endParaRPr>
+          </a:p>
+          <a:p>
+            <a:pPr marL="742950" marR="0" lvl="1" indent="-285750" algn="l" defTabSz="914400" rtl="0" eaLnBrk="1" fontAlgn="base" latinLnBrk="0" hangingPunct="1">
+              <a:lnSpc>
+                <a:spcPct val="100000"/>
+              </a:lnSpc>
+              <a:spcBef>
+                <a:spcPct val="20000"/>
+              </a:spcBef>
+              <a:spcAft>
+                <a:spcPct val="20000"/>
+              </a:spcAft>
+              <a:buClrTx/>
+              <a:buSzTx/>
+              <a:tabLst/>
+              <a:defRPr/>
+            </a:pPr>
+            <a:endParaRPr lang="de-DE" sz="2400" b="0" kern="0" dirty="0">
+              <a:solidFill>
+                <a:srgbClr val="003B79"/>
+              </a:solidFill>
+              <a:latin typeface="+mn-lt"/>
+            </a:endParaRPr>
+          </a:p>
+          <a:p>
+            <a:pPr marL="742950" marR="0" lvl="1" indent="-285750" algn="l" defTabSz="914400" rtl="0" eaLnBrk="1" fontAlgn="base" latinLnBrk="0" hangingPunct="1">
+              <a:lnSpc>
+                <a:spcPct val="100000"/>
+              </a:lnSpc>
+              <a:spcBef>
+                <a:spcPct val="20000"/>
+              </a:spcBef>
+              <a:spcAft>
+                <a:spcPct val="20000"/>
+              </a:spcAft>
+              <a:buClrTx/>
+              <a:buSzTx/>
+              <a:tabLst/>
+              <a:defRPr/>
+            </a:pPr>
+            <a:endParaRPr lang="de-DE" sz="2400" b="0" kern="0" dirty="0" smtClean="0">
+              <a:solidFill>
+                <a:srgbClr val="003B79"/>
+              </a:solidFill>
+              <a:latin typeface="+mn-lt"/>
+            </a:endParaRPr>
+          </a:p>
+          <a:p>
+            <a:pPr marL="742950" marR="0" lvl="1" indent="-285750" algn="l" defTabSz="914400" rtl="0" eaLnBrk="1" fontAlgn="base" latinLnBrk="0" hangingPunct="1">
+              <a:lnSpc>
+                <a:spcPct val="100000"/>
+              </a:lnSpc>
+              <a:spcBef>
+                <a:spcPct val="20000"/>
+              </a:spcBef>
+              <a:spcAft>
+                <a:spcPct val="20000"/>
+              </a:spcAft>
+              <a:buClrTx/>
+              <a:buSzTx/>
+              <a:tabLst/>
+              <a:defRPr/>
+            </a:pPr>
+            <a:endParaRPr lang="de-DE" sz="2400" b="0" kern="0" dirty="0">
+              <a:solidFill>
+                <a:srgbClr val="003B79"/>
+              </a:solidFill>
+              <a:latin typeface="+mn-lt"/>
+            </a:endParaRPr>
+          </a:p>
+          <a:p>
+            <a:pPr marL="742950" marR="0" lvl="1" indent="-285750" algn="l" defTabSz="914400" rtl="0" eaLnBrk="1" fontAlgn="base" latinLnBrk="0" hangingPunct="1">
+              <a:lnSpc>
+                <a:spcPct val="100000"/>
+              </a:lnSpc>
+              <a:spcBef>
+                <a:spcPct val="20000"/>
+              </a:spcBef>
+              <a:spcAft>
+                <a:spcPct val="20000"/>
+              </a:spcAft>
+              <a:buClrTx/>
+              <a:buSzTx/>
+              <a:tabLst/>
+              <a:defRPr/>
+            </a:pPr>
+            <a:endParaRPr kumimoji="0" lang="de-DE" sz="2400" b="0" i="0" u="none" strike="noStrike" kern="0" cap="none" spc="0" normalizeH="0" baseline="0" noProof="0" dirty="0" smtClean="0">
+              <a:ln>
+                <a:noFill/>
+              </a:ln>
+              <a:solidFill>
+                <a:srgbClr val="003B79"/>
+              </a:solidFill>
+              <a:effectLst/>
+              <a:uLnTx/>
+              <a:uFillTx/>
+              <a:latin typeface="+mn-lt"/>
+            </a:endParaRPr>
+          </a:p>
+        </p:txBody>
+      </p:sp>
+      <p:sp>
+        <p:nvSpPr>
+          <p:cNvPr id="9" name="Rectangle 4"/>
+          <p:cNvSpPr txBox="1">
+            <a:spLocks noChangeArrowheads="1"/>
+          </p:cNvSpPr>
+          <p:nvPr/>
+        </p:nvSpPr>
+        <p:spPr>
+          <a:xfrm>
+            <a:off x="792410" y="1052736"/>
+            <a:ext cx="8820150" cy="5545137"/>
+          </a:xfrm>
+          <a:prstGeom prst="rect">
+            <a:avLst/>
+          </a:prstGeom>
+        </p:spPr>
+        <p:txBody>
+          <a:bodyPr/>
+          <a:lstStyle/>
+          <a:p>
+            <a:pPr marL="457200" marR="0" lvl="0" indent="-457200" algn="l" defTabSz="914400" rtl="0" eaLnBrk="1" fontAlgn="base" latinLnBrk="0" hangingPunct="1">
+              <a:lnSpc>
+                <a:spcPct val="100000"/>
+              </a:lnSpc>
+              <a:spcBef>
+                <a:spcPct val="20000"/>
+              </a:spcBef>
+              <a:spcAft>
+                <a:spcPct val="20000"/>
+              </a:spcAft>
+              <a:buClrTx/>
+              <a:buSzTx/>
+              <a:tabLst/>
+              <a:defRPr/>
+            </a:pPr>
+            <a:r>
+              <a:rPr kumimoji="0" lang="de-DE" sz="2400" b="0" i="0" u="none" strike="noStrike" kern="0" cap="none" spc="0" normalizeH="0" baseline="0" noProof="0" dirty="0" smtClean="0">
+                <a:ln>
+                  <a:noFill/>
+                </a:ln>
+                <a:solidFill>
+                  <a:srgbClr val="003B79"/>
+                </a:solidFill>
+                <a:effectLst/>
+                <a:uLnTx/>
+                <a:uFillTx/>
+                <a:latin typeface="+mn-lt"/>
+                <a:ea typeface="+mn-ea"/>
+                <a:cs typeface="+mn-cs"/>
+              </a:rPr>
+              <a:t>			</a:t>
+            </a:r>
+          </a:p>
+        </p:txBody>
+      </p:sp>
+      <p:pic>
+        <p:nvPicPr>
+          <p:cNvPr id="6146" name="Picture 2" descr="E:\PRG4\Grafiken\View_Observers.PNG"/>
+          <p:cNvPicPr>
+            <a:picLocks noChangeAspect="1" noChangeArrowheads="1"/>
+          </p:cNvPicPr>
+          <p:nvPr/>
+        </p:nvPicPr>
+        <p:blipFill>
+          <a:blip r:embed="rId3" cstate="print">
+            <a:extLst>
+              <a:ext uri="{28A0092B-C50C-407E-A947-70E740481C1C}">
+                <a14:useLocalDpi xmlns="" xmlns:a14="http://schemas.microsoft.com/office/drawing/2010/main" val="0"/>
+              </a:ext>
+            </a:extLst>
+          </a:blip>
+          <a:srcRect/>
+          <a:stretch>
+            <a:fillRect/>
+          </a:stretch>
+        </p:blipFill>
+        <p:spPr bwMode="auto">
+          <a:xfrm>
+            <a:off x="654050" y="1741488"/>
+            <a:ext cx="7702550" cy="4235450"/>
+          </a:xfrm>
+          <a:prstGeom prst="rect">
+            <a:avLst/>
+          </a:prstGeom>
+          <a:noFill/>
+          <a:extLst>
+            <a:ext uri="{909E8E84-426E-40DD-AFC4-6F175D3DCCD1}">
+              <a14:hiddenFill xmlns="" xmlns:a14="http://schemas.microsoft.com/office/drawing/2010/main">
+                <a:solidFill>
+                  <a:srgbClr val="FFFFFF"/>
+                </a:solidFill>
+              </a14:hiddenFill>
+            </a:ext>
+          </a:extLst>
+        </p:spPr>
+      </p:pic>
+    </p:spTree>
+    <p:extLst>
+      <p:ext uri="{BB962C8B-B14F-4D97-AF65-F5344CB8AC3E}">
+        <p14:creationId xmlns="" xmlns:p14="http://schemas.microsoft.com/office/powerpoint/2010/main" val="2223991465"/>
+      </p:ext>
+    </p:extLst>
+  </p:cSld>
+  <p:clrMapOvr>
+    <a:masterClrMapping/>
+  </p:clrMapOvr>
+  <p:timing>
+    <p:tnLst>
+      <p:par>
+        <p:cTn id="1" dur="indefinite" restart="never" nodeType="tmRoot"/>
+      </p:par>
+    </p:tnLst>
+  </p:timing>
+</p:sld>
+</file>
+
+<file path=ppt/slides/slide15.xml><?xml version="1.0" encoding="utf-8"?>
+<p:sld xmlns:a="http://schemas.openxmlformats.org/drawingml/2006/main" xmlns:r="http://schemas.openxmlformats.org/officeDocument/2006/relationships" xmlns:p="http://schemas.openxmlformats.org/presentationml/2006/main">
+  <p:cSld>
+    <p:spTree>
+      <p:nvGrpSpPr>
+        <p:cNvPr id="1" name=""/>
+        <p:cNvGrpSpPr/>
+        <p:nvPr/>
+      </p:nvGrpSpPr>
+      <p:grpSpPr>
+        <a:xfrm>
+          <a:off x="0" y="0"/>
+          <a:ext cx="0" cy="0"/>
+          <a:chOff x="0" y="0"/>
+          <a:chExt cx="0" cy="0"/>
+        </a:xfrm>
+      </p:grpSpPr>
+      <p:graphicFrame>
+        <p:nvGraphicFramePr>
+          <p:cNvPr id="3" name="Inhaltsplatzhalter 2"/>
+          <p:cNvGraphicFramePr>
+            <a:graphicFrameLocks noGrp="1"/>
+          </p:cNvGraphicFramePr>
+          <p:nvPr>
+            <p:ph idx="1"/>
+            <p:extLst>
+              <p:ext uri="{D42A27DB-BD31-4B8C-83A1-F6EECF244321}">
+                <p14:modId xmlns="" xmlns:p14="http://schemas.microsoft.com/office/powerpoint/2010/main" val="2122085790"/>
+              </p:ext>
+            </p:extLst>
+          </p:nvPr>
+        </p:nvGraphicFramePr>
+        <p:xfrm>
+          <a:off x="216346" y="980728"/>
+          <a:ext cx="8820150" cy="5545137"/>
+        </p:xfrm>
+        <a:graphic>
+          <a:graphicData uri="http://schemas.openxmlformats.org/drawingml/2006/diagram">
+            <dgm:relIds xmlns:dgm="http://schemas.openxmlformats.org/drawingml/2006/diagram" xmlns:r="http://schemas.openxmlformats.org/officeDocument/2006/relationships" r:dm="rId3" r:lo="rId4" r:qs="rId5" r:cs="rId6"/>
+          </a:graphicData>
+        </a:graphic>
+      </p:graphicFrame>
+      <p:sp>
+        <p:nvSpPr>
+          <p:cNvPr id="8770562" name="Rectangle 2"/>
+          <p:cNvSpPr>
+            <a:spLocks noGrp="1" noChangeArrowheads="1"/>
+          </p:cNvSpPr>
+          <p:nvPr>
+            <p:ph type="title"/>
+          </p:nvPr>
+        </p:nvSpPr>
+        <p:spPr>
+          <a:xfrm>
+            <a:off x="198681" y="321146"/>
+            <a:ext cx="6624638" cy="503237"/>
+          </a:xfrm>
+        </p:spPr>
+        <p:txBody>
+          <a:bodyPr/>
+          <a:lstStyle/>
+          <a:p>
+            <a:r>
+              <a:rPr lang="de-DE" sz="3200" dirty="0" smtClean="0"/>
+              <a:t>7. </a:t>
+            </a:r>
+            <a:r>
+              <a:rPr lang="de-DE" sz="3200" dirty="0" smtClean="0"/>
+              <a:t>Datenmodell (DB-Schema)</a:t>
+            </a:r>
+            <a:endParaRPr lang="de-DE" sz="3200" dirty="0"/>
+          </a:p>
+        </p:txBody>
+      </p:sp>
+      <p:sp>
+        <p:nvSpPr>
+          <p:cNvPr id="4" name="Rechteck 3"/>
+          <p:cNvSpPr/>
+          <p:nvPr/>
+        </p:nvSpPr>
+        <p:spPr bwMode="auto">
+          <a:xfrm>
+            <a:off x="455855" y="3176934"/>
+            <a:ext cx="2520280" cy="1152128"/>
+          </a:xfrm>
+          <a:prstGeom prst="rect">
+            <a:avLst/>
+          </a:prstGeom>
+          <a:noFill/>
+          <a:ln w="9525" cap="flat" cmpd="sng" algn="ctr">
+            <a:noFill/>
+            <a:prstDash val="solid"/>
+            <a:round/>
+            <a:headEnd type="none" w="med" len="med"/>
+            <a:tailEnd type="none" w="med" len="med"/>
+          </a:ln>
+          <a:effectLst/>
+        </p:spPr>
+        <p:txBody>
+          <a:bodyPr vert="horz" wrap="square" lIns="91440" tIns="45720" rIns="91440" bIns="45720" numCol="1" rtlCol="0" anchor="t" anchorCtr="0" compatLnSpc="1">
+            <a:prstTxWarp prst="textNoShape">
+              <a:avLst/>
+            </a:prstTxWarp>
+            <a:spAutoFit/>
+          </a:bodyPr>
+          <a:lstStyle/>
+          <a:p>
+            <a:pPr marL="0" marR="0" indent="0" algn="ctr" defTabSz="914400" rtl="0" eaLnBrk="1" fontAlgn="base" latinLnBrk="0" hangingPunct="1">
+              <a:lnSpc>
+                <a:spcPct val="100000"/>
+              </a:lnSpc>
+              <a:spcBef>
+                <a:spcPct val="0"/>
+              </a:spcBef>
+              <a:spcAft>
+                <a:spcPct val="0"/>
+              </a:spcAft>
+              <a:buClrTx/>
+              <a:buSzTx/>
+              <a:buFontTx/>
+              <a:buNone/>
+              <a:tabLst/>
+            </a:pPr>
+            <a:endParaRPr kumimoji="0" lang="de-DE" sz="1800" b="1" i="0" u="none" strike="noStrike" cap="none" normalizeH="0" baseline="0" smtClean="0">
+              <a:ln>
+                <a:noFill/>
+              </a:ln>
+              <a:solidFill>
+                <a:srgbClr val="FFCC66"/>
+              </a:solidFill>
+              <a:effectLst/>
+              <a:latin typeface="Arial" charset="0"/>
+            </a:endParaRPr>
+          </a:p>
+        </p:txBody>
+      </p:sp>
+      <p:pic>
+        <p:nvPicPr>
+          <p:cNvPr id="6" name="Grafik 5" descr="Datenbankschema.PNG">
+            <a:hlinkClick r:id="rId8" action="ppaction://hlinkfile"/>
+          </p:cNvPr>
+          <p:cNvPicPr>
+            <a:picLocks noChangeAspect="1"/>
+          </p:cNvPicPr>
+          <p:nvPr/>
+        </p:nvPicPr>
+        <p:blipFill>
+          <a:blip r:embed="rId9" cstate="print"/>
+          <a:stretch>
+            <a:fillRect/>
+          </a:stretch>
+        </p:blipFill>
+        <p:spPr>
+          <a:xfrm>
+            <a:off x="1187624" y="1084428"/>
+            <a:ext cx="6696744" cy="5416880"/>
+          </a:xfrm>
+          <a:prstGeom prst="rect">
+            <a:avLst/>
+          </a:prstGeom>
+        </p:spPr>
+      </p:pic>
+    </p:spTree>
+    <p:extLst>
+      <p:ext uri="{BB962C8B-B14F-4D97-AF65-F5344CB8AC3E}">
+        <p14:creationId xmlns="" xmlns:p14="http://schemas.microsoft.com/office/powerpoint/2010/main" val="3973953230"/>
+      </p:ext>
+    </p:extLst>
+  </p:cSld>
+  <p:clrMapOvr>
+    <a:masterClrMapping/>
+  </p:clrMapOvr>
+  <p:timing>
+    <p:tnLst>
+      <p:par>
+        <p:cTn id="1" dur="indefinite" restart="never" nodeType="tmRoot"/>
+      </p:par>
+    </p:tnLst>
+  </p:timing>
+</p:sld>
+</file>
+
+<file path=ppt/slides/slide16.xml><?xml version="1.0" encoding="utf-8"?>
+<p:sld xmlns:a="http://schemas.openxmlformats.org/drawingml/2006/main" xmlns:r="http://schemas.openxmlformats.org/officeDocument/2006/relationships" xmlns:p="http://schemas.openxmlformats.org/presentationml/2006/main">
+  <p:cSld>
+    <p:spTree>
+      <p:nvGrpSpPr>
+        <p:cNvPr id="1" name=""/>
+        <p:cNvGrpSpPr/>
+        <p:nvPr/>
+      </p:nvGrpSpPr>
+      <p:grpSpPr>
+        <a:xfrm>
+          <a:off x="0" y="0"/>
+          <a:ext cx="0" cy="0"/>
+          <a:chOff x="0" y="0"/>
+          <a:chExt cx="0" cy="0"/>
+        </a:xfrm>
+      </p:grpSpPr>
+      <p:sp>
+        <p:nvSpPr>
+          <p:cNvPr id="4" name="Rectangle 2"/>
+          <p:cNvSpPr txBox="1">
+            <a:spLocks noChangeArrowheads="1"/>
+          </p:cNvSpPr>
+          <p:nvPr/>
+        </p:nvSpPr>
+        <p:spPr>
+          <a:xfrm>
+            <a:off x="323626" y="357188"/>
+            <a:ext cx="6624638" cy="503237"/>
+          </a:xfrm>
+          <a:prstGeom prst="rect">
+            <a:avLst/>
+          </a:prstGeom>
+        </p:spPr>
+        <p:txBody>
+          <a:bodyPr/>
+          <a:lstStyle/>
+          <a:p>
+            <a:pPr marL="457200" lvl="0" indent="-457200" algn="l"/>
+            <a:r>
+              <a:rPr lang="de-DE" sz="3200" dirty="0" smtClean="0">
+                <a:solidFill>
+                  <a:srgbClr val="003B79"/>
+                </a:solidFill>
+                <a:latin typeface="+mj-lt"/>
+                <a:ea typeface="+mj-ea"/>
+                <a:cs typeface="+mj-cs"/>
+              </a:rPr>
+              <a:t>8. </a:t>
+            </a:r>
+            <a:r>
+              <a:rPr lang="de-DE" sz="3200" dirty="0" smtClean="0">
+                <a:solidFill>
+                  <a:srgbClr val="003B79"/>
+                </a:solidFill>
+                <a:latin typeface="+mj-lt"/>
+                <a:ea typeface="+mj-ea"/>
+                <a:cs typeface="+mj-cs"/>
+              </a:rPr>
+              <a:t>Arbeitsaufteilung</a:t>
+            </a:r>
+          </a:p>
+        </p:txBody>
+      </p:sp>
+      <p:sp>
+        <p:nvSpPr>
+          <p:cNvPr id="5" name="Rectangle 4"/>
+          <p:cNvSpPr txBox="1">
+            <a:spLocks noChangeArrowheads="1"/>
+          </p:cNvSpPr>
+          <p:nvPr/>
+        </p:nvSpPr>
+        <p:spPr>
+          <a:xfrm>
+            <a:off x="323850" y="1052736"/>
+            <a:ext cx="8568630" cy="5545137"/>
+          </a:xfrm>
+          <a:prstGeom prst="rect">
+            <a:avLst/>
+          </a:prstGeom>
+        </p:spPr>
+        <p:txBody>
+          <a:bodyPr/>
+          <a:lstStyle/>
+          <a:p>
+            <a:pPr marL="742950" marR="0" lvl="1" indent="-285750" algn="l" defTabSz="914400" rtl="0" eaLnBrk="1" fontAlgn="base" latinLnBrk="0" hangingPunct="1">
+              <a:lnSpc>
+                <a:spcPct val="100000"/>
+              </a:lnSpc>
+              <a:spcBef>
+                <a:spcPct val="20000"/>
+              </a:spcBef>
+              <a:spcAft>
+                <a:spcPct val="20000"/>
+              </a:spcAft>
+              <a:buClrTx/>
+              <a:buSzTx/>
+              <a:tabLst/>
+              <a:defRPr/>
+            </a:pPr>
+            <a:endParaRPr lang="de-DE" sz="2400" b="0" kern="0" dirty="0" smtClean="0">
+              <a:solidFill>
+                <a:srgbClr val="003B79"/>
+              </a:solidFill>
+              <a:latin typeface="+mn-lt"/>
+            </a:endParaRPr>
+          </a:p>
+          <a:p>
+            <a:pPr marL="742950" lvl="1" indent="-285750" algn="l">
+              <a:spcBef>
+                <a:spcPct val="20000"/>
+              </a:spcBef>
+              <a:spcAft>
+                <a:spcPct val="20000"/>
+              </a:spcAft>
+            </a:pPr>
+            <a:endParaRPr lang="de-DE" sz="2400" b="0" kern="0" dirty="0">
+              <a:solidFill>
+                <a:srgbClr val="003B79"/>
+              </a:solidFill>
+              <a:latin typeface="+mn-lt"/>
+            </a:endParaRPr>
+          </a:p>
+          <a:p>
+            <a:pPr marL="742950" marR="0" lvl="1" indent="-285750" algn="l" defTabSz="914400" rtl="0" eaLnBrk="1" fontAlgn="base" latinLnBrk="0" hangingPunct="1">
+              <a:lnSpc>
+                <a:spcPct val="100000"/>
+              </a:lnSpc>
+              <a:spcBef>
+                <a:spcPct val="20000"/>
+              </a:spcBef>
+              <a:spcAft>
+                <a:spcPct val="20000"/>
+              </a:spcAft>
+              <a:buClrTx/>
+              <a:buSzTx/>
+              <a:tabLst/>
+              <a:defRPr/>
+            </a:pPr>
+            <a:endParaRPr lang="de-DE" sz="2400" b="0" kern="0" dirty="0">
+              <a:solidFill>
+                <a:srgbClr val="003B79"/>
+              </a:solidFill>
+              <a:latin typeface="+mn-lt"/>
+            </a:endParaRPr>
+          </a:p>
+          <a:p>
+            <a:pPr marL="742950" marR="0" lvl="1" indent="-285750" algn="l" defTabSz="914400" rtl="0" eaLnBrk="1" fontAlgn="base" latinLnBrk="0" hangingPunct="1">
+              <a:lnSpc>
+                <a:spcPct val="100000"/>
+              </a:lnSpc>
+              <a:spcBef>
+                <a:spcPct val="20000"/>
+              </a:spcBef>
+              <a:spcAft>
+                <a:spcPct val="20000"/>
+              </a:spcAft>
+              <a:buClrTx/>
+              <a:buSzTx/>
+              <a:tabLst/>
+              <a:defRPr/>
+            </a:pPr>
+            <a:endParaRPr lang="de-DE" sz="2400" b="0" kern="0" dirty="0" smtClean="0">
+              <a:solidFill>
+                <a:srgbClr val="003B79"/>
+              </a:solidFill>
+              <a:latin typeface="+mn-lt"/>
+            </a:endParaRPr>
+          </a:p>
+          <a:p>
+            <a:pPr marL="742950" marR="0" lvl="1" indent="-285750" algn="l" defTabSz="914400" rtl="0" eaLnBrk="1" fontAlgn="base" latinLnBrk="0" hangingPunct="1">
+              <a:lnSpc>
+                <a:spcPct val="100000"/>
+              </a:lnSpc>
+              <a:spcBef>
+                <a:spcPct val="20000"/>
+              </a:spcBef>
+              <a:spcAft>
+                <a:spcPct val="20000"/>
+              </a:spcAft>
+              <a:buClrTx/>
+              <a:buSzTx/>
+              <a:tabLst/>
+              <a:defRPr/>
+            </a:pPr>
+            <a:endParaRPr lang="de-DE" sz="2400" b="0" kern="0" dirty="0">
+              <a:solidFill>
+                <a:srgbClr val="003B79"/>
+              </a:solidFill>
+              <a:latin typeface="+mn-lt"/>
+            </a:endParaRPr>
+          </a:p>
+          <a:p>
+            <a:pPr marL="742950" marR="0" lvl="1" indent="-285750" algn="l" defTabSz="914400" rtl="0" eaLnBrk="1" fontAlgn="base" latinLnBrk="0" hangingPunct="1">
+              <a:lnSpc>
+                <a:spcPct val="100000"/>
+              </a:lnSpc>
+              <a:spcBef>
+                <a:spcPct val="20000"/>
+              </a:spcBef>
+              <a:spcAft>
+                <a:spcPct val="20000"/>
+              </a:spcAft>
+              <a:buClrTx/>
+              <a:buSzTx/>
+              <a:tabLst/>
+              <a:defRPr/>
+            </a:pPr>
+            <a:endParaRPr kumimoji="0" lang="de-DE" sz="2400" b="0" i="0" u="none" strike="noStrike" kern="0" cap="none" spc="0" normalizeH="0" baseline="0" noProof="0" dirty="0" smtClean="0">
+              <a:ln>
+                <a:noFill/>
+              </a:ln>
+              <a:solidFill>
+                <a:srgbClr val="003B79"/>
+              </a:solidFill>
+              <a:effectLst/>
+              <a:uLnTx/>
+              <a:uFillTx/>
+              <a:latin typeface="+mn-lt"/>
+            </a:endParaRPr>
+          </a:p>
+        </p:txBody>
+      </p:sp>
+      <p:sp>
+        <p:nvSpPr>
+          <p:cNvPr id="9" name="Rectangle 4"/>
+          <p:cNvSpPr txBox="1">
+            <a:spLocks noChangeArrowheads="1"/>
+          </p:cNvSpPr>
+          <p:nvPr/>
+        </p:nvSpPr>
+        <p:spPr>
+          <a:xfrm>
+            <a:off x="792410" y="1052736"/>
+            <a:ext cx="8820150" cy="5545137"/>
+          </a:xfrm>
+          <a:prstGeom prst="rect">
+            <a:avLst/>
+          </a:prstGeom>
+        </p:spPr>
+        <p:txBody>
+          <a:bodyPr/>
+          <a:lstStyle/>
+          <a:p>
+            <a:pPr marL="457200" marR="0" lvl="0" indent="-457200" algn="l" defTabSz="914400" rtl="0" eaLnBrk="1" fontAlgn="base" latinLnBrk="0" hangingPunct="1">
+              <a:lnSpc>
+                <a:spcPct val="100000"/>
+              </a:lnSpc>
+              <a:spcBef>
+                <a:spcPct val="20000"/>
+              </a:spcBef>
+              <a:spcAft>
+                <a:spcPct val="20000"/>
+              </a:spcAft>
+              <a:buClrTx/>
+              <a:buSzTx/>
+              <a:tabLst/>
+              <a:defRPr/>
+            </a:pPr>
+            <a:r>
+              <a:rPr kumimoji="0" lang="de-DE" sz="2400" b="0" i="0" u="none" strike="noStrike" kern="0" cap="none" spc="0" normalizeH="0" baseline="0" noProof="0" dirty="0" smtClean="0">
+                <a:ln>
+                  <a:noFill/>
+                </a:ln>
+                <a:solidFill>
+                  <a:srgbClr val="003B79"/>
+                </a:solidFill>
+                <a:effectLst/>
+                <a:uLnTx/>
+                <a:uFillTx/>
+                <a:latin typeface="+mn-lt"/>
+                <a:ea typeface="+mn-ea"/>
+                <a:cs typeface="+mn-cs"/>
+              </a:rPr>
+              <a:t>Roland:	-Datenbankmodell</a:t>
+            </a:r>
+          </a:p>
+          <a:p>
+            <a:pPr marL="457200" marR="0" lvl="0" indent="-457200" algn="l" defTabSz="914400" rtl="0" eaLnBrk="1" fontAlgn="base" latinLnBrk="0" hangingPunct="1">
+              <a:lnSpc>
+                <a:spcPct val="100000"/>
+              </a:lnSpc>
+              <a:spcBef>
+                <a:spcPct val="20000"/>
+              </a:spcBef>
+              <a:spcAft>
+                <a:spcPct val="20000"/>
+              </a:spcAft>
+              <a:buClrTx/>
+              <a:buSzTx/>
+              <a:tabLst/>
+              <a:defRPr/>
+            </a:pPr>
+            <a:r>
+              <a:rPr lang="de-DE" sz="2400" b="0" kern="0" dirty="0" smtClean="0">
+                <a:solidFill>
+                  <a:srgbClr val="003B79"/>
+                </a:solidFill>
+                <a:latin typeface="+mn-lt"/>
+              </a:rPr>
+              <a:t>			-Datenbankschnittstelle</a:t>
+            </a:r>
+          </a:p>
+          <a:p>
+            <a:pPr marL="457200" marR="0" lvl="0" indent="-457200" algn="l" defTabSz="914400" rtl="0" eaLnBrk="1" fontAlgn="base" latinLnBrk="0" hangingPunct="1">
+              <a:lnSpc>
+                <a:spcPct val="100000"/>
+              </a:lnSpc>
+              <a:spcBef>
+                <a:spcPct val="20000"/>
+              </a:spcBef>
+              <a:spcAft>
+                <a:spcPct val="20000"/>
+              </a:spcAft>
+              <a:buClrTx/>
+              <a:buSzTx/>
+              <a:tabLst/>
+              <a:defRPr/>
+            </a:pPr>
+            <a:r>
+              <a:rPr lang="de-DE" sz="2400" b="0" kern="0" dirty="0" smtClean="0">
+                <a:solidFill>
+                  <a:srgbClr val="003B79"/>
+                </a:solidFill>
+                <a:latin typeface="+mn-lt"/>
+              </a:rPr>
+              <a:t>Sabine:	-Kontaktbuch</a:t>
+            </a:r>
+          </a:p>
+          <a:p>
+            <a:pPr marL="457200" marR="0" lvl="0" indent="-457200" algn="l" defTabSz="914400" rtl="0" eaLnBrk="1" fontAlgn="base" latinLnBrk="0" hangingPunct="1">
+              <a:lnSpc>
+                <a:spcPct val="100000"/>
+              </a:lnSpc>
+              <a:spcBef>
+                <a:spcPct val="20000"/>
+              </a:spcBef>
+              <a:spcAft>
+                <a:spcPct val="20000"/>
+              </a:spcAft>
+              <a:buClrTx/>
+              <a:buSzTx/>
+              <a:tabLst/>
+              <a:defRPr/>
+            </a:pPr>
+            <a:r>
+              <a:rPr lang="de-DE" sz="2400" b="0" kern="0" dirty="0" smtClean="0">
+                <a:solidFill>
+                  <a:srgbClr val="003B79"/>
+                </a:solidFill>
+                <a:latin typeface="+mn-lt"/>
+              </a:rPr>
+              <a:t>			-Test-GUI</a:t>
+            </a:r>
+          </a:p>
+          <a:p>
+            <a:pPr marL="457200" marR="0" lvl="0" indent="-457200" algn="l" defTabSz="914400" rtl="0" eaLnBrk="1" fontAlgn="base" latinLnBrk="0" hangingPunct="1">
+              <a:lnSpc>
+                <a:spcPct val="100000"/>
+              </a:lnSpc>
+              <a:spcBef>
+                <a:spcPct val="20000"/>
+              </a:spcBef>
+              <a:spcAft>
+                <a:spcPct val="20000"/>
+              </a:spcAft>
+              <a:buClrTx/>
+              <a:buSzTx/>
+              <a:tabLst/>
+              <a:defRPr/>
+            </a:pPr>
+            <a:r>
+              <a:rPr lang="de-DE" sz="2400" b="0" kern="0" dirty="0" smtClean="0">
+                <a:solidFill>
+                  <a:srgbClr val="003B79"/>
+                </a:solidFill>
+                <a:latin typeface="+mn-lt"/>
+              </a:rPr>
+              <a:t>			-Artikel</a:t>
+            </a:r>
+          </a:p>
+          <a:p>
+            <a:pPr marL="457200" marR="0" lvl="0" indent="-457200" algn="l" defTabSz="914400" rtl="0" eaLnBrk="1" fontAlgn="base" latinLnBrk="0" hangingPunct="1">
+              <a:spcBef>
+                <a:spcPct val="20000"/>
+              </a:spcBef>
+              <a:spcAft>
+                <a:spcPct val="20000"/>
+              </a:spcAft>
+              <a:buClrTx/>
+              <a:buSzTx/>
+              <a:tabLst/>
+              <a:defRPr/>
+            </a:pPr>
+            <a:r>
+              <a:rPr lang="de-DE" sz="2400" b="0" kern="0" dirty="0" smtClean="0">
+                <a:solidFill>
+                  <a:srgbClr val="003B79"/>
+                </a:solidFill>
+                <a:latin typeface="+mn-lt"/>
+              </a:rPr>
+              <a:t>Daniel:	-Angebote</a:t>
+            </a:r>
+          </a:p>
+          <a:p>
+            <a:pPr marL="457200" marR="0" lvl="0" indent="-457200" algn="l" defTabSz="914400" rtl="0" eaLnBrk="1" fontAlgn="base" latinLnBrk="0" hangingPunct="1">
+              <a:lnSpc>
+                <a:spcPct val="100000"/>
+              </a:lnSpc>
+              <a:spcBef>
+                <a:spcPct val="20000"/>
+              </a:spcBef>
+              <a:spcAft>
+                <a:spcPct val="20000"/>
+              </a:spcAft>
+              <a:buClrTx/>
+              <a:buSzTx/>
+              <a:tabLst/>
+              <a:defRPr/>
+            </a:pPr>
+            <a:r>
+              <a:rPr lang="de-DE" sz="2400" b="0" kern="0" dirty="0" smtClean="0">
+                <a:solidFill>
+                  <a:srgbClr val="003B79"/>
+                </a:solidFill>
+                <a:latin typeface="+mn-lt"/>
+              </a:rPr>
+              <a:t>			-Rechnungen</a:t>
+            </a:r>
+          </a:p>
+          <a:p>
+            <a:pPr marL="457200" marR="0" lvl="0" indent="-457200" algn="l" defTabSz="914400" rtl="0" eaLnBrk="1" fontAlgn="base" latinLnBrk="0" hangingPunct="1">
+              <a:lnSpc>
+                <a:spcPct val="100000"/>
+              </a:lnSpc>
+              <a:spcBef>
+                <a:spcPct val="20000"/>
+              </a:spcBef>
+              <a:spcAft>
+                <a:spcPct val="20000"/>
+              </a:spcAft>
+              <a:buClrTx/>
+              <a:buSzTx/>
+              <a:tabLst/>
+              <a:defRPr/>
+            </a:pPr>
+            <a:r>
+              <a:rPr lang="de-DE" sz="2400" b="0" kern="0" dirty="0" smtClean="0">
+                <a:solidFill>
+                  <a:srgbClr val="003B79"/>
+                </a:solidFill>
+                <a:latin typeface="+mn-lt"/>
+              </a:rPr>
+              <a:t>			-UML-Diagramme</a:t>
+            </a:r>
+          </a:p>
+          <a:p>
+            <a:pPr marL="457200" marR="0" lvl="0" indent="-457200" algn="l" defTabSz="914400" rtl="0" eaLnBrk="1" fontAlgn="base" latinLnBrk="0" hangingPunct="1">
+              <a:lnSpc>
+                <a:spcPct val="100000"/>
+              </a:lnSpc>
+              <a:spcBef>
+                <a:spcPct val="20000"/>
+              </a:spcBef>
+              <a:spcAft>
+                <a:spcPct val="20000"/>
+              </a:spcAft>
+              <a:buClrTx/>
+              <a:buSzTx/>
+              <a:tabLst/>
+              <a:defRPr/>
+            </a:pPr>
+            <a:endParaRPr lang="de-DE" sz="2400" b="0" kern="0" dirty="0" smtClean="0">
+              <a:solidFill>
+                <a:srgbClr val="003B79"/>
+              </a:solidFill>
+              <a:latin typeface="+mn-lt"/>
+            </a:endParaRPr>
+          </a:p>
+          <a:p>
+            <a:pPr marL="457200" marR="0" lvl="0" indent="-457200" algn="l" defTabSz="914400" rtl="0" eaLnBrk="1" fontAlgn="base" latinLnBrk="0" hangingPunct="1">
+              <a:lnSpc>
+                <a:spcPct val="100000"/>
+              </a:lnSpc>
+              <a:spcBef>
+                <a:spcPct val="20000"/>
+              </a:spcBef>
+              <a:spcAft>
+                <a:spcPct val="20000"/>
+              </a:spcAft>
+              <a:buClrTx/>
+              <a:buSzTx/>
+              <a:tabLst/>
+              <a:defRPr/>
+            </a:pPr>
+            <a:r>
+              <a:rPr lang="de-DE" sz="2400" b="0" kern="0" dirty="0" smtClean="0">
+                <a:solidFill>
+                  <a:srgbClr val="003B79"/>
+                </a:solidFill>
+                <a:latin typeface="+mn-lt"/>
+              </a:rPr>
+              <a:t>Alle:		-Dokumentation</a:t>
+            </a:r>
+          </a:p>
+          <a:p>
+            <a:pPr marL="457200" marR="0" lvl="0" indent="-457200" algn="l" defTabSz="914400" rtl="0" eaLnBrk="1" fontAlgn="base" latinLnBrk="0" hangingPunct="1">
+              <a:lnSpc>
+                <a:spcPct val="100000"/>
+              </a:lnSpc>
+              <a:spcBef>
+                <a:spcPct val="20000"/>
+              </a:spcBef>
+              <a:spcAft>
+                <a:spcPct val="20000"/>
+              </a:spcAft>
+              <a:buClrTx/>
+              <a:buSzTx/>
+              <a:tabLst/>
+              <a:defRPr/>
+            </a:pPr>
+            <a:r>
+              <a:rPr kumimoji="0" lang="de-DE" sz="2400" b="0" i="0" u="none" strike="noStrike" kern="0" cap="none" spc="0" normalizeH="0" baseline="0" noProof="0" dirty="0" smtClean="0">
+                <a:ln>
+                  <a:noFill/>
+                </a:ln>
+                <a:solidFill>
+                  <a:srgbClr val="003B79"/>
+                </a:solidFill>
+                <a:effectLst/>
+                <a:uLnTx/>
+                <a:uFillTx/>
+                <a:latin typeface="+mn-lt"/>
+                <a:ea typeface="+mn-ea"/>
+                <a:cs typeface="+mn-cs"/>
+              </a:rPr>
+              <a:t>			-Testen			</a:t>
+            </a:r>
+          </a:p>
+        </p:txBody>
+      </p:sp>
+    </p:spTree>
+  </p:cSld>
+  <p:clrMapOvr>
+    <a:masterClrMapping/>
+  </p:clrMapOvr>
+  <p:timing>
+    <p:tnLst>
+      <p:par>
+        <p:cTn id="1" dur="indefinite" restart="never" nodeType="tmRoot"/>
+      </p:par>
+    </p:tnLst>
+  </p:timing>
+</p:sld>
+</file>
+
+<file path=ppt/slides/slide17.xml><?xml version="1.0" encoding="utf-8"?>
+<p:sld xmlns:a="http://schemas.openxmlformats.org/drawingml/2006/main" xmlns:r="http://schemas.openxmlformats.org/officeDocument/2006/relationships" xmlns:p="http://schemas.openxmlformats.org/presentationml/2006/main">
+  <p:cSld>
+    <p:spTree>
+      <p:nvGrpSpPr>
+        <p:cNvPr id="1" name=""/>
+        <p:cNvGrpSpPr/>
+        <p:nvPr/>
+      </p:nvGrpSpPr>
+      <p:grpSpPr>
+        <a:xfrm>
+          <a:off x="0" y="0"/>
+          <a:ext cx="0" cy="0"/>
+          <a:chOff x="0" y="0"/>
+          <a:chExt cx="0" cy="0"/>
+        </a:xfrm>
+      </p:grpSpPr>
+      <p:sp>
+        <p:nvSpPr>
+          <p:cNvPr id="4" name="Rectangle 2"/>
+          <p:cNvSpPr txBox="1">
+            <a:spLocks noChangeArrowheads="1"/>
+          </p:cNvSpPr>
+          <p:nvPr/>
+        </p:nvSpPr>
+        <p:spPr>
+          <a:xfrm>
+            <a:off x="323626" y="357188"/>
+            <a:ext cx="6624638" cy="503237"/>
+          </a:xfrm>
+          <a:prstGeom prst="rect">
+            <a:avLst/>
+          </a:prstGeom>
+        </p:spPr>
+        <p:txBody>
+          <a:bodyPr/>
+          <a:lstStyle/>
+          <a:p>
+            <a:pPr marL="457200" lvl="0" indent="-457200" algn="l"/>
+            <a:r>
+              <a:rPr lang="de-DE" sz="3200" dirty="0" smtClean="0">
+                <a:solidFill>
+                  <a:srgbClr val="003B79"/>
+                </a:solidFill>
+                <a:latin typeface="+mj-lt"/>
+                <a:ea typeface="+mj-ea"/>
+                <a:cs typeface="+mj-cs"/>
+              </a:rPr>
+              <a:t>9. </a:t>
+            </a:r>
+            <a:r>
+              <a:rPr lang="de-DE" sz="3200" dirty="0" smtClean="0">
+                <a:solidFill>
+                  <a:srgbClr val="003B79"/>
+                </a:solidFill>
+                <a:latin typeface="+mj-lt"/>
+                <a:ea typeface="+mj-ea"/>
+                <a:cs typeface="+mj-cs"/>
+              </a:rPr>
+              <a:t>Zeitplan</a:t>
             </a:r>
           </a:p>
         </p:txBody>
@@ -11419,7 +12710,6 @@
               <a:rPr lang="de-DE" sz="2400" dirty="0" smtClean="0"/>
               <a:t>Zielbestimmung</a:t>
             </a:r>
-            <a:endParaRPr lang="de-DE" sz="2400" dirty="0" smtClean="0"/>
           </a:p>
           <a:p>
             <a:pPr marL="457200" indent="-457200">
@@ -11439,7 +12729,6 @@
               <a:rPr lang="de-DE" sz="2400" dirty="0" smtClean="0"/>
               <a:t>Produktübersicht</a:t>
             </a:r>
-            <a:endParaRPr lang="de-DE" sz="2400" dirty="0" smtClean="0"/>
           </a:p>
           <a:p>
             <a:pPr marL="457200" indent="-457200">
@@ -11453,11 +12742,12 @@
           </a:p>
           <a:p>
             <a:pPr marL="457200" indent="-457200">
+              <a:buFontTx/>
               <a:buAutoNum type="arabicPeriod"/>
             </a:pPr>
             <a:r>
               <a:rPr lang="de-DE" sz="2400" dirty="0" smtClean="0"/>
-              <a:t>Produktarchitektur</a:t>
+              <a:t>Produktleistung</a:t>
             </a:r>
             <a:endParaRPr lang="de-DE" sz="2400" dirty="0" smtClean="0"/>
           </a:p>
@@ -11467,9 +12757,17 @@
             </a:pPr>
             <a:r>
               <a:rPr lang="de-DE" sz="2400" dirty="0" smtClean="0"/>
+              <a:t>Produktarchitektur</a:t>
+            </a:r>
+          </a:p>
+          <a:p>
+            <a:pPr marL="457200" indent="-457200">
+              <a:buAutoNum type="arabicPeriod"/>
+            </a:pPr>
+            <a:r>
+              <a:rPr lang="de-DE" sz="2400" dirty="0" smtClean="0"/>
               <a:t>Datenmodelle</a:t>
             </a:r>
-            <a:endParaRPr lang="de-DE" sz="2400" dirty="0" smtClean="0"/>
           </a:p>
           <a:p>
             <a:pPr marL="457200" indent="-457200">
@@ -11480,7 +12778,6 @@
               <a:rPr lang="de-DE" sz="2400" dirty="0" smtClean="0"/>
               <a:t>Arbeitsaufteilung</a:t>
             </a:r>
-            <a:endParaRPr lang="de-DE" sz="2400" dirty="0" smtClean="0"/>
           </a:p>
           <a:p>
             <a:pPr marL="457200" indent="-457200">
@@ -11558,14 +12855,6 @@
               </a:rPr>
               <a:t>1. Zielbestimmung</a:t>
             </a:r>
-            <a:endParaRPr lang="de-DE" sz="3200" dirty="0" smtClean="0">
-              <a:solidFill>
-                <a:srgbClr val="003B79"/>
-              </a:solidFill>
-              <a:latin typeface="+mj-lt"/>
-              <a:ea typeface="+mj-ea"/>
-              <a:cs typeface="+mj-cs"/>
-            </a:endParaRPr>
           </a:p>
           <a:p>
             <a:pPr marL="457200" lvl="0" indent="-457200" algn="l"/>
@@ -11834,16 +13123,7 @@
                 </a:solidFill>
                 <a:latin typeface="+mn-lt"/>
               </a:rPr>
-              <a:t>Vertrieb von eigenen </a:t>
-            </a:r>
-            <a:r>
-              <a:rPr lang="de-DE" sz="2400" b="0" kern="0" dirty="0" smtClean="0">
-                <a:solidFill>
-                  <a:srgbClr val="003B79"/>
-                </a:solidFill>
-                <a:latin typeface="+mn-lt"/>
-              </a:rPr>
-              <a:t>Artikeln</a:t>
+              <a:t>Vertrieb von eigenen Artikeln</a:t>
             </a:r>
           </a:p>
           <a:p>
@@ -11864,7 +13144,16 @@
                 </a:solidFill>
                 <a:latin typeface="+mn-lt"/>
               </a:rPr>
-              <a:t>-Nutzerabhängiges Auktionskontingent</a:t>
+              <a:t>-Nutzerabhängiges </a:t>
+            </a:r>
+            <a:r>
+              <a:rPr lang="de-DE" sz="2400" b="0" kern="0" dirty="0" smtClean="0">
+                <a:solidFill>
+                  <a:srgbClr val="003B79"/>
+                </a:solidFill>
+                <a:latin typeface="+mn-lt"/>
+              </a:rPr>
+              <a:t>Auktionskontingent</a:t>
             </a:r>
           </a:p>
           <a:p>
@@ -11894,16 +13183,7 @@
                 </a:solidFill>
                 <a:latin typeface="+mn-lt"/>
               </a:rPr>
-              <a:t>und Nutzung von Internetauktionsplattformen </a:t>
-            </a:r>
-            <a:r>
-              <a:rPr lang="de-DE" sz="2400" b="0" kern="0" dirty="0" smtClean="0">
-                <a:solidFill>
-                  <a:srgbClr val="003B79"/>
-                </a:solidFill>
-                <a:latin typeface="+mn-lt"/>
-              </a:rPr>
-              <a:t>verbessern</a:t>
+              <a:t>und Nutzung von Internetauktionsplattformen verbessern</a:t>
             </a:r>
           </a:p>
           <a:p>
@@ -11924,7 +13204,25 @@
                 </a:solidFill>
                 <a:latin typeface="+mn-lt"/>
               </a:rPr>
-              <a:t>-Rechnungen halbautomatisch generieren</a:t>
+              <a:t>-</a:t>
+            </a:r>
+            <a:r>
+              <a:rPr lang="de-DE" sz="2400" b="0" kern="0" dirty="0" smtClean="0">
+                <a:solidFill>
+                  <a:srgbClr val="003B79"/>
+                </a:solidFill>
+                <a:latin typeface="+mn-lt"/>
+              </a:rPr>
+              <a:t>Rechnungen </a:t>
+            </a:r>
+            <a:r>
+              <a:rPr lang="de-DE" sz="2400" b="0" kern="0" dirty="0" smtClean="0">
+                <a:solidFill>
+                  <a:srgbClr val="003B79"/>
+                </a:solidFill>
+                <a:latin typeface="+mn-lt"/>
+              </a:rPr>
+              <a:t>halbautomatisch generieren</a:t>
             </a:r>
           </a:p>
           <a:p>
@@ -12028,172 +13326,13 @@
       </p:sp>
       <p:sp>
         <p:nvSpPr>
-          <p:cNvPr id="5" name="Rectangle 4"/>
-          <p:cNvSpPr txBox="1">
-            <a:spLocks noChangeArrowheads="1"/>
-          </p:cNvSpPr>
-          <p:nvPr/>
-        </p:nvSpPr>
-        <p:spPr>
-          <a:xfrm>
-            <a:off x="323850" y="1052736"/>
-            <a:ext cx="8568630" cy="5545137"/>
-          </a:xfrm>
-          <a:prstGeom prst="rect">
-            <a:avLst/>
-          </a:prstGeom>
-        </p:spPr>
-        <p:txBody>
-          <a:bodyPr/>
-          <a:lstStyle/>
-          <a:p>
-            <a:pPr marL="742950" marR="0" lvl="1" indent="-285750" algn="l" defTabSz="914400" rtl="0" eaLnBrk="1" fontAlgn="base" latinLnBrk="0" hangingPunct="1">
-              <a:lnSpc>
-                <a:spcPct val="100000"/>
-              </a:lnSpc>
-              <a:spcBef>
-                <a:spcPct val="20000"/>
-              </a:spcBef>
-              <a:spcAft>
-                <a:spcPct val="20000"/>
-              </a:spcAft>
-              <a:buClrTx/>
-              <a:buSzTx/>
-              <a:tabLst/>
-              <a:defRPr/>
-            </a:pPr>
-            <a:endParaRPr lang="de-DE" sz="2400" b="0" kern="0" dirty="0" smtClean="0">
-              <a:solidFill>
-                <a:srgbClr val="003B79"/>
-              </a:solidFill>
-              <a:latin typeface="+mn-lt"/>
-            </a:endParaRPr>
-          </a:p>
-          <a:p>
-            <a:pPr marL="742950" lvl="1" indent="-285750" algn="l">
-              <a:spcBef>
-                <a:spcPct val="20000"/>
-              </a:spcBef>
-              <a:spcAft>
-                <a:spcPct val="20000"/>
-              </a:spcAft>
-            </a:pPr>
-            <a:endParaRPr lang="de-DE" sz="2400" b="0" kern="0" dirty="0">
-              <a:solidFill>
-                <a:srgbClr val="003B79"/>
-              </a:solidFill>
-              <a:latin typeface="+mn-lt"/>
-            </a:endParaRPr>
-          </a:p>
-          <a:p>
-            <a:pPr marL="742950" marR="0" lvl="1" indent="-285750" algn="l" defTabSz="914400" rtl="0" eaLnBrk="1" fontAlgn="base" latinLnBrk="0" hangingPunct="1">
-              <a:lnSpc>
-                <a:spcPct val="100000"/>
-              </a:lnSpc>
-              <a:spcBef>
-                <a:spcPct val="20000"/>
-              </a:spcBef>
-              <a:spcAft>
-                <a:spcPct val="20000"/>
-              </a:spcAft>
-              <a:buClrTx/>
-              <a:buSzTx/>
-              <a:tabLst/>
-              <a:defRPr/>
-            </a:pPr>
-            <a:endParaRPr lang="de-DE" sz="2400" b="0" kern="0" dirty="0">
-              <a:solidFill>
-                <a:srgbClr val="003B79"/>
-              </a:solidFill>
-              <a:latin typeface="+mn-lt"/>
-            </a:endParaRPr>
-          </a:p>
-          <a:p>
-            <a:pPr marL="742950" marR="0" lvl="1" indent="-285750" algn="l" defTabSz="914400" rtl="0" eaLnBrk="1" fontAlgn="base" latinLnBrk="0" hangingPunct="1">
-              <a:lnSpc>
-                <a:spcPct val="100000"/>
-              </a:lnSpc>
-              <a:spcBef>
-                <a:spcPct val="20000"/>
-              </a:spcBef>
-              <a:spcAft>
-                <a:spcPct val="20000"/>
-              </a:spcAft>
-              <a:buClrTx/>
-              <a:buSzTx/>
-              <a:tabLst/>
-              <a:defRPr/>
-            </a:pPr>
-            <a:endParaRPr lang="de-DE" sz="2400" b="0" kern="0" dirty="0" smtClean="0">
-              <a:solidFill>
-                <a:srgbClr val="003B79"/>
-              </a:solidFill>
-              <a:latin typeface="+mn-lt"/>
-            </a:endParaRPr>
-          </a:p>
-          <a:p>
-            <a:pPr marL="742950" marR="0" lvl="1" indent="-285750" algn="l" defTabSz="914400" rtl="0" eaLnBrk="1" fontAlgn="base" latinLnBrk="0" hangingPunct="1">
-              <a:lnSpc>
-                <a:spcPct val="100000"/>
-              </a:lnSpc>
-              <a:spcBef>
-                <a:spcPct val="20000"/>
-              </a:spcBef>
-              <a:spcAft>
-                <a:spcPct val="20000"/>
-              </a:spcAft>
-              <a:buClrTx/>
-              <a:buSzTx/>
-              <a:tabLst/>
-              <a:defRPr/>
-            </a:pPr>
-            <a:endParaRPr lang="de-DE" sz="2400" b="0" kern="0" dirty="0">
-              <a:solidFill>
-                <a:srgbClr val="003B79"/>
-              </a:solidFill>
-              <a:latin typeface="+mn-lt"/>
-            </a:endParaRPr>
-          </a:p>
-          <a:p>
-            <a:pPr marL="742950" marR="0" lvl="1" indent="-285750" algn="l" defTabSz="914400" rtl="0" eaLnBrk="1" fontAlgn="base" latinLnBrk="0" hangingPunct="1">
-              <a:lnSpc>
-                <a:spcPct val="100000"/>
-              </a:lnSpc>
-              <a:spcBef>
-                <a:spcPct val="20000"/>
-              </a:spcBef>
-              <a:spcAft>
-                <a:spcPct val="20000"/>
-              </a:spcAft>
-              <a:buClrTx/>
-              <a:buSzTx/>
-              <a:tabLst/>
-              <a:defRPr/>
-            </a:pPr>
-            <a:endParaRPr kumimoji="0" lang="de-DE" sz="2400" b="0" i="0" u="none" strike="noStrike" kern="0" cap="none" spc="0" normalizeH="0" baseline="0" noProof="0" dirty="0" smtClean="0">
-              <a:ln>
-                <a:noFill/>
-              </a:ln>
-              <a:solidFill>
-                <a:srgbClr val="003B79"/>
-              </a:solidFill>
-              <a:effectLst/>
-              <a:uLnTx/>
-              <a:uFillTx/>
-              <a:latin typeface="+mn-lt"/>
-            </a:endParaRPr>
-          </a:p>
-        </p:txBody>
-      </p:sp>
-      <p:sp>
-        <p:nvSpPr>
           <p:cNvPr id="2" name="Textfeld 1"/>
           <p:cNvSpPr txBox="1"/>
           <p:nvPr/>
         </p:nvSpPr>
         <p:spPr>
           <a:xfrm>
-            <a:off x="179512" y="1988840"/>
+            <a:off x="179512" y="1312307"/>
             <a:ext cx="8424936" cy="4708981"/>
           </a:xfrm>
           <a:prstGeom prst="rect">
@@ -12215,7 +13354,7 @@
                 </a:solidFill>
                 <a:latin typeface="+mn-lt"/>
               </a:rPr>
-              <a:t>-Verwaltung </a:t>
+              <a:t>Verwaltung </a:t>
             </a:r>
             <a:r>
               <a:rPr lang="de-DE" sz="2400" b="0" kern="0" dirty="0">
@@ -12264,10 +13403,7 @@
             </a:endParaRPr>
           </a:p>
           <a:p>
-            <a:pPr algn="just">
-              <a:buFontTx/>
-              <a:buChar char="-"/>
-            </a:pPr>
+            <a:pPr algn="just"/>
             <a:r>
               <a:rPr lang="de-DE" sz="2400" b="0" kern="0" dirty="0" smtClean="0">
                 <a:solidFill>
@@ -12309,10 +13445,7 @@
             </a:endParaRPr>
           </a:p>
           <a:p>
-            <a:pPr algn="just">
-              <a:buFontTx/>
-              <a:buChar char="-"/>
-            </a:pPr>
+            <a:pPr algn="just"/>
             <a:r>
               <a:rPr lang="de-DE" sz="2400" b="0" kern="0" dirty="0" smtClean="0">
                 <a:solidFill>
@@ -12706,7 +13839,7 @@
           <a:blip r:embed="rId3" cstate="print">
             <a:extLst>
               <a:ext uri="{28A0092B-C50C-407E-A947-70E740481C1C}">
-                <a14:useLocalDpi xmlns:a14="http://schemas.microsoft.com/office/drawing/2010/main" xmlns="" val="0"/>
+                <a14:useLocalDpi xmlns="" xmlns:a14="http://schemas.microsoft.com/office/drawing/2010/main" val="0"/>
               </a:ext>
             </a:extLst>
           </a:blip>
@@ -12726,7 +13859,7 @@
           <a:noFill/>
           <a:extLst>
             <a:ext uri="{909E8E84-426E-40DD-AFC4-6F175D3DCCD1}">
-              <a14:hiddenFill xmlns:a14="http://schemas.microsoft.com/office/drawing/2010/main" xmlns="">
+              <a14:hiddenFill xmlns="" xmlns:a14="http://schemas.microsoft.com/office/drawing/2010/main">
                 <a:solidFill>
                   <a:srgbClr val="FFFFFF"/>
                 </a:solidFill>
@@ -12738,7 +13871,7 @@
     </p:spTree>
     <p:extLst>
       <p:ext uri="{BB962C8B-B14F-4D97-AF65-F5344CB8AC3E}">
-        <p14:creationId xmlns:p14="http://schemas.microsoft.com/office/powerpoint/2010/main" xmlns="" val="2402780198"/>
+        <p14:creationId xmlns="" xmlns:p14="http://schemas.microsoft.com/office/powerpoint/2010/main" val="2402780198"/>
       </p:ext>
     </p:extLst>
   </p:cSld>
@@ -12772,117 +13905,602 @@
           <a:chExt cx="0" cy="0"/>
         </a:xfrm>
       </p:grpSpPr>
-      <p:graphicFrame>
-        <p:nvGraphicFramePr>
-          <p:cNvPr id="3" name="Inhaltsplatzhalter 2"/>
-          <p:cNvGraphicFramePr>
-            <a:graphicFrameLocks noGrp="1"/>
-          </p:cNvGraphicFramePr>
-          <p:nvPr>
-            <p:ph idx="1"/>
-            <p:extLst>
-              <p:ext uri="{D42A27DB-BD31-4B8C-83A1-F6EECF244321}">
-                <p14:modId xmlns:p14="http://schemas.microsoft.com/office/powerpoint/2010/main" xmlns="" val="2122085790"/>
-              </p:ext>
-            </p:extLst>
-          </p:nvPr>
-        </p:nvGraphicFramePr>
-        <p:xfrm>
-          <a:off x="216346" y="980429"/>
-          <a:ext cx="8820150" cy="5545137"/>
-        </p:xfrm>
-        <a:graphic>
-          <a:graphicData uri="http://schemas.openxmlformats.org/drawingml/2006/diagram">
-            <dgm:relIds xmlns:dgm="http://schemas.openxmlformats.org/drawingml/2006/diagram" xmlns:r="http://schemas.openxmlformats.org/officeDocument/2006/relationships" r:dm="rId3" r:lo="rId4" r:qs="rId5" r:cs="rId6"/>
-          </a:graphicData>
-        </a:graphic>
-      </p:graphicFrame>
       <p:sp>
         <p:nvSpPr>
-          <p:cNvPr id="8770562" name="Rectangle 2"/>
-          <p:cNvSpPr>
-            <a:spLocks noGrp="1" noChangeArrowheads="1"/>
+          <p:cNvPr id="4" name="Rectangle 2"/>
+          <p:cNvSpPr txBox="1">
+            <a:spLocks noChangeArrowheads="1"/>
           </p:cNvSpPr>
-          <p:nvPr>
-            <p:ph type="title"/>
-          </p:nvPr>
+          <p:nvPr/>
         </p:nvSpPr>
         <p:spPr>
           <a:xfrm>
-            <a:off x="198681" y="321146"/>
+            <a:off x="323626" y="357188"/>
             <a:ext cx="6624638" cy="503237"/>
           </a:xfrm>
+          <a:prstGeom prst="rect">
+            <a:avLst/>
+          </a:prstGeom>
         </p:spPr>
         <p:txBody>
           <a:bodyPr/>
           <a:lstStyle/>
           <a:p>
-            <a:r>
-              <a:rPr lang="de-DE" sz="3200" dirty="0" smtClean="0"/>
-              <a:t>5. Produktarchitektur</a:t>
-            </a:r>
-            <a:endParaRPr lang="de-DE" sz="3200" dirty="0"/>
+            <a:pPr marL="457200" lvl="0" indent="-457200" algn="l"/>
+            <a:r>
+              <a:rPr lang="de-DE" sz="3200" dirty="0" smtClean="0">
+                <a:solidFill>
+                  <a:srgbClr val="003B79"/>
+                </a:solidFill>
+                <a:latin typeface="+mj-lt"/>
+                <a:ea typeface="+mj-ea"/>
+                <a:cs typeface="+mj-cs"/>
+              </a:rPr>
+              <a:t>4. Qualitätskriterien</a:t>
+            </a:r>
+            <a:endParaRPr lang="de-DE" sz="3200" dirty="0" smtClean="0">
+              <a:solidFill>
+                <a:srgbClr val="003B79"/>
+              </a:solidFill>
+              <a:latin typeface="+mj-lt"/>
+              <a:ea typeface="+mj-ea"/>
+              <a:cs typeface="+mj-cs"/>
+            </a:endParaRPr>
+          </a:p>
+          <a:p>
+            <a:pPr marL="457200" lvl="0" indent="-457200" algn="l"/>
+            <a:endParaRPr lang="de-DE" sz="3200" dirty="0" smtClean="0">
+              <a:solidFill>
+                <a:srgbClr val="003B79"/>
+              </a:solidFill>
+              <a:latin typeface="+mj-lt"/>
+              <a:ea typeface="+mj-ea"/>
+              <a:cs typeface="+mj-cs"/>
+            </a:endParaRPr>
           </a:p>
         </p:txBody>
       </p:sp>
       <p:sp>
         <p:nvSpPr>
-          <p:cNvPr id="4" name="Rechteck 3"/>
-          <p:cNvSpPr/>
+          <p:cNvPr id="5" name="Rectangle 4"/>
+          <p:cNvSpPr txBox="1">
+            <a:spLocks noChangeArrowheads="1"/>
+          </p:cNvSpPr>
           <p:nvPr/>
         </p:nvSpPr>
-        <p:spPr bwMode="auto">
+        <p:spPr>
           <a:xfrm>
-            <a:off x="455855" y="3176934"/>
-            <a:ext cx="2520280" cy="1152128"/>
+            <a:off x="323850" y="1052736"/>
+            <a:ext cx="8568630" cy="5545137"/>
           </a:xfrm>
           <a:prstGeom prst="rect">
             <a:avLst/>
           </a:prstGeom>
-          <a:noFill/>
-          <a:ln w="9525" cap="flat" cmpd="sng" algn="ctr">
-            <a:noFill/>
-            <a:prstDash val="solid"/>
-            <a:round/>
-            <a:headEnd type="none" w="med" len="med"/>
-            <a:tailEnd type="none" w="med" len="med"/>
-          </a:ln>
-          <a:effectLst/>
         </p:spPr>
         <p:txBody>
-          <a:bodyPr vert="horz" wrap="square" lIns="91440" tIns="45720" rIns="91440" bIns="45720" numCol="1" rtlCol="0" anchor="t" anchorCtr="0" compatLnSpc="1">
-            <a:prstTxWarp prst="textNoShape">
-              <a:avLst/>
-            </a:prstTxWarp>
-            <a:spAutoFit/>
-          </a:bodyPr>
+          <a:bodyPr/>
           <a:lstStyle/>
           <a:p>
-            <a:pPr marL="0" marR="0" indent="0" algn="ctr" defTabSz="914400" rtl="0" eaLnBrk="1" fontAlgn="base" latinLnBrk="0" hangingPunct="1">
+            <a:pPr marL="742950" marR="0" lvl="1" indent="-285750" algn="l" defTabSz="914400" rtl="0" eaLnBrk="1" fontAlgn="base" latinLnBrk="0" hangingPunct="1">
               <a:lnSpc>
                 <a:spcPct val="100000"/>
               </a:lnSpc>
               <a:spcBef>
-                <a:spcPct val="0"/>
+                <a:spcPct val="20000"/>
               </a:spcBef>
               <a:spcAft>
-                <a:spcPct val="0"/>
+                <a:spcPct val="20000"/>
               </a:spcAft>
               <a:buClrTx/>
               <a:buSzTx/>
-              <a:buFontTx/>
-              <a:buNone/>
               <a:tabLst/>
+              <a:defRPr/>
             </a:pPr>
-            <a:endParaRPr kumimoji="0" lang="de-DE" sz="1800" b="1" i="0" u="none" strike="noStrike" cap="none" normalizeH="0" baseline="0" smtClean="0">
+            <a:endParaRPr lang="de-DE" sz="2400" b="0" kern="0" dirty="0" smtClean="0">
+              <a:solidFill>
+                <a:srgbClr val="003B79"/>
+              </a:solidFill>
+              <a:latin typeface="+mn-lt"/>
+            </a:endParaRPr>
+          </a:p>
+          <a:p>
+            <a:pPr marL="742950" lvl="1" indent="-285750" algn="l">
+              <a:spcBef>
+                <a:spcPct val="20000"/>
+              </a:spcBef>
+              <a:spcAft>
+                <a:spcPct val="20000"/>
+              </a:spcAft>
+            </a:pPr>
+            <a:endParaRPr lang="de-DE" sz="2400" b="0" kern="0" dirty="0">
+              <a:solidFill>
+                <a:srgbClr val="003B79"/>
+              </a:solidFill>
+              <a:latin typeface="+mn-lt"/>
+            </a:endParaRPr>
+          </a:p>
+          <a:p>
+            <a:pPr marL="742950" marR="0" lvl="1" indent="-285750" algn="l" defTabSz="914400" rtl="0" eaLnBrk="1" fontAlgn="base" latinLnBrk="0" hangingPunct="1">
+              <a:lnSpc>
+                <a:spcPct val="100000"/>
+              </a:lnSpc>
+              <a:spcBef>
+                <a:spcPct val="20000"/>
+              </a:spcBef>
+              <a:spcAft>
+                <a:spcPct val="20000"/>
+              </a:spcAft>
+              <a:buClrTx/>
+              <a:buSzTx/>
+              <a:tabLst/>
+              <a:defRPr/>
+            </a:pPr>
+            <a:endParaRPr lang="de-DE" sz="2400" b="0" kern="0" dirty="0">
+              <a:solidFill>
+                <a:srgbClr val="003B79"/>
+              </a:solidFill>
+              <a:latin typeface="+mn-lt"/>
+            </a:endParaRPr>
+          </a:p>
+          <a:p>
+            <a:pPr marL="742950" marR="0" lvl="1" indent="-285750" algn="l" defTabSz="914400" rtl="0" eaLnBrk="1" fontAlgn="base" latinLnBrk="0" hangingPunct="1">
+              <a:lnSpc>
+                <a:spcPct val="100000"/>
+              </a:lnSpc>
+              <a:spcBef>
+                <a:spcPct val="20000"/>
+              </a:spcBef>
+              <a:spcAft>
+                <a:spcPct val="20000"/>
+              </a:spcAft>
+              <a:buClrTx/>
+              <a:buSzTx/>
+              <a:tabLst/>
+              <a:defRPr/>
+            </a:pPr>
+            <a:endParaRPr lang="de-DE" sz="2400" b="0" kern="0" dirty="0" smtClean="0">
+              <a:solidFill>
+                <a:srgbClr val="003B79"/>
+              </a:solidFill>
+              <a:latin typeface="+mn-lt"/>
+            </a:endParaRPr>
+          </a:p>
+          <a:p>
+            <a:pPr marL="742950" marR="0" lvl="1" indent="-285750" algn="l" defTabSz="914400" rtl="0" eaLnBrk="1" fontAlgn="base" latinLnBrk="0" hangingPunct="1">
+              <a:lnSpc>
+                <a:spcPct val="100000"/>
+              </a:lnSpc>
+              <a:spcBef>
+                <a:spcPct val="20000"/>
+              </a:spcBef>
+              <a:spcAft>
+                <a:spcPct val="20000"/>
+              </a:spcAft>
+              <a:buClrTx/>
+              <a:buSzTx/>
+              <a:tabLst/>
+              <a:defRPr/>
+            </a:pPr>
+            <a:endParaRPr lang="de-DE" sz="2400" b="0" kern="0" dirty="0">
+              <a:solidFill>
+                <a:srgbClr val="003B79"/>
+              </a:solidFill>
+              <a:latin typeface="+mn-lt"/>
+            </a:endParaRPr>
+          </a:p>
+          <a:p>
+            <a:pPr marL="742950" marR="0" lvl="1" indent="-285750" algn="l" defTabSz="914400" rtl="0" eaLnBrk="1" fontAlgn="base" latinLnBrk="0" hangingPunct="1">
+              <a:lnSpc>
+                <a:spcPct val="100000"/>
+              </a:lnSpc>
+              <a:spcBef>
+                <a:spcPct val="20000"/>
+              </a:spcBef>
+              <a:spcAft>
+                <a:spcPct val="20000"/>
+              </a:spcAft>
+              <a:buClrTx/>
+              <a:buSzTx/>
+              <a:tabLst/>
+              <a:defRPr/>
+            </a:pPr>
+            <a:endParaRPr kumimoji="0" lang="de-DE" sz="2400" b="0" i="0" u="none" strike="noStrike" kern="0" cap="none" spc="0" normalizeH="0" baseline="0" noProof="0" dirty="0" smtClean="0">
               <a:ln>
                 <a:noFill/>
               </a:ln>
               <a:solidFill>
-                <a:srgbClr val="FFCC66"/>
+                <a:srgbClr val="003B79"/>
               </a:solidFill>
               <a:effectLst/>
-              <a:latin typeface="Arial" charset="0"/>
+              <a:uLnTx/>
+              <a:uFillTx/>
+              <a:latin typeface="+mn-lt"/>
+            </a:endParaRPr>
+          </a:p>
+        </p:txBody>
+      </p:sp>
+      <p:sp>
+        <p:nvSpPr>
+          <p:cNvPr id="9" name="Rectangle 4"/>
+          <p:cNvSpPr txBox="1">
+            <a:spLocks noChangeArrowheads="1"/>
+          </p:cNvSpPr>
+          <p:nvPr/>
+        </p:nvSpPr>
+        <p:spPr>
+          <a:xfrm>
+            <a:off x="792410" y="1052736"/>
+            <a:ext cx="8820150" cy="5545137"/>
+          </a:xfrm>
+          <a:prstGeom prst="rect">
+            <a:avLst/>
+          </a:prstGeom>
+        </p:spPr>
+        <p:txBody>
+          <a:bodyPr/>
+          <a:lstStyle/>
+          <a:p>
+            <a:pPr marL="457200" marR="0" lvl="0" indent="-457200" algn="l" defTabSz="914400" rtl="0" eaLnBrk="1" fontAlgn="base" latinLnBrk="0" hangingPunct="1">
+              <a:lnSpc>
+                <a:spcPct val="100000"/>
+              </a:lnSpc>
+              <a:spcBef>
+                <a:spcPct val="20000"/>
+              </a:spcBef>
+              <a:spcAft>
+                <a:spcPct val="20000"/>
+              </a:spcAft>
+              <a:buClrTx/>
+              <a:buSzTx/>
+              <a:tabLst/>
+              <a:defRPr/>
+            </a:pPr>
+            <a:r>
+              <a:rPr kumimoji="0" lang="de-DE" sz="2400" b="0" i="0" u="none" strike="noStrike" kern="0" cap="none" spc="0" normalizeH="0" baseline="0" noProof="0" dirty="0" smtClean="0">
+                <a:ln>
+                  <a:noFill/>
+                </a:ln>
+                <a:solidFill>
+                  <a:srgbClr val="003B79"/>
+                </a:solidFill>
+                <a:effectLst/>
+                <a:uLnTx/>
+                <a:uFillTx/>
+                <a:latin typeface="+mn-lt"/>
+                <a:ea typeface="+mn-ea"/>
+                <a:cs typeface="+mn-cs"/>
+              </a:rPr>
+              <a:t>			</a:t>
+            </a:r>
+          </a:p>
+        </p:txBody>
+      </p:sp>
+      <p:sp>
+        <p:nvSpPr>
+          <p:cNvPr id="7" name="Rectangle 4"/>
+          <p:cNvSpPr txBox="1">
+            <a:spLocks noChangeArrowheads="1"/>
+          </p:cNvSpPr>
+          <p:nvPr/>
+        </p:nvSpPr>
+        <p:spPr>
+          <a:xfrm>
+            <a:off x="179512" y="1268239"/>
+            <a:ext cx="8820150" cy="5545137"/>
+          </a:xfrm>
+          <a:prstGeom prst="rect">
+            <a:avLst/>
+          </a:prstGeom>
+        </p:spPr>
+        <p:txBody>
+          <a:bodyPr/>
+          <a:lstStyle/>
+          <a:p>
+            <a:pPr algn="l"/>
+            <a:r>
+              <a:rPr lang="de-DE" sz="2400" b="0" kern="0" dirty="0" smtClean="0">
+                <a:solidFill>
+                  <a:srgbClr val="003B79"/>
+                </a:solidFill>
+                <a:latin typeface="+mn-lt"/>
+              </a:rPr>
+              <a:t>Stufe 1= sehr wichtig ... Stufe 4=unwichtig</a:t>
+            </a:r>
+            <a:br>
+              <a:rPr lang="de-DE" sz="2400" b="0" kern="0" dirty="0" smtClean="0">
+                <a:solidFill>
+                  <a:srgbClr val="003B79"/>
+                </a:solidFill>
+                <a:latin typeface="+mn-lt"/>
+              </a:rPr>
+            </a:br>
+            <a:endParaRPr lang="de-DE" sz="2400" b="0" kern="0" dirty="0" smtClean="0">
+              <a:solidFill>
+                <a:srgbClr val="003B79"/>
+              </a:solidFill>
+              <a:latin typeface="+mn-lt"/>
+            </a:endParaRPr>
+          </a:p>
+          <a:p>
+            <a:pPr algn="l"/>
+            <a:r>
+              <a:rPr lang="de-DE" sz="2400" b="0" u="sng" kern="0" dirty="0" smtClean="0">
+                <a:solidFill>
+                  <a:srgbClr val="003B79"/>
+                </a:solidFill>
+                <a:latin typeface="+mn-lt"/>
+              </a:rPr>
+              <a:t>Kriterium</a:t>
+            </a:r>
+            <a:r>
+              <a:rPr lang="de-DE" sz="2400" b="0" kern="0" dirty="0" smtClean="0">
+                <a:solidFill>
+                  <a:srgbClr val="003B79"/>
+                </a:solidFill>
+                <a:latin typeface="+mn-lt"/>
+              </a:rPr>
+              <a:t>			</a:t>
+            </a:r>
+            <a:r>
+              <a:rPr lang="de-DE" sz="2400" b="0" u="sng" kern="0" dirty="0" smtClean="0">
+                <a:solidFill>
+                  <a:srgbClr val="003B79"/>
+                </a:solidFill>
+                <a:latin typeface="+mn-lt"/>
+              </a:rPr>
+              <a:t>Wertung</a:t>
+            </a:r>
+          </a:p>
+          <a:p>
+            <a:pPr algn="l"/>
+            <a:r>
+              <a:rPr lang="de-DE" sz="2400" b="0" kern="0" dirty="0" smtClean="0">
+                <a:solidFill>
+                  <a:srgbClr val="003B79"/>
+                </a:solidFill>
+                <a:latin typeface="+mn-lt"/>
+              </a:rPr>
+              <a:t> </a:t>
+            </a:r>
+          </a:p>
+          <a:p>
+            <a:pPr algn="l"/>
+            <a:r>
+              <a:rPr lang="de-DE" sz="2400" kern="0" dirty="0" smtClean="0">
+                <a:solidFill>
+                  <a:srgbClr val="003B79"/>
+                </a:solidFill>
+                <a:latin typeface="+mn-lt"/>
+              </a:rPr>
+              <a:t>Erweiterbarkeit		</a:t>
+            </a:r>
+            <a:r>
+              <a:rPr lang="de-DE" sz="2400" kern="0" dirty="0" smtClean="0">
+                <a:solidFill>
+                  <a:srgbClr val="003B79"/>
+                </a:solidFill>
+                <a:latin typeface="+mn-lt"/>
+              </a:rPr>
+              <a:t>2</a:t>
+            </a:r>
+            <a:endParaRPr lang="de-DE" sz="2400" kern="0" dirty="0" smtClean="0">
+              <a:solidFill>
+                <a:srgbClr val="003B79"/>
+              </a:solidFill>
+              <a:latin typeface="+mn-lt"/>
+            </a:endParaRPr>
+          </a:p>
+          <a:p>
+            <a:pPr algn="l"/>
+            <a:r>
+              <a:rPr lang="de-DE" sz="2400" b="0" kern="0" dirty="0" smtClean="0">
+                <a:solidFill>
+                  <a:srgbClr val="003B79"/>
+                </a:solidFill>
+                <a:latin typeface="+mn-lt"/>
+              </a:rPr>
+              <a:t>Backups			</a:t>
+            </a:r>
+            <a:r>
+              <a:rPr lang="de-DE" sz="2400" b="0" kern="0" dirty="0" smtClean="0">
+                <a:solidFill>
+                  <a:srgbClr val="003B79"/>
+                </a:solidFill>
+                <a:latin typeface="+mn-lt"/>
+              </a:rPr>
+              <a:t>3</a:t>
+            </a:r>
+            <a:endParaRPr lang="de-DE" sz="2400" b="0" kern="0" dirty="0" smtClean="0">
+              <a:solidFill>
+                <a:srgbClr val="003B79"/>
+              </a:solidFill>
+              <a:latin typeface="+mn-lt"/>
+            </a:endParaRPr>
+          </a:p>
+          <a:p>
+            <a:pPr algn="l"/>
+            <a:r>
+              <a:rPr lang="de-DE" sz="2400" b="0" kern="0" dirty="0" smtClean="0">
+                <a:solidFill>
+                  <a:srgbClr val="003B79"/>
+                </a:solidFill>
+                <a:latin typeface="+mn-lt"/>
+              </a:rPr>
+              <a:t>Portierbarkeit			4</a:t>
+            </a:r>
+          </a:p>
+          <a:p>
+            <a:pPr algn="l"/>
+            <a:r>
+              <a:rPr lang="de-DE" sz="2400" kern="0" dirty="0" smtClean="0">
+                <a:solidFill>
+                  <a:srgbClr val="003B79"/>
+                </a:solidFill>
+                <a:latin typeface="+mn-lt"/>
+              </a:rPr>
+              <a:t>Effizienz			</a:t>
+            </a:r>
+            <a:r>
+              <a:rPr lang="de-DE" sz="2400" kern="0" dirty="0" smtClean="0">
+                <a:solidFill>
+                  <a:srgbClr val="003B79"/>
+                </a:solidFill>
+                <a:latin typeface="+mn-lt"/>
+              </a:rPr>
+              <a:t>2</a:t>
+            </a:r>
+            <a:endParaRPr lang="de-DE" sz="2400" kern="0" dirty="0" smtClean="0">
+              <a:solidFill>
+                <a:srgbClr val="003B79"/>
+              </a:solidFill>
+              <a:latin typeface="+mn-lt"/>
+            </a:endParaRPr>
+          </a:p>
+          <a:p>
+            <a:pPr algn="l"/>
+            <a:r>
+              <a:rPr lang="de-DE" sz="2400" b="0" kern="0" dirty="0" smtClean="0">
+                <a:solidFill>
+                  <a:srgbClr val="003B79"/>
+                </a:solidFill>
+                <a:latin typeface="+mn-lt"/>
+              </a:rPr>
+              <a:t>Skalierbarkeit		</a:t>
+            </a:r>
+            <a:r>
+              <a:rPr lang="de-DE" sz="2400" b="0" kern="0" dirty="0" smtClean="0">
+                <a:solidFill>
+                  <a:srgbClr val="003B79"/>
+                </a:solidFill>
+                <a:latin typeface="+mn-lt"/>
+              </a:rPr>
+              <a:t>3</a:t>
+            </a:r>
+            <a:endParaRPr lang="de-DE" sz="2400" b="0" kern="0" dirty="0" smtClean="0">
+              <a:solidFill>
+                <a:srgbClr val="003B79"/>
+              </a:solidFill>
+              <a:latin typeface="+mn-lt"/>
+            </a:endParaRPr>
+          </a:p>
+          <a:p>
+            <a:pPr algn="l"/>
+            <a:r>
+              <a:rPr lang="de-DE" sz="2400" kern="0" dirty="0" smtClean="0">
+                <a:solidFill>
+                  <a:srgbClr val="003B79"/>
+                </a:solidFill>
+                <a:latin typeface="+mn-lt"/>
+              </a:rPr>
+              <a:t>Benutzbarkeit		</a:t>
+            </a:r>
+            <a:r>
+              <a:rPr lang="de-DE" sz="2400" kern="0" dirty="0" smtClean="0">
+                <a:solidFill>
+                  <a:srgbClr val="003B79"/>
+                </a:solidFill>
+                <a:latin typeface="+mn-lt"/>
+              </a:rPr>
+              <a:t>2</a:t>
+            </a:r>
+            <a:endParaRPr lang="de-DE" sz="2400" kern="0" dirty="0" smtClean="0">
+              <a:solidFill>
+                <a:srgbClr val="003B79"/>
+              </a:solidFill>
+              <a:latin typeface="+mn-lt"/>
+            </a:endParaRPr>
+          </a:p>
+          <a:p>
+            <a:pPr algn="l"/>
+            <a:r>
+              <a:rPr lang="de-DE" sz="2400" b="0" kern="0" dirty="0" smtClean="0">
+                <a:solidFill>
+                  <a:srgbClr val="003B79"/>
+                </a:solidFill>
+                <a:latin typeface="+mn-lt"/>
+              </a:rPr>
+              <a:t>Datenschutz			3</a:t>
+            </a:r>
+          </a:p>
+          <a:p>
+            <a:pPr algn="l"/>
+            <a:r>
+              <a:rPr lang="de-DE" sz="2400" kern="0" dirty="0" smtClean="0">
+                <a:solidFill>
+                  <a:srgbClr val="003B79"/>
+                </a:solidFill>
+                <a:latin typeface="+mn-lt"/>
+              </a:rPr>
+              <a:t>Änderbarkeit		</a:t>
+            </a:r>
+            <a:r>
+              <a:rPr lang="de-DE" sz="2400" kern="0" dirty="0" smtClean="0">
+                <a:solidFill>
+                  <a:srgbClr val="003B79"/>
+                </a:solidFill>
+                <a:latin typeface="+mn-lt"/>
+              </a:rPr>
+              <a:t>2</a:t>
+            </a:r>
+            <a:endParaRPr lang="de-DE" sz="2400" kern="0" dirty="0" smtClean="0">
+              <a:solidFill>
+                <a:srgbClr val="003B79"/>
+              </a:solidFill>
+              <a:latin typeface="+mn-lt"/>
+            </a:endParaRPr>
+          </a:p>
+          <a:p>
+            <a:pPr algn="l"/>
+            <a:r>
+              <a:rPr lang="de-DE" sz="2400" kern="0" dirty="0" smtClean="0">
+                <a:solidFill>
+                  <a:srgbClr val="003B79"/>
+                </a:solidFill>
+                <a:latin typeface="+mn-lt"/>
+              </a:rPr>
+              <a:t>Zuverlässigkeit		</a:t>
+            </a:r>
+            <a:r>
+              <a:rPr lang="de-DE" sz="2400" kern="0" dirty="0" smtClean="0">
+                <a:solidFill>
+                  <a:srgbClr val="003B79"/>
+                </a:solidFill>
+                <a:latin typeface="+mn-lt"/>
+              </a:rPr>
+              <a:t>1</a:t>
+            </a:r>
+            <a:endParaRPr lang="de-DE" sz="2400" kern="0" dirty="0" smtClean="0">
+              <a:solidFill>
+                <a:srgbClr val="003B79"/>
+              </a:solidFill>
+              <a:latin typeface="+mn-lt"/>
+            </a:endParaRPr>
+          </a:p>
+          <a:p>
+            <a:pPr algn="l"/>
+            <a:r>
+              <a:rPr lang="de-DE" sz="2400" kern="0" dirty="0" smtClean="0">
+                <a:solidFill>
+                  <a:srgbClr val="003B79"/>
+                </a:solidFill>
+                <a:latin typeface="+mn-lt"/>
+              </a:rPr>
+              <a:t>Funktionalität		</a:t>
+            </a:r>
+            <a:r>
+              <a:rPr lang="de-DE" sz="2400" kern="0" dirty="0" smtClean="0">
+                <a:solidFill>
+                  <a:srgbClr val="003B79"/>
+                </a:solidFill>
+                <a:latin typeface="+mn-lt"/>
+              </a:rPr>
+              <a:t>1</a:t>
+            </a:r>
+            <a:endParaRPr lang="de-DE" sz="2400" kern="0" dirty="0" smtClean="0">
+              <a:solidFill>
+                <a:srgbClr val="003B79"/>
+              </a:solidFill>
+              <a:latin typeface="+mn-lt"/>
             </a:endParaRPr>
           </a:p>
         </p:txBody>
@@ -12890,7 +14508,7 @@
     </p:spTree>
     <p:extLst>
       <p:ext uri="{BB962C8B-B14F-4D97-AF65-F5344CB8AC3E}">
-        <p14:creationId xmlns:p14="http://schemas.microsoft.com/office/powerpoint/2010/main" xmlns="" val="3973953230"/>
+        <p14:creationId xmlns="" xmlns:p14="http://schemas.microsoft.com/office/powerpoint/2010/main" val="2402780198"/>
       </p:ext>
     </p:extLst>
   </p:cSld>
@@ -12955,19 +14573,16 @@
                 <a:ea typeface="+mj-ea"/>
                 <a:cs typeface="+mj-cs"/>
               </a:rPr>
-              <a:t>6. </a:t>
-            </a:r>
-            <a:r>
-              <a:rPr lang="de-DE" sz="3200" dirty="0" smtClean="0">
-                <a:solidFill>
-                  <a:srgbClr val="003B79"/>
-                </a:solidFill>
-                <a:latin typeface="+mj-lt"/>
-                <a:ea typeface="+mj-ea"/>
-                <a:cs typeface="+mj-cs"/>
-              </a:rPr>
-              <a:t>Datenmodell (UML-Übersicht)</a:t>
-            </a:r>
+              <a:t>5. Produktleistungen</a:t>
+            </a:r>
+            <a:endParaRPr lang="de-DE" sz="3200" dirty="0" smtClean="0">
+              <a:solidFill>
+                <a:srgbClr val="003B79"/>
+              </a:solidFill>
+              <a:latin typeface="+mj-lt"/>
+              <a:ea typeface="+mj-ea"/>
+              <a:cs typeface="+mj-cs"/>
+            </a:endParaRPr>
           </a:p>
           <a:p>
             <a:pPr marL="457200" lvl="0" indent="-457200" algn="l"/>
@@ -13197,51 +14812,179 @@
           </a:p>
         </p:txBody>
       </p:sp>
-      <p:pic>
-        <p:nvPicPr>
-          <p:cNvPr id="2050" name="Picture 2" descr="E:\PRG4\Grafiken\Overall.PNG"/>
-          <p:cNvPicPr>
-            <a:picLocks noChangeAspect="1" noChangeArrowheads="1"/>
-          </p:cNvPicPr>
+      <p:sp>
+        <p:nvSpPr>
+          <p:cNvPr id="7" name="Rectangle 4"/>
+          <p:cNvSpPr txBox="1">
+            <a:spLocks noChangeArrowheads="1"/>
+          </p:cNvSpPr>
           <p:nvPr/>
-        </p:nvPicPr>
-        <p:blipFill>
-          <a:blip r:embed="rId3" cstate="print">
-            <a:extLst>
-              <a:ext uri="{28A0092B-C50C-407E-A947-70E740481C1C}">
-                <a14:useLocalDpi xmlns:a14="http://schemas.microsoft.com/office/drawing/2010/main" xmlns="" val="0"/>
-              </a:ext>
-            </a:extLst>
-          </a:blip>
-          <a:srcRect/>
-          <a:stretch>
-            <a:fillRect/>
-          </a:stretch>
-        </p:blipFill>
-        <p:spPr bwMode="auto">
+        </p:nvSpPr>
+        <p:spPr>
           <a:xfrm>
-            <a:off x="299008" y="1268760"/>
-            <a:ext cx="7905191" cy="5068540"/>
+            <a:off x="179512" y="1268239"/>
+            <a:ext cx="8820150" cy="5545137"/>
           </a:xfrm>
           <a:prstGeom prst="rect">
             <a:avLst/>
           </a:prstGeom>
-          <a:noFill/>
-          <a:extLst>
-            <a:ext uri="{909E8E84-426E-40DD-AFC4-6F175D3DCCD1}">
-              <a14:hiddenFill xmlns:a14="http://schemas.microsoft.com/office/drawing/2010/main" xmlns="">
+        </p:spPr>
+        <p:txBody>
+          <a:bodyPr/>
+          <a:lstStyle/>
+          <a:p>
+            <a:pPr algn="l"/>
+            <a:r>
+              <a:rPr lang="de-DE" sz="2400" b="0" kern="0" dirty="0" smtClean="0">
                 <a:solidFill>
-                  <a:srgbClr val="FFFFFF"/>
+                  <a:srgbClr val="003B79"/>
                 </a:solidFill>
-              </a14:hiddenFill>
-            </a:ext>
-          </a:extLst>
-        </p:spPr>
-      </p:pic>
+                <a:latin typeface="+mn-lt"/>
+              </a:rPr>
+              <a:t>Getrennte Nutzer</a:t>
+            </a:r>
+            <a:r>
+              <a:rPr lang="de-DE" sz="2400" b="0" kern="0" dirty="0" smtClean="0">
+                <a:solidFill>
+                  <a:srgbClr val="003B79"/>
+                </a:solidFill>
+                <a:latin typeface="+mn-lt"/>
+              </a:rPr>
+              <a:t>: </a:t>
+            </a:r>
+            <a:r>
+              <a:rPr lang="de-DE" sz="2400" b="0" kern="0" dirty="0" smtClean="0">
+                <a:solidFill>
+                  <a:srgbClr val="003B79"/>
+                </a:solidFill>
+                <a:latin typeface="+mn-lt"/>
+              </a:rPr>
+              <a:t>	Daten werden an Nutzer-ID gebunden</a:t>
+            </a:r>
+            <a:endParaRPr lang="de-DE" sz="2400" b="0" kern="0" dirty="0" smtClean="0">
+              <a:solidFill>
+                <a:srgbClr val="003B79"/>
+              </a:solidFill>
+              <a:latin typeface="+mn-lt"/>
+            </a:endParaRPr>
+          </a:p>
+          <a:p>
+            <a:pPr algn="l"/>
+            <a:r>
+              <a:rPr lang="de-DE" sz="2400" b="0" kern="0" dirty="0" smtClean="0">
+                <a:solidFill>
+                  <a:srgbClr val="003B79"/>
+                </a:solidFill>
+                <a:latin typeface="+mn-lt"/>
+              </a:rPr>
+              <a:t> </a:t>
+            </a:r>
+          </a:p>
+          <a:p>
+            <a:pPr algn="l"/>
+            <a:r>
+              <a:rPr lang="de-DE" sz="2400" b="0" kern="0" dirty="0" smtClean="0">
+                <a:solidFill>
+                  <a:srgbClr val="003B79"/>
+                </a:solidFill>
+                <a:latin typeface="+mn-lt"/>
+              </a:rPr>
+              <a:t>Akkumulation</a:t>
+            </a:r>
+            <a:r>
+              <a:rPr lang="de-DE" sz="2400" b="0" kern="0" dirty="0" smtClean="0">
+                <a:solidFill>
+                  <a:srgbClr val="003B79"/>
+                </a:solidFill>
+                <a:latin typeface="+mn-lt"/>
+              </a:rPr>
+              <a:t>: </a:t>
+            </a:r>
+            <a:r>
+              <a:rPr lang="de-DE" sz="2400" b="0" kern="0" dirty="0" smtClean="0">
+                <a:solidFill>
+                  <a:srgbClr val="003B79"/>
+                </a:solidFill>
+                <a:latin typeface="+mn-lt"/>
+              </a:rPr>
+              <a:t>	Bei </a:t>
+            </a:r>
+            <a:r>
+              <a:rPr lang="de-DE" sz="2400" b="0" kern="0" dirty="0" smtClean="0">
+                <a:solidFill>
+                  <a:srgbClr val="003B79"/>
+                </a:solidFill>
+                <a:latin typeface="+mn-lt"/>
+              </a:rPr>
+              <a:t>fehlerhafter Eingabe erhält Nutzer eine </a:t>
+            </a:r>
+            <a:r>
+              <a:rPr lang="de-DE" sz="2400" b="0" kern="0" dirty="0" smtClean="0">
+                <a:solidFill>
+                  <a:srgbClr val="003B79"/>
+                </a:solidFill>
+                <a:latin typeface="+mn-lt"/>
+              </a:rPr>
+              <a:t>			Liste </a:t>
+            </a:r>
+            <a:r>
+              <a:rPr lang="de-DE" sz="2400" b="0" kern="0" dirty="0" smtClean="0">
+                <a:solidFill>
+                  <a:srgbClr val="003B79"/>
+                </a:solidFill>
+                <a:latin typeface="+mn-lt"/>
+              </a:rPr>
+              <a:t>aller eingegebenen Fehler.</a:t>
+            </a:r>
+            <a:endParaRPr lang="de-DE" sz="2400" b="0" kern="0" dirty="0" smtClean="0">
+              <a:solidFill>
+                <a:srgbClr val="003B79"/>
+              </a:solidFill>
+              <a:latin typeface="+mn-lt"/>
+            </a:endParaRPr>
+          </a:p>
+          <a:p>
+            <a:pPr algn="l"/>
+            <a:r>
+              <a:rPr lang="de-DE" sz="2400" b="0" kern="0" dirty="0" smtClean="0">
+                <a:solidFill>
+                  <a:srgbClr val="003B79"/>
+                </a:solidFill>
+                <a:latin typeface="+mn-lt"/>
+              </a:rPr>
+              <a:t> </a:t>
+            </a:r>
+          </a:p>
+          <a:p>
+            <a:pPr algn="l"/>
+            <a:r>
+              <a:rPr lang="de-DE" sz="2400" b="0" kern="0" dirty="0" smtClean="0">
+                <a:solidFill>
+                  <a:srgbClr val="003B79"/>
+                </a:solidFill>
+                <a:latin typeface="+mn-lt"/>
+              </a:rPr>
+              <a:t>Toleranz:		Nach Falscheingaben Korrekturen an 				betreffenden Stellen vornehmen statt 				komplette Neueingabe</a:t>
+            </a:r>
+          </a:p>
+          <a:p>
+            <a:pPr algn="l"/>
+            <a:r>
+              <a:rPr lang="de-DE" b="0" kern="0" dirty="0" smtClean="0">
+                <a:solidFill>
+                  <a:srgbClr val="003B79"/>
+                </a:solidFill>
+                <a:latin typeface="+mn-lt"/>
+              </a:rPr>
+              <a:t> </a:t>
+            </a:r>
+          </a:p>
+        </p:txBody>
+      </p:sp>
     </p:spTree>
     <p:extLst>
       <p:ext uri="{BB962C8B-B14F-4D97-AF65-F5344CB8AC3E}">
-        <p14:creationId xmlns:p14="http://schemas.microsoft.com/office/powerpoint/2010/main" xmlns="" val="3539249763"/>
+        <p14:creationId xmlns="" xmlns:p14="http://schemas.microsoft.com/office/powerpoint/2010/main" val="2402780198"/>
       </p:ext>
     </p:extLst>
   </p:cSld>
@@ -13306,19 +15049,16 @@
                 <a:ea typeface="+mj-ea"/>
                 <a:cs typeface="+mj-cs"/>
               </a:rPr>
-              <a:t>6. </a:t>
-            </a:r>
-            <a:r>
-              <a:rPr lang="de-DE" sz="3200" dirty="0" smtClean="0">
-                <a:solidFill>
-                  <a:srgbClr val="003B79"/>
-                </a:solidFill>
-                <a:latin typeface="+mj-lt"/>
-                <a:ea typeface="+mj-ea"/>
-                <a:cs typeface="+mj-cs"/>
-              </a:rPr>
-              <a:t>Datenmodell (UML-Model)</a:t>
-            </a:r>
+              <a:t>5. Produktleistungen</a:t>
+            </a:r>
+            <a:endParaRPr lang="de-DE" sz="3200" dirty="0" smtClean="0">
+              <a:solidFill>
+                <a:srgbClr val="003B79"/>
+              </a:solidFill>
+              <a:latin typeface="+mj-lt"/>
+              <a:ea typeface="+mj-ea"/>
+              <a:cs typeface="+mj-cs"/>
+            </a:endParaRPr>
           </a:p>
           <a:p>
             <a:pPr marL="457200" lvl="0" indent="-457200" algn="l"/>
@@ -13548,51 +15288,182 @@
           </a:p>
         </p:txBody>
       </p:sp>
-      <p:pic>
-        <p:nvPicPr>
-          <p:cNvPr id="3074" name="Picture 2" descr="E:\PRG4\Grafiken\Model_Database.PNG"/>
-          <p:cNvPicPr>
-            <a:picLocks noChangeAspect="1" noChangeArrowheads="1"/>
-          </p:cNvPicPr>
+      <p:sp>
+        <p:nvSpPr>
+          <p:cNvPr id="7" name="Rectangle 4"/>
+          <p:cNvSpPr txBox="1">
+            <a:spLocks noChangeArrowheads="1"/>
+          </p:cNvSpPr>
           <p:nvPr/>
-        </p:nvPicPr>
-        <p:blipFill>
-          <a:blip r:embed="rId3" cstate="print">
-            <a:extLst>
-              <a:ext uri="{28A0092B-C50C-407E-A947-70E740481C1C}">
-                <a14:useLocalDpi xmlns:a14="http://schemas.microsoft.com/office/drawing/2010/main" xmlns="" val="0"/>
-              </a:ext>
-            </a:extLst>
-          </a:blip>
-          <a:srcRect/>
-          <a:stretch>
-            <a:fillRect/>
-          </a:stretch>
-        </p:blipFill>
-        <p:spPr bwMode="auto">
+        </p:nvSpPr>
+        <p:spPr>
           <a:xfrm>
-            <a:off x="1259632" y="1232202"/>
-            <a:ext cx="5688632" cy="5186204"/>
+            <a:off x="179512" y="1268239"/>
+            <a:ext cx="8820150" cy="5545137"/>
           </a:xfrm>
           <a:prstGeom prst="rect">
             <a:avLst/>
           </a:prstGeom>
-          <a:noFill/>
-          <a:extLst>
-            <a:ext uri="{909E8E84-426E-40DD-AFC4-6F175D3DCCD1}">
-              <a14:hiddenFill xmlns:a14="http://schemas.microsoft.com/office/drawing/2010/main" xmlns="">
+        </p:spPr>
+        <p:txBody>
+          <a:bodyPr/>
+          <a:lstStyle/>
+          <a:p>
+            <a:pPr algn="l"/>
+            <a:r>
+              <a:rPr lang="de-DE" sz="2400" b="0" kern="0" dirty="0" smtClean="0">
                 <a:solidFill>
-                  <a:srgbClr val="FFFFFF"/>
+                  <a:srgbClr val="003B79"/>
                 </a:solidFill>
-              </a14:hiddenFill>
-            </a:ext>
-          </a:extLst>
-        </p:spPr>
-      </p:pic>
+                <a:latin typeface="+mn-lt"/>
+              </a:rPr>
+              <a:t>Datensicherheit</a:t>
+            </a:r>
+            <a:r>
+              <a:rPr lang="de-DE" sz="2400" b="0" kern="0" dirty="0" smtClean="0">
+                <a:solidFill>
+                  <a:srgbClr val="003B79"/>
+                </a:solidFill>
+                <a:latin typeface="+mn-lt"/>
+              </a:rPr>
+              <a:t>: </a:t>
+            </a:r>
+            <a:r>
+              <a:rPr lang="de-DE" sz="2400" b="0" kern="0" dirty="0" smtClean="0">
+                <a:solidFill>
+                  <a:srgbClr val="003B79"/>
+                </a:solidFill>
+                <a:latin typeface="+mn-lt"/>
+              </a:rPr>
+              <a:t>	Nutzer haben nur Einblick in die Daten, die 			sie selbst angelegt haben</a:t>
+            </a:r>
+            <a:endParaRPr lang="de-DE" sz="2400" b="0" kern="0" dirty="0" smtClean="0">
+              <a:solidFill>
+                <a:srgbClr val="003B79"/>
+              </a:solidFill>
+              <a:latin typeface="+mn-lt"/>
+            </a:endParaRPr>
+          </a:p>
+          <a:p>
+            <a:pPr algn="l"/>
+            <a:r>
+              <a:rPr lang="de-DE" sz="2400" b="0" kern="0" dirty="0" smtClean="0">
+                <a:solidFill>
+                  <a:srgbClr val="003B79"/>
+                </a:solidFill>
+                <a:latin typeface="+mn-lt"/>
+              </a:rPr>
+              <a:t> </a:t>
+            </a:r>
+          </a:p>
+          <a:p>
+            <a:pPr algn="l"/>
+            <a:r>
+              <a:rPr lang="de-DE" sz="2400" b="0" kern="0" dirty="0" smtClean="0">
+                <a:solidFill>
+                  <a:srgbClr val="003B79"/>
+                </a:solidFill>
+                <a:latin typeface="+mn-lt"/>
+              </a:rPr>
+              <a:t>Verfügbarkeit</a:t>
+            </a:r>
+            <a:r>
+              <a:rPr lang="de-DE" sz="2400" b="0" kern="0" dirty="0" smtClean="0">
+                <a:solidFill>
+                  <a:srgbClr val="003B79"/>
+                </a:solidFill>
+                <a:latin typeface="+mn-lt"/>
+              </a:rPr>
+              <a:t>: </a:t>
+            </a:r>
+            <a:r>
+              <a:rPr lang="de-DE" sz="2400" b="0" kern="0" dirty="0" smtClean="0">
+                <a:solidFill>
+                  <a:srgbClr val="003B79"/>
+                </a:solidFill>
+                <a:latin typeface="+mn-lt"/>
+              </a:rPr>
+              <a:t>	Server muss immer </a:t>
+            </a:r>
+            <a:r>
+              <a:rPr lang="de-DE" sz="2400" b="0" kern="0" dirty="0" smtClean="0">
+                <a:solidFill>
+                  <a:srgbClr val="003B79"/>
+                </a:solidFill>
+                <a:latin typeface="+mn-lt"/>
+              </a:rPr>
+              <a:t>erreichbar </a:t>
+            </a:r>
+            <a:r>
+              <a:rPr lang="de-DE" sz="2400" b="0" kern="0" dirty="0" smtClean="0">
+                <a:solidFill>
+                  <a:srgbClr val="003B79"/>
+                </a:solidFill>
+                <a:latin typeface="+mn-lt"/>
+              </a:rPr>
+              <a:t>sein</a:t>
+            </a:r>
+            <a:endParaRPr lang="de-DE" sz="2400" b="0" kern="0" dirty="0" smtClean="0">
+              <a:solidFill>
+                <a:srgbClr val="003B79"/>
+              </a:solidFill>
+              <a:latin typeface="+mn-lt"/>
+            </a:endParaRPr>
+          </a:p>
+          <a:p>
+            <a:pPr algn="l"/>
+            <a:r>
+              <a:rPr lang="de-DE" sz="2400" b="0" kern="0" dirty="0" smtClean="0">
+                <a:solidFill>
+                  <a:srgbClr val="003B79"/>
+                </a:solidFill>
+                <a:latin typeface="+mn-lt"/>
+              </a:rPr>
+              <a:t> </a:t>
+            </a:r>
+          </a:p>
+          <a:p>
+            <a:pPr algn="l"/>
+            <a:r>
+              <a:rPr lang="de-DE" sz="2400" b="0" kern="0" dirty="0" smtClean="0">
+                <a:solidFill>
+                  <a:srgbClr val="003B79"/>
+                </a:solidFill>
+                <a:latin typeface="+mn-lt"/>
+              </a:rPr>
+              <a:t>Archivierung</a:t>
+            </a:r>
+            <a:r>
+              <a:rPr lang="de-DE" sz="2400" b="0" kern="0" dirty="0" smtClean="0">
+                <a:solidFill>
+                  <a:srgbClr val="003B79"/>
+                </a:solidFill>
+                <a:latin typeface="+mn-lt"/>
+              </a:rPr>
+              <a:t>: </a:t>
+            </a:r>
+            <a:r>
+              <a:rPr lang="de-DE" sz="2400" b="0" kern="0" dirty="0" smtClean="0">
+                <a:solidFill>
+                  <a:srgbClr val="003B79"/>
+                </a:solidFill>
+                <a:latin typeface="+mn-lt"/>
+              </a:rPr>
+              <a:t>	Rechnungen können nicht 	vom Nutzer 				gelöscht werden</a:t>
+            </a:r>
+            <a:endParaRPr lang="de-DE" sz="2400" b="0" kern="0" dirty="0">
+              <a:solidFill>
+                <a:srgbClr val="003B79"/>
+              </a:solidFill>
+              <a:latin typeface="+mn-lt"/>
+            </a:endParaRPr>
+          </a:p>
+        </p:txBody>
+      </p:sp>
     </p:spTree>
     <p:extLst>
       <p:ext uri="{BB962C8B-B14F-4D97-AF65-F5344CB8AC3E}">
-        <p14:creationId xmlns:p14="http://schemas.microsoft.com/office/powerpoint/2010/main" xmlns="" val="2028648019"/>
+        <p14:creationId xmlns="" xmlns:p14="http://schemas.microsoft.com/office/powerpoint/2010/main" val="2402780198"/>
       </p:ext>
     </p:extLst>
   </p:cSld>
@@ -13626,324 +15497,129 @@
           <a:chExt cx="0" cy="0"/>
         </a:xfrm>
       </p:grpSpPr>
+      <p:graphicFrame>
+        <p:nvGraphicFramePr>
+          <p:cNvPr id="3" name="Inhaltsplatzhalter 2"/>
+          <p:cNvGraphicFramePr>
+            <a:graphicFrameLocks noGrp="1"/>
+          </p:cNvGraphicFramePr>
+          <p:nvPr>
+            <p:ph idx="1"/>
+            <p:extLst>
+              <p:ext uri="{D42A27DB-BD31-4B8C-83A1-F6EECF244321}">
+                <p14:modId xmlns="" xmlns:p14="http://schemas.microsoft.com/office/powerpoint/2010/main" val="2122085790"/>
+              </p:ext>
+            </p:extLst>
+          </p:nvPr>
+        </p:nvGraphicFramePr>
+        <p:xfrm>
+          <a:off x="216346" y="980429"/>
+          <a:ext cx="8820150" cy="5545137"/>
+        </p:xfrm>
+        <a:graphic>
+          <a:graphicData uri="http://schemas.openxmlformats.org/drawingml/2006/diagram">
+            <dgm:relIds xmlns:dgm="http://schemas.openxmlformats.org/drawingml/2006/diagram" xmlns:r="http://schemas.openxmlformats.org/officeDocument/2006/relationships" r:dm="rId3" r:lo="rId4" r:qs="rId5" r:cs="rId6"/>
+          </a:graphicData>
+        </a:graphic>
+      </p:graphicFrame>
       <p:sp>
         <p:nvSpPr>
-          <p:cNvPr id="4" name="Rectangle 2"/>
-          <p:cNvSpPr txBox="1">
-            <a:spLocks noChangeArrowheads="1"/>
+          <p:cNvPr id="8770562" name="Rectangle 2"/>
+          <p:cNvSpPr>
+            <a:spLocks noGrp="1" noChangeArrowheads="1"/>
           </p:cNvSpPr>
-          <p:nvPr/>
+          <p:nvPr>
+            <p:ph type="title"/>
+          </p:nvPr>
         </p:nvSpPr>
         <p:spPr>
           <a:xfrm>
-            <a:off x="323626" y="357188"/>
+            <a:off x="198681" y="321146"/>
             <a:ext cx="6624638" cy="503237"/>
           </a:xfrm>
-          <a:prstGeom prst="rect">
-            <a:avLst/>
-          </a:prstGeom>
         </p:spPr>
         <p:txBody>
           <a:bodyPr/>
           <a:lstStyle/>
           <a:p>
-            <a:pPr marL="457200" lvl="0" indent="-457200" algn="l"/>
-            <a:r>
-              <a:rPr lang="de-DE" sz="3200" dirty="0" smtClean="0">
-                <a:solidFill>
-                  <a:srgbClr val="003B79"/>
-                </a:solidFill>
-                <a:latin typeface="+mj-lt"/>
-                <a:ea typeface="+mj-ea"/>
-                <a:cs typeface="+mj-cs"/>
-              </a:rPr>
+            <a:r>
+              <a:rPr lang="de-DE" sz="3200" dirty="0" smtClean="0"/>
               <a:t>6. </a:t>
             </a:r>
             <a:r>
-              <a:rPr lang="de-DE" sz="3200" dirty="0" smtClean="0">
-                <a:solidFill>
-                  <a:srgbClr val="003B79"/>
-                </a:solidFill>
-                <a:latin typeface="+mj-lt"/>
-                <a:ea typeface="+mj-ea"/>
-                <a:cs typeface="+mj-cs"/>
-              </a:rPr>
-              <a:t>Datenmodell (UML-Model)</a:t>
-            </a:r>
-          </a:p>
-          <a:p>
-            <a:pPr marL="457200" lvl="0" indent="-457200" algn="l"/>
-            <a:endParaRPr lang="de-DE" sz="3200" dirty="0" smtClean="0">
-              <a:solidFill>
-                <a:srgbClr val="003B79"/>
-              </a:solidFill>
-              <a:latin typeface="+mj-lt"/>
-              <a:ea typeface="+mj-ea"/>
-              <a:cs typeface="+mj-cs"/>
-            </a:endParaRPr>
+              <a:rPr lang="de-DE" sz="3200" dirty="0" smtClean="0"/>
+              <a:t>Produktarchitektur</a:t>
+            </a:r>
+            <a:endParaRPr lang="de-DE" sz="3200" dirty="0"/>
           </a:p>
         </p:txBody>
       </p:sp>
       <p:sp>
         <p:nvSpPr>
-          <p:cNvPr id="5" name="Rectangle 4"/>
-          <p:cNvSpPr txBox="1">
-            <a:spLocks noChangeArrowheads="1"/>
-          </p:cNvSpPr>
+          <p:cNvPr id="4" name="Rechteck 3"/>
+          <p:cNvSpPr/>
           <p:nvPr/>
         </p:nvSpPr>
-        <p:spPr>
-          <a:xfrm>
-            <a:off x="323850" y="1052736"/>
-            <a:ext cx="8568630" cy="5545137"/>
-          </a:xfrm>
-          <a:prstGeom prst="rect">
-            <a:avLst/>
-          </a:prstGeom>
-        </p:spPr>
-        <p:txBody>
-          <a:bodyPr/>
-          <a:lstStyle/>
-          <a:p>
-            <a:pPr marL="742950" marR="0" lvl="1" indent="-285750" algn="l" defTabSz="914400" rtl="0" eaLnBrk="1" fontAlgn="base" latinLnBrk="0" hangingPunct="1">
-              <a:lnSpc>
-                <a:spcPct val="100000"/>
-              </a:lnSpc>
-              <a:spcBef>
-                <a:spcPct val="20000"/>
-              </a:spcBef>
-              <a:spcAft>
-                <a:spcPct val="20000"/>
-              </a:spcAft>
-              <a:buClrTx/>
-              <a:buSzTx/>
-              <a:tabLst/>
-              <a:defRPr/>
-            </a:pPr>
-            <a:endParaRPr lang="de-DE" sz="2400" b="0" kern="0" dirty="0" smtClean="0">
-              <a:solidFill>
-                <a:srgbClr val="003B79"/>
-              </a:solidFill>
-              <a:latin typeface="+mn-lt"/>
-            </a:endParaRPr>
-          </a:p>
-          <a:p>
-            <a:pPr marL="742950" lvl="1" indent="-285750" algn="l">
-              <a:spcBef>
-                <a:spcPct val="20000"/>
-              </a:spcBef>
-              <a:spcAft>
-                <a:spcPct val="20000"/>
-              </a:spcAft>
-            </a:pPr>
-            <a:endParaRPr lang="de-DE" sz="2400" b="0" kern="0" dirty="0">
-              <a:solidFill>
-                <a:srgbClr val="003B79"/>
-              </a:solidFill>
-              <a:latin typeface="+mn-lt"/>
-            </a:endParaRPr>
-          </a:p>
-          <a:p>
-            <a:pPr marL="742950" marR="0" lvl="1" indent="-285750" algn="l" defTabSz="914400" rtl="0" eaLnBrk="1" fontAlgn="base" latinLnBrk="0" hangingPunct="1">
-              <a:lnSpc>
-                <a:spcPct val="100000"/>
-              </a:lnSpc>
-              <a:spcBef>
-                <a:spcPct val="20000"/>
-              </a:spcBef>
-              <a:spcAft>
-                <a:spcPct val="20000"/>
-              </a:spcAft>
-              <a:buClrTx/>
-              <a:buSzTx/>
-              <a:tabLst/>
-              <a:defRPr/>
-            </a:pPr>
-            <a:endParaRPr lang="de-DE" sz="2400" b="0" kern="0" dirty="0">
-              <a:solidFill>
-                <a:srgbClr val="003B79"/>
-              </a:solidFill>
-              <a:latin typeface="+mn-lt"/>
-            </a:endParaRPr>
-          </a:p>
-          <a:p>
-            <a:pPr marL="742950" marR="0" lvl="1" indent="-285750" algn="l" defTabSz="914400" rtl="0" eaLnBrk="1" fontAlgn="base" latinLnBrk="0" hangingPunct="1">
-              <a:lnSpc>
-                <a:spcPct val="100000"/>
-              </a:lnSpc>
-              <a:spcBef>
-                <a:spcPct val="20000"/>
-              </a:spcBef>
-              <a:spcAft>
-                <a:spcPct val="20000"/>
-              </a:spcAft>
-              <a:buClrTx/>
-              <a:buSzTx/>
-              <a:tabLst/>
-              <a:defRPr/>
-            </a:pPr>
-            <a:endParaRPr lang="de-DE" sz="2400" b="0" kern="0" dirty="0" smtClean="0">
-              <a:solidFill>
-                <a:srgbClr val="003B79"/>
-              </a:solidFill>
-              <a:latin typeface="+mn-lt"/>
-            </a:endParaRPr>
-          </a:p>
-          <a:p>
-            <a:pPr marL="742950" marR="0" lvl="1" indent="-285750" algn="l" defTabSz="914400" rtl="0" eaLnBrk="1" fontAlgn="base" latinLnBrk="0" hangingPunct="1">
-              <a:lnSpc>
-                <a:spcPct val="100000"/>
-              </a:lnSpc>
-              <a:spcBef>
-                <a:spcPct val="20000"/>
-              </a:spcBef>
-              <a:spcAft>
-                <a:spcPct val="20000"/>
-              </a:spcAft>
-              <a:buClrTx/>
-              <a:buSzTx/>
-              <a:tabLst/>
-              <a:defRPr/>
-            </a:pPr>
-            <a:endParaRPr lang="de-DE" sz="2400" b="0" kern="0" dirty="0">
-              <a:solidFill>
-                <a:srgbClr val="003B79"/>
-              </a:solidFill>
-              <a:latin typeface="+mn-lt"/>
-            </a:endParaRPr>
-          </a:p>
-          <a:p>
-            <a:pPr marL="742950" marR="0" lvl="1" indent="-285750" algn="l" defTabSz="914400" rtl="0" eaLnBrk="1" fontAlgn="base" latinLnBrk="0" hangingPunct="1">
-              <a:lnSpc>
-                <a:spcPct val="100000"/>
-              </a:lnSpc>
-              <a:spcBef>
-                <a:spcPct val="20000"/>
-              </a:spcBef>
-              <a:spcAft>
-                <a:spcPct val="20000"/>
-              </a:spcAft>
-              <a:buClrTx/>
-              <a:buSzTx/>
-              <a:tabLst/>
-              <a:defRPr/>
-            </a:pPr>
-            <a:endParaRPr kumimoji="0" lang="de-DE" sz="2400" b="0" i="0" u="none" strike="noStrike" kern="0" cap="none" spc="0" normalizeH="0" baseline="0" noProof="0" dirty="0" smtClean="0">
-              <a:ln>
-                <a:noFill/>
-              </a:ln>
-              <a:solidFill>
-                <a:srgbClr val="003B79"/>
-              </a:solidFill>
-              <a:effectLst/>
-              <a:uLnTx/>
-              <a:uFillTx/>
-              <a:latin typeface="+mn-lt"/>
-            </a:endParaRPr>
-          </a:p>
-        </p:txBody>
-      </p:sp>
-      <p:sp>
-        <p:nvSpPr>
-          <p:cNvPr id="9" name="Rectangle 4"/>
-          <p:cNvSpPr txBox="1">
-            <a:spLocks noChangeArrowheads="1"/>
-          </p:cNvSpPr>
-          <p:nvPr/>
-        </p:nvSpPr>
-        <p:spPr>
-          <a:xfrm>
-            <a:off x="792410" y="1052736"/>
-            <a:ext cx="8820150" cy="5545137"/>
-          </a:xfrm>
-          <a:prstGeom prst="rect">
-            <a:avLst/>
-          </a:prstGeom>
-        </p:spPr>
-        <p:txBody>
-          <a:bodyPr/>
-          <a:lstStyle/>
-          <a:p>
-            <a:pPr marL="457200" marR="0" lvl="0" indent="-457200" algn="l" defTabSz="914400" rtl="0" eaLnBrk="1" fontAlgn="base" latinLnBrk="0" hangingPunct="1">
-              <a:lnSpc>
-                <a:spcPct val="100000"/>
-              </a:lnSpc>
-              <a:spcBef>
-                <a:spcPct val="20000"/>
-              </a:spcBef>
-              <a:spcAft>
-                <a:spcPct val="20000"/>
-              </a:spcAft>
-              <a:buClrTx/>
-              <a:buSzTx/>
-              <a:tabLst/>
-              <a:defRPr/>
-            </a:pPr>
-            <a:r>
-              <a:rPr kumimoji="0" lang="de-DE" sz="2400" b="0" i="0" u="none" strike="noStrike" kern="0" cap="none" spc="0" normalizeH="0" baseline="0" noProof="0" dirty="0" smtClean="0">
-                <a:ln>
-                  <a:noFill/>
-                </a:ln>
-                <a:solidFill>
-                  <a:srgbClr val="003B79"/>
-                </a:solidFill>
-                <a:effectLst/>
-                <a:uLnTx/>
-                <a:uFillTx/>
-                <a:latin typeface="+mn-lt"/>
-                <a:ea typeface="+mn-ea"/>
-                <a:cs typeface="+mn-cs"/>
-              </a:rPr>
-              <a:t>			</a:t>
-            </a:r>
-          </a:p>
-        </p:txBody>
-      </p:sp>
-      <p:pic>
-        <p:nvPicPr>
-          <p:cNvPr id="4098" name="Picture 2" descr="E:\PRG4\Grafiken\IO_Database.PNG"/>
-          <p:cNvPicPr>
-            <a:picLocks noChangeAspect="1" noChangeArrowheads="1"/>
-          </p:cNvPicPr>
-          <p:nvPr/>
-        </p:nvPicPr>
-        <p:blipFill>
-          <a:blip r:embed="rId3" cstate="print">
-            <a:extLst>
-              <a:ext uri="{28A0092B-C50C-407E-A947-70E740481C1C}">
-                <a14:useLocalDpi xmlns:a14="http://schemas.microsoft.com/office/drawing/2010/main" xmlns="" val="0"/>
-              </a:ext>
-            </a:extLst>
-          </a:blip>
-          <a:srcRect/>
-          <a:stretch>
-            <a:fillRect/>
-          </a:stretch>
-        </p:blipFill>
         <p:spPr bwMode="auto">
           <a:xfrm>
-            <a:off x="715949" y="1988840"/>
-            <a:ext cx="7822897" cy="3024336"/>
+            <a:off x="455855" y="3176934"/>
+            <a:ext cx="2520280" cy="1152128"/>
           </a:xfrm>
           <a:prstGeom prst="rect">
             <a:avLst/>
           </a:prstGeom>
           <a:noFill/>
-          <a:extLst>
-            <a:ext uri="{909E8E84-426E-40DD-AFC4-6F175D3DCCD1}">
-              <a14:hiddenFill xmlns:a14="http://schemas.microsoft.com/office/drawing/2010/main" xmlns="">
-                <a:solidFill>
-                  <a:srgbClr val="FFFFFF"/>
-                </a:solidFill>
-              </a14:hiddenFill>
-            </a:ext>
-          </a:extLst>
+          <a:ln w="9525" cap="flat" cmpd="sng" algn="ctr">
+            <a:noFill/>
+            <a:prstDash val="solid"/>
+            <a:round/>
+            <a:headEnd type="none" w="med" len="med"/>
+            <a:tailEnd type="none" w="med" len="med"/>
+          </a:ln>
+          <a:effectLst/>
         </p:spPr>
-      </p:pic>
+        <p:txBody>
+          <a:bodyPr vert="horz" wrap="square" lIns="91440" tIns="45720" rIns="91440" bIns="45720" numCol="1" rtlCol="0" anchor="t" anchorCtr="0" compatLnSpc="1">
+            <a:prstTxWarp prst="textNoShape">
+              <a:avLst/>
+            </a:prstTxWarp>
+            <a:spAutoFit/>
+          </a:bodyPr>
+          <a:lstStyle/>
+          <a:p>
+            <a:pPr marL="0" marR="0" indent="0" algn="ctr" defTabSz="914400" rtl="0" eaLnBrk="1" fontAlgn="base" latinLnBrk="0" hangingPunct="1">
+              <a:lnSpc>
+                <a:spcPct val="100000"/>
+              </a:lnSpc>
+              <a:spcBef>
+                <a:spcPct val="0"/>
+              </a:spcBef>
+              <a:spcAft>
+                <a:spcPct val="0"/>
+              </a:spcAft>
+              <a:buClrTx/>
+              <a:buSzTx/>
+              <a:buFontTx/>
+              <a:buNone/>
+              <a:tabLst/>
+            </a:pPr>
+            <a:endParaRPr kumimoji="0" lang="de-DE" sz="1800" b="1" i="0" u="none" strike="noStrike" cap="none" normalizeH="0" baseline="0" smtClean="0">
+              <a:ln>
+                <a:noFill/>
+              </a:ln>
+              <a:solidFill>
+                <a:srgbClr val="FFCC66"/>
+              </a:solidFill>
+              <a:effectLst/>
+              <a:latin typeface="Arial" charset="0"/>
+            </a:endParaRPr>
+          </a:p>
+        </p:txBody>
+      </p:sp>
     </p:spTree>
     <p:extLst>
       <p:ext uri="{BB962C8B-B14F-4D97-AF65-F5344CB8AC3E}">
-        <p14:creationId xmlns:p14="http://schemas.microsoft.com/office/powerpoint/2010/main" xmlns="" val="2028648019"/>
+        <p14:creationId xmlns="" xmlns:p14="http://schemas.microsoft.com/office/powerpoint/2010/main" val="3973953230"/>
       </p:ext>
     </p:extLst>
   </p:cSld>

</xml_diff>

<commit_message>
Zielbestimmung und Produkteinsatz überarbeitet
</commit_message>
<xml_diff>
--- a/Präsentation PRG4.pptx
+++ b/Präsentation PRG4.pptx
@@ -9867,18 +9867,7 @@
                 <a:ea typeface="+mj-ea"/>
                 <a:cs typeface="+mj-cs"/>
               </a:rPr>
-              <a:t>7. </a:t>
-            </a:r>
-            <a:r>
-              <a:rPr lang="de-DE" sz="3200" dirty="0" smtClean="0">
-                <a:solidFill>
-                  <a:srgbClr val="003B79"/>
-                </a:solidFill>
-                <a:latin typeface="+mj-lt"/>
-                <a:ea typeface="+mj-ea"/>
-                <a:cs typeface="+mj-cs"/>
-              </a:rPr>
-              <a:t>Datenmodell (UML-Übersicht)</a:t>
+              <a:t>7. Datenmodell (UML-Übersicht)</a:t>
             </a:r>
           </a:p>
           <a:p>
@@ -10121,7 +10110,7 @@
           <a:blip r:embed="rId3" cstate="print">
             <a:extLst>
               <a:ext uri="{28A0092B-C50C-407E-A947-70E740481C1C}">
-                <a14:useLocalDpi xmlns="" xmlns:a14="http://schemas.microsoft.com/office/drawing/2010/main" val="0"/>
+                <a14:useLocalDpi xmlns:a14="http://schemas.microsoft.com/office/drawing/2010/main" xmlns="" val="0"/>
               </a:ext>
             </a:extLst>
           </a:blip>
@@ -10141,7 +10130,7 @@
           <a:noFill/>
           <a:extLst>
             <a:ext uri="{909E8E84-426E-40DD-AFC4-6F175D3DCCD1}">
-              <a14:hiddenFill xmlns="" xmlns:a14="http://schemas.microsoft.com/office/drawing/2010/main">
+              <a14:hiddenFill xmlns:a14="http://schemas.microsoft.com/office/drawing/2010/main" xmlns="">
                 <a:solidFill>
                   <a:srgbClr val="FFFFFF"/>
                 </a:solidFill>
@@ -10153,7 +10142,7 @@
     </p:spTree>
     <p:extLst>
       <p:ext uri="{BB962C8B-B14F-4D97-AF65-F5344CB8AC3E}">
-        <p14:creationId xmlns="" xmlns:p14="http://schemas.microsoft.com/office/powerpoint/2010/main" val="3539249763"/>
+        <p14:creationId xmlns:p14="http://schemas.microsoft.com/office/powerpoint/2010/main" xmlns="" val="3539249763"/>
       </p:ext>
     </p:extLst>
   </p:cSld>
@@ -10218,18 +10207,7 @@
                 <a:ea typeface="+mj-ea"/>
                 <a:cs typeface="+mj-cs"/>
               </a:rPr>
-              <a:t>7. </a:t>
-            </a:r>
-            <a:r>
-              <a:rPr lang="de-DE" sz="3200" dirty="0" smtClean="0">
-                <a:solidFill>
-                  <a:srgbClr val="003B79"/>
-                </a:solidFill>
-                <a:latin typeface="+mj-lt"/>
-                <a:ea typeface="+mj-ea"/>
-                <a:cs typeface="+mj-cs"/>
-              </a:rPr>
-              <a:t>Datenmodell (UML-Model)</a:t>
+              <a:t>7. Datenmodell (UML-Model)</a:t>
             </a:r>
           </a:p>
           <a:p>
@@ -10472,7 +10450,7 @@
           <a:blip r:embed="rId3" cstate="print">
             <a:extLst>
               <a:ext uri="{28A0092B-C50C-407E-A947-70E740481C1C}">
-                <a14:useLocalDpi xmlns="" xmlns:a14="http://schemas.microsoft.com/office/drawing/2010/main" val="0"/>
+                <a14:useLocalDpi xmlns:a14="http://schemas.microsoft.com/office/drawing/2010/main" xmlns="" val="0"/>
               </a:ext>
             </a:extLst>
           </a:blip>
@@ -10492,7 +10470,7 @@
           <a:noFill/>
           <a:extLst>
             <a:ext uri="{909E8E84-426E-40DD-AFC4-6F175D3DCCD1}">
-              <a14:hiddenFill xmlns="" xmlns:a14="http://schemas.microsoft.com/office/drawing/2010/main">
+              <a14:hiddenFill xmlns:a14="http://schemas.microsoft.com/office/drawing/2010/main" xmlns="">
                 <a:solidFill>
                   <a:srgbClr val="FFFFFF"/>
                 </a:solidFill>
@@ -10504,7 +10482,7 @@
     </p:spTree>
     <p:extLst>
       <p:ext uri="{BB962C8B-B14F-4D97-AF65-F5344CB8AC3E}">
-        <p14:creationId xmlns="" xmlns:p14="http://schemas.microsoft.com/office/powerpoint/2010/main" val="2028648019"/>
+        <p14:creationId xmlns:p14="http://schemas.microsoft.com/office/powerpoint/2010/main" xmlns="" val="2028648019"/>
       </p:ext>
     </p:extLst>
   </p:cSld>
@@ -10569,18 +10547,7 @@
                 <a:ea typeface="+mj-ea"/>
                 <a:cs typeface="+mj-cs"/>
               </a:rPr>
-              <a:t>7. </a:t>
-            </a:r>
-            <a:r>
-              <a:rPr lang="de-DE" sz="3200" dirty="0" smtClean="0">
-                <a:solidFill>
-                  <a:srgbClr val="003B79"/>
-                </a:solidFill>
-                <a:latin typeface="+mj-lt"/>
-                <a:ea typeface="+mj-ea"/>
-                <a:cs typeface="+mj-cs"/>
-              </a:rPr>
-              <a:t>Datenmodell (UML-Model)</a:t>
+              <a:t>7. Datenmodell (UML-Model)</a:t>
             </a:r>
           </a:p>
           <a:p>
@@ -10823,7 +10790,7 @@
           <a:blip r:embed="rId3" cstate="print">
             <a:extLst>
               <a:ext uri="{28A0092B-C50C-407E-A947-70E740481C1C}">
-                <a14:useLocalDpi xmlns="" xmlns:a14="http://schemas.microsoft.com/office/drawing/2010/main" val="0"/>
+                <a14:useLocalDpi xmlns:a14="http://schemas.microsoft.com/office/drawing/2010/main" xmlns="" val="0"/>
               </a:ext>
             </a:extLst>
           </a:blip>
@@ -10843,7 +10810,7 @@
           <a:noFill/>
           <a:extLst>
             <a:ext uri="{909E8E84-426E-40DD-AFC4-6F175D3DCCD1}">
-              <a14:hiddenFill xmlns="" xmlns:a14="http://schemas.microsoft.com/office/drawing/2010/main">
+              <a14:hiddenFill xmlns:a14="http://schemas.microsoft.com/office/drawing/2010/main" xmlns="">
                 <a:solidFill>
                   <a:srgbClr val="FFFFFF"/>
                 </a:solidFill>
@@ -10855,7 +10822,7 @@
     </p:spTree>
     <p:extLst>
       <p:ext uri="{BB962C8B-B14F-4D97-AF65-F5344CB8AC3E}">
-        <p14:creationId xmlns="" xmlns:p14="http://schemas.microsoft.com/office/powerpoint/2010/main" val="2028648019"/>
+        <p14:creationId xmlns:p14="http://schemas.microsoft.com/office/powerpoint/2010/main" xmlns="" val="2028648019"/>
       </p:ext>
     </p:extLst>
   </p:cSld>
@@ -10920,18 +10887,7 @@
                 <a:ea typeface="+mj-ea"/>
                 <a:cs typeface="+mj-cs"/>
               </a:rPr>
-              <a:t>7. </a:t>
-            </a:r>
-            <a:r>
-              <a:rPr lang="de-DE" sz="3200" dirty="0" smtClean="0">
-                <a:solidFill>
-                  <a:srgbClr val="003B79"/>
-                </a:solidFill>
-                <a:latin typeface="+mj-lt"/>
-                <a:ea typeface="+mj-ea"/>
-                <a:cs typeface="+mj-cs"/>
-              </a:rPr>
-              <a:t>Datenmodell (UML-Controller)</a:t>
+              <a:t>7. Datenmodell (UML-Controller)</a:t>
             </a:r>
           </a:p>
           <a:p>
@@ -11174,7 +11130,7 @@
           <a:blip r:embed="rId3" cstate="print">
             <a:extLst>
               <a:ext uri="{28A0092B-C50C-407E-A947-70E740481C1C}">
-                <a14:useLocalDpi xmlns="" xmlns:a14="http://schemas.microsoft.com/office/drawing/2010/main" val="0"/>
+                <a14:useLocalDpi xmlns:a14="http://schemas.microsoft.com/office/drawing/2010/main" xmlns="" val="0"/>
               </a:ext>
             </a:extLst>
           </a:blip>
@@ -11194,7 +11150,7 @@
           <a:noFill/>
           <a:extLst>
             <a:ext uri="{909E8E84-426E-40DD-AFC4-6F175D3DCCD1}">
-              <a14:hiddenFill xmlns="" xmlns:a14="http://schemas.microsoft.com/office/drawing/2010/main">
+              <a14:hiddenFill xmlns:a14="http://schemas.microsoft.com/office/drawing/2010/main" xmlns="">
                 <a:solidFill>
                   <a:srgbClr val="FFFFFF"/>
                 </a:solidFill>
@@ -11206,7 +11162,7 @@
     </p:spTree>
     <p:extLst>
       <p:ext uri="{BB962C8B-B14F-4D97-AF65-F5344CB8AC3E}">
-        <p14:creationId xmlns="" xmlns:p14="http://schemas.microsoft.com/office/powerpoint/2010/main" val="2028648019"/>
+        <p14:creationId xmlns:p14="http://schemas.microsoft.com/office/powerpoint/2010/main" xmlns="" val="2028648019"/>
       </p:ext>
     </p:extLst>
   </p:cSld>
@@ -11271,18 +11227,7 @@
                 <a:ea typeface="+mj-ea"/>
                 <a:cs typeface="+mj-cs"/>
               </a:rPr>
-              <a:t>7. </a:t>
-            </a:r>
-            <a:r>
-              <a:rPr lang="de-DE" sz="3200" dirty="0" smtClean="0">
-                <a:solidFill>
-                  <a:srgbClr val="003B79"/>
-                </a:solidFill>
-                <a:latin typeface="+mj-lt"/>
-                <a:ea typeface="+mj-ea"/>
-                <a:cs typeface="+mj-cs"/>
-              </a:rPr>
-              <a:t>Datenmodell (UML-View)</a:t>
+              <a:t>7. Datenmodell (UML-View)</a:t>
             </a:r>
           </a:p>
           <a:p>
@@ -11525,7 +11470,7 @@
           <a:blip r:embed="rId3" cstate="print">
             <a:extLst>
               <a:ext uri="{28A0092B-C50C-407E-A947-70E740481C1C}">
-                <a14:useLocalDpi xmlns="" xmlns:a14="http://schemas.microsoft.com/office/drawing/2010/main" val="0"/>
+                <a14:useLocalDpi xmlns:a14="http://schemas.microsoft.com/office/drawing/2010/main" xmlns="" val="0"/>
               </a:ext>
             </a:extLst>
           </a:blip>
@@ -11545,7 +11490,7 @@
           <a:noFill/>
           <a:extLst>
             <a:ext uri="{909E8E84-426E-40DD-AFC4-6F175D3DCCD1}">
-              <a14:hiddenFill xmlns="" xmlns:a14="http://schemas.microsoft.com/office/drawing/2010/main">
+              <a14:hiddenFill xmlns:a14="http://schemas.microsoft.com/office/drawing/2010/main" xmlns="">
                 <a:solidFill>
                   <a:srgbClr val="FFFFFF"/>
                 </a:solidFill>
@@ -11557,7 +11502,7 @@
     </p:spTree>
     <p:extLst>
       <p:ext uri="{BB962C8B-B14F-4D97-AF65-F5344CB8AC3E}">
-        <p14:creationId xmlns="" xmlns:p14="http://schemas.microsoft.com/office/powerpoint/2010/main" val="2223991465"/>
+        <p14:creationId xmlns:p14="http://schemas.microsoft.com/office/powerpoint/2010/main" xmlns="" val="2223991465"/>
       </p:ext>
     </p:extLst>
   </p:cSld>
@@ -11601,7 +11546,7 @@
             <p:ph idx="1"/>
             <p:extLst>
               <p:ext uri="{D42A27DB-BD31-4B8C-83A1-F6EECF244321}">
-                <p14:modId xmlns="" xmlns:p14="http://schemas.microsoft.com/office/powerpoint/2010/main" val="2122085790"/>
+                <p14:modId xmlns:p14="http://schemas.microsoft.com/office/powerpoint/2010/main" xmlns="" val="2122085790"/>
               </p:ext>
             </p:extLst>
           </p:nvPr>
@@ -11638,11 +11583,7 @@
           <a:p>
             <a:r>
               <a:rPr lang="de-DE" sz="3200" dirty="0" smtClean="0"/>
-              <a:t>7. </a:t>
-            </a:r>
-            <a:r>
-              <a:rPr lang="de-DE" sz="3200" dirty="0" smtClean="0"/>
-              <a:t>Datenmodell (DB-Schema)</a:t>
+              <a:t>7. Datenmodell (DB-Schema)</a:t>
             </a:r>
             <a:endParaRPr lang="de-DE" sz="3200" dirty="0"/>
           </a:p>
@@ -11739,7 +11680,7 @@
     </p:spTree>
     <p:extLst>
       <p:ext uri="{BB962C8B-B14F-4D97-AF65-F5344CB8AC3E}">
-        <p14:creationId xmlns="" xmlns:p14="http://schemas.microsoft.com/office/powerpoint/2010/main" val="3973953230"/>
+        <p14:creationId xmlns:p14="http://schemas.microsoft.com/office/powerpoint/2010/main" xmlns="" val="3973953230"/>
       </p:ext>
     </p:extLst>
   </p:cSld>
@@ -11804,18 +11745,7 @@
                 <a:ea typeface="+mj-ea"/>
                 <a:cs typeface="+mj-cs"/>
               </a:rPr>
-              <a:t>8. </a:t>
-            </a:r>
-            <a:r>
-              <a:rPr lang="de-DE" sz="3200" dirty="0" smtClean="0">
-                <a:solidFill>
-                  <a:srgbClr val="003B79"/>
-                </a:solidFill>
-                <a:latin typeface="+mj-lt"/>
-                <a:ea typeface="+mj-ea"/>
-                <a:cs typeface="+mj-cs"/>
-              </a:rPr>
-              <a:t>Arbeitsaufteilung</a:t>
+              <a:t>8. Arbeitsaufteilung</a:t>
             </a:r>
           </a:p>
         </p:txBody>
@@ -12360,18 +12290,7 @@
                 <a:ea typeface="+mj-ea"/>
                 <a:cs typeface="+mj-cs"/>
               </a:rPr>
-              <a:t>9. </a:t>
-            </a:r>
-            <a:r>
-              <a:rPr lang="de-DE" sz="3200" dirty="0" smtClean="0">
-                <a:solidFill>
-                  <a:srgbClr val="003B79"/>
-                </a:solidFill>
-                <a:latin typeface="+mj-lt"/>
-                <a:ea typeface="+mj-ea"/>
-                <a:cs typeface="+mj-cs"/>
-              </a:rPr>
-              <a:t>Zeitplan</a:t>
+              <a:t>9. Zeitplan</a:t>
             </a:r>
           </a:p>
         </p:txBody>
@@ -12749,7 +12668,6 @@
               <a:rPr lang="de-DE" sz="2400" dirty="0" smtClean="0"/>
               <a:t>Produktleistung</a:t>
             </a:r>
-            <a:endParaRPr lang="de-DE" sz="2400" dirty="0" smtClean="0"/>
           </a:p>
           <a:p>
             <a:pPr marL="457200" indent="-457200">
@@ -13092,8 +13010,8 @@
         </p:nvSpPr>
         <p:spPr>
           <a:xfrm>
-            <a:off x="179512" y="1988840"/>
-            <a:ext cx="8424936" cy="3970318"/>
+            <a:off x="179512" y="1196752"/>
+            <a:ext cx="8424936" cy="6555641"/>
           </a:xfrm>
           <a:prstGeom prst="rect">
             <a:avLst/>
@@ -13114,7 +13032,7 @@
                 </a:solidFill>
                 <a:latin typeface="+mn-lt"/>
               </a:rPr>
-              <a:t>-webbasierter </a:t>
+              <a:t>-webbasierter Vertrieb von eigenen </a:t>
             </a:r>
             <a:r>
               <a:rPr lang="de-DE" sz="2400" b="0" kern="0" dirty="0" smtClean="0">
@@ -13123,8 +13041,14 @@
                 </a:solidFill>
                 <a:latin typeface="+mn-lt"/>
               </a:rPr>
-              <a:t>Vertrieb von eigenen Artikeln</a:t>
-            </a:r>
+              <a:t>Artikeln über einen Server</a:t>
+            </a:r>
+            <a:endParaRPr lang="de-DE" sz="2400" b="0" kern="0" dirty="0" smtClean="0">
+              <a:solidFill>
+                <a:srgbClr val="003B79"/>
+              </a:solidFill>
+              <a:latin typeface="+mn-lt"/>
+            </a:endParaRPr>
           </a:p>
           <a:p>
             <a:pPr algn="l"/>
@@ -13144,17 +13068,22 @@
                 </a:solidFill>
                 <a:latin typeface="+mn-lt"/>
               </a:rPr>
-              <a:t>-Nutzerabhängiges </a:t>
+              <a:t>-</a:t>
             </a:r>
             <a:r>
               <a:rPr lang="de-DE" sz="2400" b="0" kern="0" dirty="0" smtClean="0">
                 <a:solidFill>
                   <a:srgbClr val="003B79"/>
                 </a:solidFill>
-                <a:latin typeface="+mn-lt"/>
               </a:rPr>
-              <a:t>Auktionskontingent</a:t>
-            </a:r>
+              <a:t>Vereinfachung von Verwaltung und Analyse der Angebotenen Artikel </a:t>
+            </a:r>
+            <a:endParaRPr lang="de-DE" sz="2400" b="0" kern="0" dirty="0" smtClean="0">
+              <a:solidFill>
+                <a:srgbClr val="003B79"/>
+              </a:solidFill>
+              <a:latin typeface="+mn-lt"/>
+            </a:endParaRPr>
           </a:p>
           <a:p>
             <a:pPr algn="l"/>
@@ -13174,7 +13103,7 @@
                 </a:solidFill>
                 <a:latin typeface="+mn-lt"/>
               </a:rPr>
-              <a:t>-Verwaltung </a:t>
+              <a:t>-Verwaltung und Nutzung von </a:t>
             </a:r>
             <a:r>
               <a:rPr lang="de-DE" sz="2400" b="0" kern="0" dirty="0" smtClean="0">
@@ -13183,7 +13112,16 @@
                 </a:solidFill>
                 <a:latin typeface="+mn-lt"/>
               </a:rPr>
-              <a:t>und Nutzung von Internetauktionsplattformen verbessern</a:t>
+              <a:t>Internetauktionsplattformen durch Automatisierung </a:t>
+            </a:r>
+            <a:r>
+              <a:rPr lang="de-DE" sz="2400" b="0" kern="0" dirty="0" smtClean="0">
+                <a:solidFill>
+                  <a:srgbClr val="003B79"/>
+                </a:solidFill>
+                <a:latin typeface="+mn-lt"/>
+              </a:rPr>
+              <a:t>verbessern</a:t>
             </a:r>
           </a:p>
           <a:p>
@@ -13213,8 +13151,20 @@
                 </a:solidFill>
                 <a:latin typeface="+mn-lt"/>
               </a:rPr>
-              <a:t>Rechnungen </a:t>
-            </a:r>
+              <a:t>Rechnungen archivieren</a:t>
+            </a:r>
+          </a:p>
+          <a:p>
+            <a:pPr algn="l"/>
+            <a:endParaRPr lang="de-DE" sz="2400" b="0" kern="0" dirty="0" smtClean="0">
+              <a:solidFill>
+                <a:srgbClr val="003B79"/>
+              </a:solidFill>
+              <a:latin typeface="+mn-lt"/>
+            </a:endParaRPr>
+          </a:p>
+          <a:p>
+            <a:pPr algn="l"/>
             <a:r>
               <a:rPr lang="de-DE" sz="2400" b="0" kern="0" dirty="0" smtClean="0">
                 <a:solidFill>
@@ -13222,8 +13172,57 @@
                 </a:solidFill>
                 <a:latin typeface="+mn-lt"/>
               </a:rPr>
-              <a:t>halbautomatisch generieren</a:t>
-            </a:r>
+              <a:t>-Fehleingaben vermeiden</a:t>
+            </a:r>
+            <a:endParaRPr lang="de-DE" sz="2400" b="0" kern="0" dirty="0" smtClean="0">
+              <a:solidFill>
+                <a:srgbClr val="003B79"/>
+              </a:solidFill>
+              <a:latin typeface="+mn-lt"/>
+            </a:endParaRPr>
+          </a:p>
+          <a:p>
+            <a:pPr algn="l"/>
+            <a:endParaRPr lang="de-DE" sz="2400" b="0" kern="0" dirty="0" smtClean="0">
+              <a:solidFill>
+                <a:srgbClr val="003B79"/>
+              </a:solidFill>
+            </a:endParaRPr>
+          </a:p>
+          <a:p>
+            <a:pPr algn="l"/>
+            <a:r>
+              <a:rPr lang="de-DE" sz="2400" b="0" kern="0" dirty="0" smtClean="0">
+                <a:solidFill>
+                  <a:srgbClr val="003B79"/>
+                </a:solidFill>
+                <a:latin typeface="+mn-lt"/>
+              </a:rPr>
+              <a:t>-</a:t>
+            </a:r>
+            <a:r>
+              <a:rPr lang="de-DE" sz="2400" b="0" kern="0" dirty="0" smtClean="0">
+                <a:solidFill>
+                  <a:srgbClr val="003B79"/>
+                </a:solidFill>
+                <a:latin typeface="+mn-lt"/>
+              </a:rPr>
+              <a:t>Mehrbenutzer-Betrieb mit Anmeldevorgang ermöglichen</a:t>
+            </a:r>
+            <a:endParaRPr lang="de-DE" sz="2400" b="0" kern="0" dirty="0" smtClean="0">
+              <a:solidFill>
+                <a:srgbClr val="003B79"/>
+              </a:solidFill>
+            </a:endParaRPr>
+          </a:p>
+          <a:p>
+            <a:pPr algn="l"/>
+            <a:endParaRPr lang="de-DE" sz="2400" b="0" kern="0" dirty="0" smtClean="0">
+              <a:solidFill>
+                <a:srgbClr val="003B79"/>
+              </a:solidFill>
+              <a:latin typeface="+mn-lt"/>
+            </a:endParaRPr>
           </a:p>
           <a:p>
             <a:pPr algn="l"/>
@@ -13333,7 +13332,7 @@
         <p:spPr>
           <a:xfrm>
             <a:off x="179512" y="1312307"/>
-            <a:ext cx="8424936" cy="4708981"/>
+            <a:ext cx="8424936" cy="3970318"/>
           </a:xfrm>
           <a:prstGeom prst="rect">
             <a:avLst/>
@@ -13354,7 +13353,7 @@
                 </a:solidFill>
                 <a:latin typeface="+mn-lt"/>
               </a:rPr>
-              <a:t>Verwaltung </a:t>
+              <a:t>-Verwaltung </a:t>
             </a:r>
             <a:r>
               <a:rPr lang="de-DE" sz="2400" b="0" kern="0" dirty="0">
@@ -13411,16 +13410,7 @@
                 </a:solidFill>
                 <a:latin typeface="+mn-lt"/>
               </a:rPr>
-              <a:t>Vereinfachung von Verwaltung </a:t>
-            </a:r>
-            <a:r>
-              <a:rPr lang="de-DE" sz="2400" b="0" kern="0" dirty="0">
-                <a:solidFill>
-                  <a:srgbClr val="003B79"/>
-                </a:solidFill>
-                <a:latin typeface="+mn-lt"/>
-              </a:rPr>
-              <a:t>und Analyse der </a:t>
+              <a:t>-Austausch </a:t>
             </a:r>
             <a:r>
               <a:rPr lang="de-DE" sz="2400" b="0" kern="0" dirty="0" smtClean="0">
@@ -13429,31 +13419,7 @@
                 </a:solidFill>
                 <a:latin typeface="+mn-lt"/>
               </a:rPr>
-              <a:t>Angebotenen Artikel </a:t>
-            </a:r>
-          </a:p>
-          <a:p>
-            <a:pPr algn="just">
-              <a:buFontTx/>
-              <a:buChar char="-"/>
-            </a:pPr>
-            <a:endParaRPr lang="de-DE" sz="2400" b="0" kern="0" dirty="0" smtClean="0">
-              <a:solidFill>
-                <a:srgbClr val="003B79"/>
-              </a:solidFill>
-              <a:latin typeface="+mn-lt"/>
-            </a:endParaRPr>
-          </a:p>
-          <a:p>
-            <a:pPr algn="just"/>
-            <a:r>
-              <a:rPr lang="de-DE" sz="2400" b="0" kern="0" dirty="0" smtClean="0">
-                <a:solidFill>
-                  <a:srgbClr val="003B79"/>
-                </a:solidFill>
-                <a:latin typeface="+mn-lt"/>
-              </a:rPr>
-              <a:t>Austausch derzeitiger Tabellenverwaltung, dadurch: 	</a:t>
+              <a:t>derzeitiger Tabellenverwaltung, dadurch: 	</a:t>
             </a:r>
           </a:p>
           <a:p>
@@ -13513,7 +13479,38 @@
                 </a:solidFill>
                 <a:latin typeface="+mn-lt"/>
               </a:rPr>
-              <a:t>verbesserte Datenintegrität</a:t>
+              <a:t>verbesserte </a:t>
+            </a:r>
+            <a:r>
+              <a:rPr lang="de-DE" sz="2400" b="0" kern="0" dirty="0" smtClean="0">
+                <a:solidFill>
+                  <a:srgbClr val="003B79"/>
+                </a:solidFill>
+                <a:latin typeface="+mn-lt"/>
+              </a:rPr>
+              <a:t>Datenintegrität</a:t>
+            </a:r>
+          </a:p>
+          <a:p>
+            <a:pPr lvl="2" algn="just">
+              <a:buFontTx/>
+              <a:buChar char="-"/>
+            </a:pPr>
+            <a:r>
+              <a:rPr lang="de-DE" sz="2400" b="0" kern="0" dirty="0" smtClean="0">
+                <a:solidFill>
+                  <a:srgbClr val="003B79"/>
+                </a:solidFill>
+              </a:rPr>
+              <a:t>Rechnungen automatisch </a:t>
+            </a:r>
+            <a:r>
+              <a:rPr lang="de-DE" sz="2400" b="0" kern="0" dirty="0" smtClean="0">
+                <a:solidFill>
+                  <a:srgbClr val="003B79"/>
+                </a:solidFill>
+              </a:rPr>
+              <a:t>generieren</a:t>
             </a:r>
             <a:endParaRPr lang="de-DE" sz="2400" b="0" kern="0" dirty="0">
               <a:solidFill>
@@ -13839,7 +13836,7 @@
           <a:blip r:embed="rId3" cstate="print">
             <a:extLst>
               <a:ext uri="{28A0092B-C50C-407E-A947-70E740481C1C}">
-                <a14:useLocalDpi xmlns="" xmlns:a14="http://schemas.microsoft.com/office/drawing/2010/main" val="0"/>
+                <a14:useLocalDpi xmlns:a14="http://schemas.microsoft.com/office/drawing/2010/main" xmlns="" val="0"/>
               </a:ext>
             </a:extLst>
           </a:blip>
@@ -13859,7 +13856,7 @@
           <a:noFill/>
           <a:extLst>
             <a:ext uri="{909E8E84-426E-40DD-AFC4-6F175D3DCCD1}">
-              <a14:hiddenFill xmlns="" xmlns:a14="http://schemas.microsoft.com/office/drawing/2010/main">
+              <a14:hiddenFill xmlns:a14="http://schemas.microsoft.com/office/drawing/2010/main" xmlns="">
                 <a:solidFill>
                   <a:srgbClr val="FFFFFF"/>
                 </a:solidFill>
@@ -13871,7 +13868,7 @@
     </p:spTree>
     <p:extLst>
       <p:ext uri="{BB962C8B-B14F-4D97-AF65-F5344CB8AC3E}">
-        <p14:creationId xmlns="" xmlns:p14="http://schemas.microsoft.com/office/powerpoint/2010/main" val="2402780198"/>
+        <p14:creationId xmlns:p14="http://schemas.microsoft.com/office/powerpoint/2010/main" xmlns="" val="2402780198"/>
       </p:ext>
     </p:extLst>
   </p:cSld>
@@ -13938,14 +13935,6 @@
               </a:rPr>
               <a:t>4. Qualitätskriterien</a:t>
             </a:r>
-            <a:endParaRPr lang="de-DE" sz="3200" dirty="0" smtClean="0">
-              <a:solidFill>
-                <a:srgbClr val="003B79"/>
-              </a:solidFill>
-              <a:latin typeface="+mj-lt"/>
-              <a:ea typeface="+mj-ea"/>
-              <a:cs typeface="+mj-cs"/>
-            </a:endParaRPr>
           </a:p>
           <a:p>
             <a:pPr marL="457200" lvl="0" indent="-457200" algn="l"/>
@@ -14272,23 +14261,8 @@
                 </a:solidFill>
                 <a:latin typeface="+mn-lt"/>
               </a:rPr>
-              <a:t>Erweiterbarkeit		</a:t>
-            </a:r>
-            <a:r>
-              <a:rPr lang="de-DE" sz="2400" kern="0" dirty="0" smtClean="0">
-                <a:solidFill>
-                  <a:srgbClr val="003B79"/>
-                </a:solidFill>
-                <a:latin typeface="+mn-lt"/>
-              </a:rPr>
-              <a:t>2</a:t>
-            </a:r>
-            <a:endParaRPr lang="de-DE" sz="2400" kern="0" dirty="0" smtClean="0">
-              <a:solidFill>
-                <a:srgbClr val="003B79"/>
-              </a:solidFill>
-              <a:latin typeface="+mn-lt"/>
-            </a:endParaRPr>
+              <a:t>Erweiterbarkeit		2</a:t>
+            </a:r>
           </a:p>
           <a:p>
             <a:pPr algn="l"/>
@@ -14299,23 +14273,8 @@
                 </a:solidFill>
                 <a:latin typeface="+mn-lt"/>
               </a:rPr>
-              <a:t>Backups			</a:t>
-            </a:r>
-            <a:r>
-              <a:rPr lang="de-DE" sz="2400" b="0" kern="0" dirty="0" smtClean="0">
-                <a:solidFill>
-                  <a:srgbClr val="003B79"/>
-                </a:solidFill>
-                <a:latin typeface="+mn-lt"/>
-              </a:rPr>
-              <a:t>3</a:t>
-            </a:r>
-            <a:endParaRPr lang="de-DE" sz="2400" b="0" kern="0" dirty="0" smtClean="0">
-              <a:solidFill>
-                <a:srgbClr val="003B79"/>
-              </a:solidFill>
-              <a:latin typeface="+mn-lt"/>
-            </a:endParaRPr>
+              <a:t>Backups			3</a:t>
+            </a:r>
           </a:p>
           <a:p>
             <a:pPr algn="l"/>
@@ -14338,8 +14297,23 @@
                 </a:solidFill>
                 <a:latin typeface="+mn-lt"/>
               </a:rPr>
-              <a:t>Effizienz			</a:t>
-            </a:r>
+              <a:t>Effizienz			2</a:t>
+            </a:r>
+          </a:p>
+          <a:p>
+            <a:pPr algn="l"/>
+            <a:r>
+              <a:rPr lang="de-DE" sz="2400" b="0" kern="0" dirty="0" smtClean="0">
+                <a:solidFill>
+                  <a:srgbClr val="003B79"/>
+                </a:solidFill>
+                <a:latin typeface="+mn-lt"/>
+              </a:rPr>
+              <a:t>Skalierbarkeit		3</a:t>
+            </a:r>
+          </a:p>
+          <a:p>
+            <a:pPr algn="l"/>
             <a:r>
               <a:rPr lang="de-DE" sz="2400" kern="0" dirty="0" smtClean="0">
                 <a:solidFill>
@@ -14347,68 +14321,8 @@
                 </a:solidFill>
                 <a:latin typeface="+mn-lt"/>
               </a:rPr>
-              <a:t>2</a:t>
-            </a:r>
-            <a:endParaRPr lang="de-DE" sz="2400" kern="0" dirty="0" smtClean="0">
-              <a:solidFill>
-                <a:srgbClr val="003B79"/>
-              </a:solidFill>
-              <a:latin typeface="+mn-lt"/>
-            </a:endParaRPr>
-          </a:p>
-          <a:p>
-            <a:pPr algn="l"/>
-            <a:r>
-              <a:rPr lang="de-DE" sz="2400" b="0" kern="0" dirty="0" smtClean="0">
-                <a:solidFill>
-                  <a:srgbClr val="003B79"/>
-                </a:solidFill>
-                <a:latin typeface="+mn-lt"/>
-              </a:rPr>
-              <a:t>Skalierbarkeit		</a:t>
-            </a:r>
-            <a:r>
-              <a:rPr lang="de-DE" sz="2400" b="0" kern="0" dirty="0" smtClean="0">
-                <a:solidFill>
-                  <a:srgbClr val="003B79"/>
-                </a:solidFill>
-                <a:latin typeface="+mn-lt"/>
-              </a:rPr>
-              <a:t>3</a:t>
-            </a:r>
-            <a:endParaRPr lang="de-DE" sz="2400" b="0" kern="0" dirty="0" smtClean="0">
-              <a:solidFill>
-                <a:srgbClr val="003B79"/>
-              </a:solidFill>
-              <a:latin typeface="+mn-lt"/>
-            </a:endParaRPr>
-          </a:p>
-          <a:p>
-            <a:pPr algn="l"/>
-            <a:r>
-              <a:rPr lang="de-DE" sz="2400" kern="0" dirty="0" smtClean="0">
-                <a:solidFill>
-                  <a:srgbClr val="003B79"/>
-                </a:solidFill>
-                <a:latin typeface="+mn-lt"/>
-              </a:rPr>
-              <a:t>Benutzbarkeit		</a:t>
-            </a:r>
-            <a:r>
-              <a:rPr lang="de-DE" sz="2400" kern="0" dirty="0" smtClean="0">
-                <a:solidFill>
-                  <a:srgbClr val="003B79"/>
-                </a:solidFill>
-                <a:latin typeface="+mn-lt"/>
-              </a:rPr>
-              <a:t>2</a:t>
-            </a:r>
-            <a:endParaRPr lang="de-DE" sz="2400" kern="0" dirty="0" smtClean="0">
-              <a:solidFill>
-                <a:srgbClr val="003B79"/>
-              </a:solidFill>
-              <a:latin typeface="+mn-lt"/>
-            </a:endParaRPr>
+              <a:t>Benutzbarkeit		2</a:t>
+            </a:r>
           </a:p>
           <a:p>
             <a:pPr algn="l"/>
@@ -14431,8 +14345,11 @@
                 </a:solidFill>
                 <a:latin typeface="+mn-lt"/>
               </a:rPr>
-              <a:t>Änderbarkeit		</a:t>
-            </a:r>
+              <a:t>Änderbarkeit		2</a:t>
+            </a:r>
+          </a:p>
+          <a:p>
+            <a:pPr algn="l"/>
             <a:r>
               <a:rPr lang="de-DE" sz="2400" kern="0" dirty="0" smtClean="0">
                 <a:solidFill>
@@ -14440,14 +14357,8 @@
                 </a:solidFill>
                 <a:latin typeface="+mn-lt"/>
               </a:rPr>
-              <a:t>2</a:t>
-            </a:r>
-            <a:endParaRPr lang="de-DE" sz="2400" kern="0" dirty="0" smtClean="0">
-              <a:solidFill>
-                <a:srgbClr val="003B79"/>
-              </a:solidFill>
-              <a:latin typeface="+mn-lt"/>
-            </a:endParaRPr>
+              <a:t>Zuverlässigkeit		1</a:t>
+            </a:r>
           </a:p>
           <a:p>
             <a:pPr algn="l"/>
@@ -14458,57 +14369,15 @@
                 </a:solidFill>
                 <a:latin typeface="+mn-lt"/>
               </a:rPr>
-              <a:t>Zuverlässigkeit		</a:t>
-            </a:r>
-            <a:r>
-              <a:rPr lang="de-DE" sz="2400" kern="0" dirty="0" smtClean="0">
-                <a:solidFill>
-                  <a:srgbClr val="003B79"/>
-                </a:solidFill>
-                <a:latin typeface="+mn-lt"/>
-              </a:rPr>
-              <a:t>1</a:t>
-            </a:r>
-            <a:endParaRPr lang="de-DE" sz="2400" kern="0" dirty="0" smtClean="0">
-              <a:solidFill>
-                <a:srgbClr val="003B79"/>
-              </a:solidFill>
-              <a:latin typeface="+mn-lt"/>
-            </a:endParaRPr>
-          </a:p>
-          <a:p>
-            <a:pPr algn="l"/>
-            <a:r>
-              <a:rPr lang="de-DE" sz="2400" kern="0" dirty="0" smtClean="0">
-                <a:solidFill>
-                  <a:srgbClr val="003B79"/>
-                </a:solidFill>
-                <a:latin typeface="+mn-lt"/>
-              </a:rPr>
-              <a:t>Funktionalität		</a:t>
-            </a:r>
-            <a:r>
-              <a:rPr lang="de-DE" sz="2400" kern="0" dirty="0" smtClean="0">
-                <a:solidFill>
-                  <a:srgbClr val="003B79"/>
-                </a:solidFill>
-                <a:latin typeface="+mn-lt"/>
-              </a:rPr>
-              <a:t>1</a:t>
-            </a:r>
-            <a:endParaRPr lang="de-DE" sz="2400" kern="0" dirty="0" smtClean="0">
-              <a:solidFill>
-                <a:srgbClr val="003B79"/>
-              </a:solidFill>
-              <a:latin typeface="+mn-lt"/>
-            </a:endParaRPr>
+              <a:t>Funktionalität		1</a:t>
+            </a:r>
           </a:p>
         </p:txBody>
       </p:sp>
     </p:spTree>
     <p:extLst>
       <p:ext uri="{BB962C8B-B14F-4D97-AF65-F5344CB8AC3E}">
-        <p14:creationId xmlns="" xmlns:p14="http://schemas.microsoft.com/office/powerpoint/2010/main" val="2402780198"/>
+        <p14:creationId xmlns:p14="http://schemas.microsoft.com/office/powerpoint/2010/main" xmlns="" val="2402780198"/>
       </p:ext>
     </p:extLst>
   </p:cSld>
@@ -14575,14 +14444,6 @@
               </a:rPr>
               <a:t>5. Produktleistungen</a:t>
             </a:r>
-            <a:endParaRPr lang="de-DE" sz="3200" dirty="0" smtClean="0">
-              <a:solidFill>
-                <a:srgbClr val="003B79"/>
-              </a:solidFill>
-              <a:latin typeface="+mj-lt"/>
-              <a:ea typeface="+mj-ea"/>
-              <a:cs typeface="+mj-cs"/>
-            </a:endParaRPr>
           </a:p>
           <a:p>
             <a:pPr marL="457200" lvl="0" indent="-457200" algn="l"/>
@@ -14841,32 +14702,8 @@
                 </a:solidFill>
                 <a:latin typeface="+mn-lt"/>
               </a:rPr>
-              <a:t>Getrennte Nutzer</a:t>
-            </a:r>
-            <a:r>
-              <a:rPr lang="de-DE" sz="2400" b="0" kern="0" dirty="0" smtClean="0">
-                <a:solidFill>
-                  <a:srgbClr val="003B79"/>
-                </a:solidFill>
-                <a:latin typeface="+mn-lt"/>
-              </a:rPr>
-              <a:t>: </a:t>
-            </a:r>
-            <a:r>
-              <a:rPr lang="de-DE" sz="2400" b="0" kern="0" dirty="0" smtClean="0">
-                <a:solidFill>
-                  <a:srgbClr val="003B79"/>
-                </a:solidFill>
-                <a:latin typeface="+mn-lt"/>
-              </a:rPr>
-              <a:t>	Daten werden an Nutzer-ID gebunden</a:t>
-            </a:r>
-            <a:endParaRPr lang="de-DE" sz="2400" b="0" kern="0" dirty="0" smtClean="0">
-              <a:solidFill>
-                <a:srgbClr val="003B79"/>
-              </a:solidFill>
-              <a:latin typeface="+mn-lt"/>
-            </a:endParaRPr>
+              <a:t>Getrennte Nutzer: 	Daten werden an Nutzer-ID gebunden</a:t>
+            </a:r>
           </a:p>
           <a:p>
             <a:pPr algn="l"/>
@@ -14889,59 +14726,8 @@
                 </a:solidFill>
                 <a:latin typeface="+mn-lt"/>
               </a:rPr>
-              <a:t>Akkumulation</a:t>
-            </a:r>
-            <a:r>
-              <a:rPr lang="de-DE" sz="2400" b="0" kern="0" dirty="0" smtClean="0">
-                <a:solidFill>
-                  <a:srgbClr val="003B79"/>
-                </a:solidFill>
-                <a:latin typeface="+mn-lt"/>
-              </a:rPr>
-              <a:t>: </a:t>
-            </a:r>
-            <a:r>
-              <a:rPr lang="de-DE" sz="2400" b="0" kern="0" dirty="0" smtClean="0">
-                <a:solidFill>
-                  <a:srgbClr val="003B79"/>
-                </a:solidFill>
-                <a:latin typeface="+mn-lt"/>
-              </a:rPr>
-              <a:t>	Bei </a:t>
-            </a:r>
-            <a:r>
-              <a:rPr lang="de-DE" sz="2400" b="0" kern="0" dirty="0" smtClean="0">
-                <a:solidFill>
-                  <a:srgbClr val="003B79"/>
-                </a:solidFill>
-                <a:latin typeface="+mn-lt"/>
-              </a:rPr>
-              <a:t>fehlerhafter Eingabe erhält Nutzer eine </a:t>
-            </a:r>
-            <a:r>
-              <a:rPr lang="de-DE" sz="2400" b="0" kern="0" dirty="0" smtClean="0">
-                <a:solidFill>
-                  <a:srgbClr val="003B79"/>
-                </a:solidFill>
-                <a:latin typeface="+mn-lt"/>
-              </a:rPr>
-              <a:t>			Liste </a:t>
-            </a:r>
-            <a:r>
-              <a:rPr lang="de-DE" sz="2400" b="0" kern="0" dirty="0" smtClean="0">
-                <a:solidFill>
-                  <a:srgbClr val="003B79"/>
-                </a:solidFill>
-                <a:latin typeface="+mn-lt"/>
-              </a:rPr>
-              <a:t>aller eingegebenen Fehler.</a:t>
-            </a:r>
-            <a:endParaRPr lang="de-DE" sz="2400" b="0" kern="0" dirty="0" smtClean="0">
-              <a:solidFill>
-                <a:srgbClr val="003B79"/>
-              </a:solidFill>
-              <a:latin typeface="+mn-lt"/>
-            </a:endParaRPr>
+              <a:t>Akkumulation: 	Bei fehlerhafter Eingabe erhält Nutzer eine 			Liste aller eingegebenen Fehler.</a:t>
+            </a:r>
           </a:p>
           <a:p>
             <a:pPr algn="l"/>
@@ -14984,7 +14770,7 @@
     </p:spTree>
     <p:extLst>
       <p:ext uri="{BB962C8B-B14F-4D97-AF65-F5344CB8AC3E}">
-        <p14:creationId xmlns="" xmlns:p14="http://schemas.microsoft.com/office/powerpoint/2010/main" val="2402780198"/>
+        <p14:creationId xmlns:p14="http://schemas.microsoft.com/office/powerpoint/2010/main" xmlns="" val="2402780198"/>
       </p:ext>
     </p:extLst>
   </p:cSld>
@@ -15051,14 +14837,6 @@
               </a:rPr>
               <a:t>5. Produktleistungen</a:t>
             </a:r>
-            <a:endParaRPr lang="de-DE" sz="3200" dirty="0" smtClean="0">
-              <a:solidFill>
-                <a:srgbClr val="003B79"/>
-              </a:solidFill>
-              <a:latin typeface="+mj-lt"/>
-              <a:ea typeface="+mj-ea"/>
-              <a:cs typeface="+mj-cs"/>
-            </a:endParaRPr>
           </a:p>
           <a:p>
             <a:pPr marL="457200" lvl="0" indent="-457200" algn="l"/>
@@ -15317,32 +15095,8 @@
                 </a:solidFill>
                 <a:latin typeface="+mn-lt"/>
               </a:rPr>
-              <a:t>Datensicherheit</a:t>
-            </a:r>
-            <a:r>
-              <a:rPr lang="de-DE" sz="2400" b="0" kern="0" dirty="0" smtClean="0">
-                <a:solidFill>
-                  <a:srgbClr val="003B79"/>
-                </a:solidFill>
-                <a:latin typeface="+mn-lt"/>
-              </a:rPr>
-              <a:t>: </a:t>
-            </a:r>
-            <a:r>
-              <a:rPr lang="de-DE" sz="2400" b="0" kern="0" dirty="0" smtClean="0">
-                <a:solidFill>
-                  <a:srgbClr val="003B79"/>
-                </a:solidFill>
-                <a:latin typeface="+mn-lt"/>
-              </a:rPr>
-              <a:t>	Nutzer haben nur Einblick in die Daten, die 			sie selbst angelegt haben</a:t>
-            </a:r>
-            <a:endParaRPr lang="de-DE" sz="2400" b="0" kern="0" dirty="0" smtClean="0">
-              <a:solidFill>
-                <a:srgbClr val="003B79"/>
-              </a:solidFill>
-              <a:latin typeface="+mn-lt"/>
-            </a:endParaRPr>
+              <a:t>Datensicherheit: 	Nutzer haben nur Einblick in die Daten, die 			sie selbst angelegt haben</a:t>
+            </a:r>
           </a:p>
           <a:p>
             <a:pPr algn="l"/>
@@ -15365,50 +15119,8 @@
                 </a:solidFill>
                 <a:latin typeface="+mn-lt"/>
               </a:rPr>
-              <a:t>Verfügbarkeit</a:t>
-            </a:r>
-            <a:r>
-              <a:rPr lang="de-DE" sz="2400" b="0" kern="0" dirty="0" smtClean="0">
-                <a:solidFill>
-                  <a:srgbClr val="003B79"/>
-                </a:solidFill>
-                <a:latin typeface="+mn-lt"/>
-              </a:rPr>
-              <a:t>: </a:t>
-            </a:r>
-            <a:r>
-              <a:rPr lang="de-DE" sz="2400" b="0" kern="0" dirty="0" smtClean="0">
-                <a:solidFill>
-                  <a:srgbClr val="003B79"/>
-                </a:solidFill>
-                <a:latin typeface="+mn-lt"/>
-              </a:rPr>
-              <a:t>	Server muss immer </a:t>
-            </a:r>
-            <a:r>
-              <a:rPr lang="de-DE" sz="2400" b="0" kern="0" dirty="0" smtClean="0">
-                <a:solidFill>
-                  <a:srgbClr val="003B79"/>
-                </a:solidFill>
-                <a:latin typeface="+mn-lt"/>
-              </a:rPr>
-              <a:t>erreichbar </a:t>
-            </a:r>
-            <a:r>
-              <a:rPr lang="de-DE" sz="2400" b="0" kern="0" dirty="0" smtClean="0">
-                <a:solidFill>
-                  <a:srgbClr val="003B79"/>
-                </a:solidFill>
-                <a:latin typeface="+mn-lt"/>
-              </a:rPr>
-              <a:t>sein</a:t>
-            </a:r>
-            <a:endParaRPr lang="de-DE" sz="2400" b="0" kern="0" dirty="0" smtClean="0">
-              <a:solidFill>
-                <a:srgbClr val="003B79"/>
-              </a:solidFill>
-              <a:latin typeface="+mn-lt"/>
-            </a:endParaRPr>
+              <a:t>Verfügbarkeit: 	Server muss immer erreichbar sein</a:t>
+            </a:r>
           </a:p>
           <a:p>
             <a:pPr algn="l"/>
@@ -15431,25 +15143,7 @@
                 </a:solidFill>
                 <a:latin typeface="+mn-lt"/>
               </a:rPr>
-              <a:t>Archivierung</a:t>
-            </a:r>
-            <a:r>
-              <a:rPr lang="de-DE" sz="2400" b="0" kern="0" dirty="0" smtClean="0">
-                <a:solidFill>
-                  <a:srgbClr val="003B79"/>
-                </a:solidFill>
-                <a:latin typeface="+mn-lt"/>
-              </a:rPr>
-              <a:t>: </a:t>
-            </a:r>
-            <a:r>
-              <a:rPr lang="de-DE" sz="2400" b="0" kern="0" dirty="0" smtClean="0">
-                <a:solidFill>
-                  <a:srgbClr val="003B79"/>
-                </a:solidFill>
-                <a:latin typeface="+mn-lt"/>
-              </a:rPr>
-              <a:t>	Rechnungen können nicht 	vom Nutzer 				gelöscht werden</a:t>
+              <a:t>Archivierung: 	Rechnungen können nicht 	vom Nutzer 				gelöscht werden</a:t>
             </a:r>
             <a:endParaRPr lang="de-DE" sz="2400" b="0" kern="0" dirty="0">
               <a:solidFill>
@@ -15463,7 +15157,7 @@
     </p:spTree>
     <p:extLst>
       <p:ext uri="{BB962C8B-B14F-4D97-AF65-F5344CB8AC3E}">
-        <p14:creationId xmlns="" xmlns:p14="http://schemas.microsoft.com/office/powerpoint/2010/main" val="2402780198"/>
+        <p14:creationId xmlns:p14="http://schemas.microsoft.com/office/powerpoint/2010/main" xmlns="" val="2402780198"/>
       </p:ext>
     </p:extLst>
   </p:cSld>
@@ -15507,7 +15201,7 @@
             <p:ph idx="1"/>
             <p:extLst>
               <p:ext uri="{D42A27DB-BD31-4B8C-83A1-F6EECF244321}">
-                <p14:modId xmlns="" xmlns:p14="http://schemas.microsoft.com/office/powerpoint/2010/main" val="2122085790"/>
+                <p14:modId xmlns:p14="http://schemas.microsoft.com/office/powerpoint/2010/main" xmlns="" val="2122085790"/>
               </p:ext>
             </p:extLst>
           </p:nvPr>
@@ -15544,11 +15238,7 @@
           <a:p>
             <a:r>
               <a:rPr lang="de-DE" sz="3200" dirty="0" smtClean="0"/>
-              <a:t>6. </a:t>
-            </a:r>
-            <a:r>
-              <a:rPr lang="de-DE" sz="3200" dirty="0" smtClean="0"/>
-              <a:t>Produktarchitektur</a:t>
+              <a:t>6. Produktarchitektur</a:t>
             </a:r>
             <a:endParaRPr lang="de-DE" sz="3200" dirty="0"/>
           </a:p>
@@ -15619,7 +15309,7 @@
     </p:spTree>
     <p:extLst>
       <p:ext uri="{BB962C8B-B14F-4D97-AF65-F5344CB8AC3E}">
-        <p14:creationId xmlns="" xmlns:p14="http://schemas.microsoft.com/office/powerpoint/2010/main" val="3973953230"/>
+        <p14:creationId xmlns:p14="http://schemas.microsoft.com/office/powerpoint/2010/main" xmlns="" val="3973953230"/>
       </p:ext>
     </p:extLst>
   </p:cSld>

</xml_diff>